<commit_message>
Julias Aenderungen an ihrer Praesentation
</commit_message>
<xml_diff>
--- a/70 Praesentation/30 StarGreg Julia.pptx
+++ b/70 Praesentation/30 StarGreg Julia.pptx
@@ -5,10 +5,10 @@
     <p:sldMasterId id="2147483660" r:id="rId1"/>
   </p:sldMasterIdLst>
   <p:notesMasterIdLst>
-    <p:notesMasterId r:id="rId11"/>
+    <p:notesMasterId r:id="rId17"/>
   </p:notesMasterIdLst>
   <p:handoutMasterIdLst>
-    <p:handoutMasterId r:id="rId12"/>
+    <p:handoutMasterId r:id="rId18"/>
   </p:handoutMasterIdLst>
   <p:sldIdLst>
     <p:sldId id="256" r:id="rId2"/>
@@ -16,10 +16,16 @@
     <p:sldId id="258" r:id="rId4"/>
     <p:sldId id="262" r:id="rId5"/>
     <p:sldId id="259" r:id="rId6"/>
-    <p:sldId id="263" r:id="rId7"/>
-    <p:sldId id="260" r:id="rId8"/>
-    <p:sldId id="264" r:id="rId9"/>
-    <p:sldId id="261" r:id="rId10"/>
+    <p:sldId id="265" r:id="rId7"/>
+    <p:sldId id="266" r:id="rId8"/>
+    <p:sldId id="267" r:id="rId9"/>
+    <p:sldId id="268" r:id="rId10"/>
+    <p:sldId id="269" r:id="rId11"/>
+    <p:sldId id="270" r:id="rId12"/>
+    <p:sldId id="271" r:id="rId13"/>
+    <p:sldId id="260" r:id="rId14"/>
+    <p:sldId id="264" r:id="rId15"/>
+    <p:sldId id="261" r:id="rId16"/>
   </p:sldIdLst>
   <p:sldSz cx="9144000" cy="6858000" type="screen4x3"/>
   <p:notesSz cx="6858000" cy="9144000"/>
@@ -2845,7 +2851,7 @@
           <a:p>
             <a:fld id="{27667466-E0D7-FD4B-BBEF-602BF6B185FF}" type="datetimeFigureOut">
               <a:rPr lang="de-DE" smtClean="0"/>
-              <a:t>28.10.11</a:t>
+              <a:t>03.11.11</a:t>
             </a:fld>
             <a:endParaRPr lang="de-DE"/>
           </a:p>
@@ -3011,7 +3017,7 @@
           <a:p>
             <a:fld id="{358CF69D-E791-E447-927B-A50D3ED4596D}" type="datetimeFigureOut">
               <a:rPr lang="de-DE" smtClean="0"/>
-              <a:t>28.10.11</a:t>
+              <a:t>03.11.11</a:t>
             </a:fld>
             <a:endParaRPr lang="de-DE"/>
           </a:p>
@@ -8367,6 +8373,869 @@
 </p:sld>
 </file>
 
+<file path=ppt/slides/slide10.xml><?xml version="1.0" encoding="utf-8"?>
+<p:sld xmlns:a="http://schemas.openxmlformats.org/drawingml/2006/main" xmlns:r="http://schemas.openxmlformats.org/officeDocument/2006/relationships" xmlns:p="http://schemas.openxmlformats.org/presentationml/2006/main">
+  <p:cSld>
+    <p:spTree>
+      <p:nvGrpSpPr>
+        <p:cNvPr id="1" name=""/>
+        <p:cNvGrpSpPr/>
+        <p:nvPr/>
+      </p:nvGrpSpPr>
+      <p:grpSpPr>
+        <a:xfrm>
+          <a:off x="0" y="0"/>
+          <a:ext cx="0" cy="0"/>
+          <a:chOff x="0" y="0"/>
+          <a:chExt cx="0" cy="0"/>
+        </a:xfrm>
+      </p:grpSpPr>
+      <p:sp>
+        <p:nvSpPr>
+          <p:cNvPr id="2" name="Titel 1"/>
+          <p:cNvSpPr>
+            <a:spLocks noGrp="1"/>
+          </p:cNvSpPr>
+          <p:nvPr>
+            <p:ph type="title"/>
+          </p:nvPr>
+        </p:nvSpPr>
+        <p:spPr/>
+        <p:txBody>
+          <a:bodyPr/>
+          <a:lstStyle/>
+          <a:p>
+            <a:r>
+              <a:rPr lang="de-DE" dirty="0" smtClean="0"/>
+              <a:t>Einkauf</a:t>
+            </a:r>
+            <a:endParaRPr lang="de-DE" dirty="0"/>
+          </a:p>
+        </p:txBody>
+      </p:sp>
+      <p:pic>
+        <p:nvPicPr>
+          <p:cNvPr id="7" name="Inhaltsplatzhalter 6" descr="Einkauf.jpg"/>
+          <p:cNvPicPr>
+            <a:picLocks noGrp="1" noChangeAspect="1"/>
+          </p:cNvPicPr>
+          <p:nvPr>
+            <p:ph idx="1"/>
+          </p:nvPr>
+        </p:nvPicPr>
+        <p:blipFill>
+          <a:blip r:embed="rId2">
+            <a:extLst>
+              <a:ext uri="{28A0092B-C50C-407E-A947-70E740481C1C}">
+                <a14:useLocalDpi xmlns:a14="http://schemas.microsoft.com/office/drawing/2010/main" val="0"/>
+              </a:ext>
+            </a:extLst>
+          </a:blip>
+          <a:srcRect l="-23341" r="-23341"/>
+          <a:stretch>
+            <a:fillRect/>
+          </a:stretch>
+        </p:blipFill>
+        <p:spPr>
+          <a:xfrm>
+            <a:off x="-388682" y="2038256"/>
+            <a:ext cx="9532682" cy="4597906"/>
+          </a:xfrm>
+        </p:spPr>
+      </p:pic>
+      <p:sp>
+        <p:nvSpPr>
+          <p:cNvPr id="4" name="Datumsplatzhalter 3"/>
+          <p:cNvSpPr>
+            <a:spLocks noGrp="1"/>
+          </p:cNvSpPr>
+          <p:nvPr>
+            <p:ph type="dt" sz="half" idx="10"/>
+          </p:nvPr>
+        </p:nvSpPr>
+        <p:spPr/>
+        <p:txBody>
+          <a:bodyPr/>
+          <a:lstStyle/>
+          <a:p>
+            <a:r>
+              <a:rPr lang="de-DE" smtClean="0"/>
+              <a:t>04.11.11</a:t>
+            </a:r>
+            <a:endParaRPr lang="en-US"/>
+          </a:p>
+        </p:txBody>
+      </p:sp>
+      <p:sp>
+        <p:nvSpPr>
+          <p:cNvPr id="5" name="Fußzeilenplatzhalter 4"/>
+          <p:cNvSpPr>
+            <a:spLocks noGrp="1"/>
+          </p:cNvSpPr>
+          <p:nvPr>
+            <p:ph type="ftr" sz="quarter" idx="11"/>
+          </p:nvPr>
+        </p:nvSpPr>
+        <p:spPr/>
+        <p:txBody>
+          <a:bodyPr/>
+          <a:lstStyle/>
+          <a:p>
+            <a:r>
+              <a:rPr lang="de-DE" smtClean="0"/>
+              <a:t>Star Greg</a:t>
+            </a:r>
+            <a:endParaRPr lang="en-US"/>
+          </a:p>
+        </p:txBody>
+      </p:sp>
+      <p:sp>
+        <p:nvSpPr>
+          <p:cNvPr id="6" name="Foliennummernplatzhalter 5"/>
+          <p:cNvSpPr>
+            <a:spLocks noGrp="1"/>
+          </p:cNvSpPr>
+          <p:nvPr>
+            <p:ph type="sldNum" sz="quarter" idx="12"/>
+          </p:nvPr>
+        </p:nvSpPr>
+        <p:spPr/>
+        <p:txBody>
+          <a:bodyPr/>
+          <a:lstStyle/>
+          <a:p>
+            <a:fld id="{4A822907-8A9D-4F6B-98F6-913902AD56B5}" type="slidenum">
+              <a:rPr lang="en-US" smtClean="0"/>
+              <a:t>10</a:t>
+            </a:fld>
+            <a:endParaRPr lang="en-US"/>
+          </a:p>
+        </p:txBody>
+      </p:sp>
+    </p:spTree>
+    <p:extLst>
+      <p:ext uri="{BB962C8B-B14F-4D97-AF65-F5344CB8AC3E}">
+        <p14:creationId xmlns:p14="http://schemas.microsoft.com/office/powerpoint/2010/main" val="492330647"/>
+      </p:ext>
+    </p:extLst>
+  </p:cSld>
+  <p:clrMapOvr>
+    <a:masterClrMapping/>
+  </p:clrMapOvr>
+</p:sld>
+</file>
+
+<file path=ppt/slides/slide11.xml><?xml version="1.0" encoding="utf-8"?>
+<p:sld xmlns:a="http://schemas.openxmlformats.org/drawingml/2006/main" xmlns:r="http://schemas.openxmlformats.org/officeDocument/2006/relationships" xmlns:p="http://schemas.openxmlformats.org/presentationml/2006/main">
+  <p:cSld>
+    <p:spTree>
+      <p:nvGrpSpPr>
+        <p:cNvPr id="1" name=""/>
+        <p:cNvGrpSpPr/>
+        <p:nvPr/>
+      </p:nvGrpSpPr>
+      <p:grpSpPr>
+        <a:xfrm>
+          <a:off x="0" y="0"/>
+          <a:ext cx="0" cy="0"/>
+          <a:chOff x="0" y="0"/>
+          <a:chExt cx="0" cy="0"/>
+        </a:xfrm>
+      </p:grpSpPr>
+      <p:sp>
+        <p:nvSpPr>
+          <p:cNvPr id="2" name="Titel 1"/>
+          <p:cNvSpPr>
+            <a:spLocks noGrp="1"/>
+          </p:cNvSpPr>
+          <p:nvPr>
+            <p:ph type="title"/>
+          </p:nvPr>
+        </p:nvSpPr>
+        <p:spPr/>
+        <p:txBody>
+          <a:bodyPr/>
+          <a:lstStyle/>
+          <a:p>
+            <a:r>
+              <a:rPr lang="de-DE" dirty="0" smtClean="0"/>
+              <a:t>Produktion</a:t>
+            </a:r>
+            <a:endParaRPr lang="de-DE" dirty="0"/>
+          </a:p>
+        </p:txBody>
+      </p:sp>
+      <p:pic>
+        <p:nvPicPr>
+          <p:cNvPr id="7" name="Inhaltsplatzhalter 6" descr="Produktion.jpg"/>
+          <p:cNvPicPr>
+            <a:picLocks noGrp="1" noChangeAspect="1"/>
+          </p:cNvPicPr>
+          <p:nvPr>
+            <p:ph idx="1"/>
+          </p:nvPr>
+        </p:nvPicPr>
+        <p:blipFill rotWithShape="1">
+          <a:blip r:embed="rId2">
+            <a:extLst>
+              <a:ext uri="{28A0092B-C50C-407E-A947-70E740481C1C}">
+                <a14:useLocalDpi xmlns:a14="http://schemas.microsoft.com/office/drawing/2010/main" val="0"/>
+              </a:ext>
+            </a:extLst>
+          </a:blip>
+          <a:srcRect l="2676" r="2515"/>
+          <a:stretch/>
+        </p:blipFill>
+        <p:spPr>
+          <a:xfrm>
+            <a:off x="1365597" y="2038256"/>
+            <a:ext cx="6074714" cy="4533085"/>
+          </a:xfrm>
+        </p:spPr>
+      </p:pic>
+      <p:sp>
+        <p:nvSpPr>
+          <p:cNvPr id="4" name="Datumsplatzhalter 3"/>
+          <p:cNvSpPr>
+            <a:spLocks noGrp="1"/>
+          </p:cNvSpPr>
+          <p:nvPr>
+            <p:ph type="dt" sz="half" idx="10"/>
+          </p:nvPr>
+        </p:nvSpPr>
+        <p:spPr/>
+        <p:txBody>
+          <a:bodyPr/>
+          <a:lstStyle/>
+          <a:p>
+            <a:r>
+              <a:rPr lang="de-DE" smtClean="0"/>
+              <a:t>04.11.11</a:t>
+            </a:r>
+            <a:endParaRPr lang="en-US"/>
+          </a:p>
+        </p:txBody>
+      </p:sp>
+      <p:sp>
+        <p:nvSpPr>
+          <p:cNvPr id="5" name="Fußzeilenplatzhalter 4"/>
+          <p:cNvSpPr>
+            <a:spLocks noGrp="1"/>
+          </p:cNvSpPr>
+          <p:nvPr>
+            <p:ph type="ftr" sz="quarter" idx="11"/>
+          </p:nvPr>
+        </p:nvSpPr>
+        <p:spPr/>
+        <p:txBody>
+          <a:bodyPr/>
+          <a:lstStyle/>
+          <a:p>
+            <a:r>
+              <a:rPr lang="de-DE" smtClean="0"/>
+              <a:t>Star Greg</a:t>
+            </a:r>
+            <a:endParaRPr lang="en-US"/>
+          </a:p>
+        </p:txBody>
+      </p:sp>
+      <p:sp>
+        <p:nvSpPr>
+          <p:cNvPr id="6" name="Foliennummernplatzhalter 5"/>
+          <p:cNvSpPr>
+            <a:spLocks noGrp="1"/>
+          </p:cNvSpPr>
+          <p:nvPr>
+            <p:ph type="sldNum" sz="quarter" idx="12"/>
+          </p:nvPr>
+        </p:nvSpPr>
+        <p:spPr/>
+        <p:txBody>
+          <a:bodyPr/>
+          <a:lstStyle/>
+          <a:p>
+            <a:fld id="{4A822907-8A9D-4F6B-98F6-913902AD56B5}" type="slidenum">
+              <a:rPr lang="en-US" smtClean="0"/>
+              <a:t>11</a:t>
+            </a:fld>
+            <a:endParaRPr lang="en-US"/>
+          </a:p>
+        </p:txBody>
+      </p:sp>
+    </p:spTree>
+    <p:extLst>
+      <p:ext uri="{BB962C8B-B14F-4D97-AF65-F5344CB8AC3E}">
+        <p14:creationId xmlns:p14="http://schemas.microsoft.com/office/powerpoint/2010/main" val="4061051814"/>
+      </p:ext>
+    </p:extLst>
+  </p:cSld>
+  <p:clrMapOvr>
+    <a:masterClrMapping/>
+  </p:clrMapOvr>
+</p:sld>
+</file>
+
+<file path=ppt/slides/slide12.xml><?xml version="1.0" encoding="utf-8"?>
+<p:sld xmlns:a="http://schemas.openxmlformats.org/drawingml/2006/main" xmlns:r="http://schemas.openxmlformats.org/officeDocument/2006/relationships" xmlns:p="http://schemas.openxmlformats.org/presentationml/2006/main">
+  <p:cSld>
+    <p:spTree>
+      <p:nvGrpSpPr>
+        <p:cNvPr id="1" name=""/>
+        <p:cNvGrpSpPr/>
+        <p:nvPr/>
+      </p:nvGrpSpPr>
+      <p:grpSpPr>
+        <a:xfrm>
+          <a:off x="0" y="0"/>
+          <a:ext cx="0" cy="0"/>
+          <a:chOff x="0" y="0"/>
+          <a:chExt cx="0" cy="0"/>
+        </a:xfrm>
+      </p:grpSpPr>
+      <p:sp>
+        <p:nvSpPr>
+          <p:cNvPr id="2" name="Titel 1"/>
+          <p:cNvSpPr>
+            <a:spLocks noGrp="1"/>
+          </p:cNvSpPr>
+          <p:nvPr>
+            <p:ph type="title"/>
+          </p:nvPr>
+        </p:nvSpPr>
+        <p:spPr/>
+        <p:txBody>
+          <a:bodyPr/>
+          <a:lstStyle/>
+          <a:p>
+            <a:r>
+              <a:rPr lang="de-DE" dirty="0" smtClean="0"/>
+              <a:t>Finanzen</a:t>
+            </a:r>
+            <a:endParaRPr lang="de-DE" dirty="0"/>
+          </a:p>
+        </p:txBody>
+      </p:sp>
+      <p:pic>
+        <p:nvPicPr>
+          <p:cNvPr id="7" name="Inhaltsplatzhalter 6" descr="Finanzen.jpg"/>
+          <p:cNvPicPr>
+            <a:picLocks noGrp="1" noChangeAspect="1"/>
+          </p:cNvPicPr>
+          <p:nvPr>
+            <p:ph idx="1"/>
+          </p:nvPr>
+        </p:nvPicPr>
+        <p:blipFill rotWithShape="1">
+          <a:blip r:embed="rId2">
+            <a:extLst>
+              <a:ext uri="{28A0092B-C50C-407E-A947-70E740481C1C}">
+                <a14:useLocalDpi xmlns:a14="http://schemas.microsoft.com/office/drawing/2010/main" val="0"/>
+              </a:ext>
+            </a:extLst>
+          </a:blip>
+          <a:srcRect l="2676" r="1600"/>
+          <a:stretch/>
+        </p:blipFill>
+        <p:spPr>
+          <a:xfrm>
+            <a:off x="1393587" y="2038257"/>
+            <a:ext cx="6130171" cy="4530818"/>
+          </a:xfrm>
+        </p:spPr>
+      </p:pic>
+      <p:sp>
+        <p:nvSpPr>
+          <p:cNvPr id="4" name="Datumsplatzhalter 3"/>
+          <p:cNvSpPr>
+            <a:spLocks noGrp="1"/>
+          </p:cNvSpPr>
+          <p:nvPr>
+            <p:ph type="dt" sz="half" idx="10"/>
+          </p:nvPr>
+        </p:nvSpPr>
+        <p:spPr/>
+        <p:txBody>
+          <a:bodyPr/>
+          <a:lstStyle/>
+          <a:p>
+            <a:r>
+              <a:rPr lang="de-DE" smtClean="0"/>
+              <a:t>04.11.11</a:t>
+            </a:r>
+            <a:endParaRPr lang="en-US"/>
+          </a:p>
+        </p:txBody>
+      </p:sp>
+      <p:sp>
+        <p:nvSpPr>
+          <p:cNvPr id="5" name="Fußzeilenplatzhalter 4"/>
+          <p:cNvSpPr>
+            <a:spLocks noGrp="1"/>
+          </p:cNvSpPr>
+          <p:nvPr>
+            <p:ph type="ftr" sz="quarter" idx="11"/>
+          </p:nvPr>
+        </p:nvSpPr>
+        <p:spPr/>
+        <p:txBody>
+          <a:bodyPr/>
+          <a:lstStyle/>
+          <a:p>
+            <a:r>
+              <a:rPr lang="de-DE" smtClean="0"/>
+              <a:t>Star Greg</a:t>
+            </a:r>
+            <a:endParaRPr lang="en-US"/>
+          </a:p>
+        </p:txBody>
+      </p:sp>
+      <p:sp>
+        <p:nvSpPr>
+          <p:cNvPr id="6" name="Foliennummernplatzhalter 5"/>
+          <p:cNvSpPr>
+            <a:spLocks noGrp="1"/>
+          </p:cNvSpPr>
+          <p:nvPr>
+            <p:ph type="sldNum" sz="quarter" idx="12"/>
+          </p:nvPr>
+        </p:nvSpPr>
+        <p:spPr/>
+        <p:txBody>
+          <a:bodyPr/>
+          <a:lstStyle/>
+          <a:p>
+            <a:fld id="{4A822907-8A9D-4F6B-98F6-913902AD56B5}" type="slidenum">
+              <a:rPr lang="en-US" smtClean="0"/>
+              <a:t>12</a:t>
+            </a:fld>
+            <a:endParaRPr lang="en-US"/>
+          </a:p>
+        </p:txBody>
+      </p:sp>
+    </p:spTree>
+    <p:extLst>
+      <p:ext uri="{BB962C8B-B14F-4D97-AF65-F5344CB8AC3E}">
+        <p14:creationId xmlns:p14="http://schemas.microsoft.com/office/powerpoint/2010/main" val="293288100"/>
+      </p:ext>
+    </p:extLst>
+  </p:cSld>
+  <p:clrMapOvr>
+    <a:masterClrMapping/>
+  </p:clrMapOvr>
+</p:sld>
+</file>
+
+<file path=ppt/slides/slide13.xml><?xml version="1.0" encoding="utf-8"?>
+<p:sld xmlns:a="http://schemas.openxmlformats.org/drawingml/2006/main" xmlns:r="http://schemas.openxmlformats.org/officeDocument/2006/relationships" xmlns:p="http://schemas.openxmlformats.org/presentationml/2006/main">
+  <p:cSld>
+    <p:spTree>
+      <p:nvGrpSpPr>
+        <p:cNvPr id="1" name=""/>
+        <p:cNvGrpSpPr/>
+        <p:nvPr/>
+      </p:nvGrpSpPr>
+      <p:grpSpPr>
+        <a:xfrm>
+          <a:off x="0" y="0"/>
+          <a:ext cx="0" cy="0"/>
+          <a:chOff x="0" y="0"/>
+          <a:chExt cx="0" cy="0"/>
+        </a:xfrm>
+      </p:grpSpPr>
+      <p:sp>
+        <p:nvSpPr>
+          <p:cNvPr id="2" name="Titel 1"/>
+          <p:cNvSpPr>
+            <a:spLocks noGrp="1"/>
+          </p:cNvSpPr>
+          <p:nvPr>
+            <p:ph type="title"/>
+          </p:nvPr>
+        </p:nvSpPr>
+        <p:spPr/>
+        <p:txBody>
+          <a:bodyPr/>
+          <a:lstStyle/>
+          <a:p>
+            <a:r>
+              <a:rPr lang="de-DE" dirty="0" smtClean="0">
+                <a:solidFill>
+                  <a:srgbClr val="E4C402"/>
+                </a:solidFill>
+              </a:rPr>
+              <a:t>Implementierung</a:t>
+            </a:r>
+            <a:endParaRPr lang="de-DE" dirty="0">
+              <a:solidFill>
+                <a:srgbClr val="E4C402"/>
+              </a:solidFill>
+            </a:endParaRPr>
+          </a:p>
+        </p:txBody>
+      </p:sp>
+      <p:sp>
+        <p:nvSpPr>
+          <p:cNvPr id="3" name="Datumsplatzhalter 2"/>
+          <p:cNvSpPr>
+            <a:spLocks noGrp="1"/>
+          </p:cNvSpPr>
+          <p:nvPr>
+            <p:ph type="dt" sz="half" idx="10"/>
+          </p:nvPr>
+        </p:nvSpPr>
+        <p:spPr/>
+        <p:txBody>
+          <a:bodyPr/>
+          <a:lstStyle/>
+          <a:p>
+            <a:r>
+              <a:rPr lang="de-DE" smtClean="0"/>
+              <a:t>04.11.11</a:t>
+            </a:r>
+            <a:endParaRPr lang="en-US"/>
+          </a:p>
+        </p:txBody>
+      </p:sp>
+      <p:sp>
+        <p:nvSpPr>
+          <p:cNvPr id="4" name="Fußzeilenplatzhalter 3"/>
+          <p:cNvSpPr>
+            <a:spLocks noGrp="1"/>
+          </p:cNvSpPr>
+          <p:nvPr>
+            <p:ph type="ftr" sz="quarter" idx="11"/>
+          </p:nvPr>
+        </p:nvSpPr>
+        <p:spPr/>
+        <p:txBody>
+          <a:bodyPr/>
+          <a:lstStyle/>
+          <a:p>
+            <a:r>
+              <a:rPr lang="de-DE" smtClean="0"/>
+              <a:t>Star Greg</a:t>
+            </a:r>
+            <a:endParaRPr lang="en-US"/>
+          </a:p>
+        </p:txBody>
+      </p:sp>
+      <p:sp>
+        <p:nvSpPr>
+          <p:cNvPr id="5" name="Foliennummernplatzhalter 4"/>
+          <p:cNvSpPr>
+            <a:spLocks noGrp="1"/>
+          </p:cNvSpPr>
+          <p:nvPr>
+            <p:ph type="sldNum" sz="quarter" idx="12"/>
+          </p:nvPr>
+        </p:nvSpPr>
+        <p:spPr/>
+        <p:txBody>
+          <a:bodyPr/>
+          <a:lstStyle/>
+          <a:p>
+            <a:fld id="{4A822907-8A9D-4F6B-98F6-913902AD56B5}" type="slidenum">
+              <a:rPr lang="en-US" smtClean="0"/>
+              <a:t>13</a:t>
+            </a:fld>
+            <a:endParaRPr lang="en-US"/>
+          </a:p>
+        </p:txBody>
+      </p:sp>
+    </p:spTree>
+    <p:extLst>
+      <p:ext uri="{BB962C8B-B14F-4D97-AF65-F5344CB8AC3E}">
+        <p14:creationId xmlns:p14="http://schemas.microsoft.com/office/powerpoint/2010/main" val="2161015239"/>
+      </p:ext>
+    </p:extLst>
+  </p:cSld>
+  <p:clrMapOvr>
+    <a:masterClrMapping/>
+  </p:clrMapOvr>
+  <p:timing>
+    <p:tnLst>
+      <p:par>
+        <p:cTn xmlns:p14="http://schemas.microsoft.com/office/powerpoint/2010/main" id="1" dur="indefinite" restart="never" nodeType="tmRoot"/>
+      </p:par>
+    </p:tnLst>
+  </p:timing>
+</p:sld>
+</file>
+
+<file path=ppt/slides/slide14.xml><?xml version="1.0" encoding="utf-8"?>
+<p:sld xmlns:a="http://schemas.openxmlformats.org/drawingml/2006/main" xmlns:r="http://schemas.openxmlformats.org/officeDocument/2006/relationships" xmlns:p="http://schemas.openxmlformats.org/presentationml/2006/main">
+  <p:cSld>
+    <p:spTree>
+      <p:nvGrpSpPr>
+        <p:cNvPr id="1" name=""/>
+        <p:cNvGrpSpPr/>
+        <p:nvPr/>
+      </p:nvGrpSpPr>
+      <p:grpSpPr>
+        <a:xfrm>
+          <a:off x="0" y="0"/>
+          <a:ext cx="0" cy="0"/>
+          <a:chOff x="0" y="0"/>
+          <a:chExt cx="0" cy="0"/>
+        </a:xfrm>
+      </p:grpSpPr>
+      <p:sp>
+        <p:nvSpPr>
+          <p:cNvPr id="2" name="Titel 1"/>
+          <p:cNvSpPr>
+            <a:spLocks noGrp="1"/>
+          </p:cNvSpPr>
+          <p:nvPr>
+            <p:ph type="title"/>
+          </p:nvPr>
+        </p:nvSpPr>
+        <p:spPr/>
+        <p:txBody>
+          <a:bodyPr/>
+          <a:lstStyle/>
+          <a:p>
+            <a:endParaRPr lang="de-DE"/>
+          </a:p>
+        </p:txBody>
+      </p:sp>
+      <p:sp>
+        <p:nvSpPr>
+          <p:cNvPr id="3" name="Inhaltsplatzhalter 2"/>
+          <p:cNvSpPr>
+            <a:spLocks noGrp="1"/>
+          </p:cNvSpPr>
+          <p:nvPr>
+            <p:ph idx="1"/>
+          </p:nvPr>
+        </p:nvSpPr>
+        <p:spPr/>
+        <p:txBody>
+          <a:bodyPr/>
+          <a:lstStyle/>
+          <a:p>
+            <a:endParaRPr lang="de-DE"/>
+          </a:p>
+        </p:txBody>
+      </p:sp>
+      <p:sp>
+        <p:nvSpPr>
+          <p:cNvPr id="4" name="Datumsplatzhalter 3"/>
+          <p:cNvSpPr>
+            <a:spLocks noGrp="1"/>
+          </p:cNvSpPr>
+          <p:nvPr>
+            <p:ph type="dt" sz="half" idx="10"/>
+          </p:nvPr>
+        </p:nvSpPr>
+        <p:spPr/>
+        <p:txBody>
+          <a:bodyPr/>
+          <a:lstStyle/>
+          <a:p>
+            <a:r>
+              <a:rPr lang="de-DE" smtClean="0"/>
+              <a:t>04.11.11</a:t>
+            </a:r>
+            <a:endParaRPr lang="en-US"/>
+          </a:p>
+        </p:txBody>
+      </p:sp>
+      <p:sp>
+        <p:nvSpPr>
+          <p:cNvPr id="5" name="Fußzeilenplatzhalter 4"/>
+          <p:cNvSpPr>
+            <a:spLocks noGrp="1"/>
+          </p:cNvSpPr>
+          <p:nvPr>
+            <p:ph type="ftr" sz="quarter" idx="11"/>
+          </p:nvPr>
+        </p:nvSpPr>
+        <p:spPr/>
+        <p:txBody>
+          <a:bodyPr/>
+          <a:lstStyle/>
+          <a:p>
+            <a:r>
+              <a:rPr lang="de-DE" smtClean="0"/>
+              <a:t>Star Greg</a:t>
+            </a:r>
+            <a:endParaRPr lang="en-US"/>
+          </a:p>
+        </p:txBody>
+      </p:sp>
+      <p:sp>
+        <p:nvSpPr>
+          <p:cNvPr id="6" name="Foliennummernplatzhalter 5"/>
+          <p:cNvSpPr>
+            <a:spLocks noGrp="1"/>
+          </p:cNvSpPr>
+          <p:nvPr>
+            <p:ph type="sldNum" sz="quarter" idx="12"/>
+          </p:nvPr>
+        </p:nvSpPr>
+        <p:spPr/>
+        <p:txBody>
+          <a:bodyPr/>
+          <a:lstStyle/>
+          <a:p>
+            <a:fld id="{4A822907-8A9D-4F6B-98F6-913902AD56B5}" type="slidenum">
+              <a:rPr lang="en-US" smtClean="0"/>
+              <a:t>14</a:t>
+            </a:fld>
+            <a:endParaRPr lang="en-US"/>
+          </a:p>
+        </p:txBody>
+      </p:sp>
+    </p:spTree>
+    <p:extLst>
+      <p:ext uri="{BB962C8B-B14F-4D97-AF65-F5344CB8AC3E}">
+        <p14:creationId xmlns:p14="http://schemas.microsoft.com/office/powerpoint/2010/main" val="296993480"/>
+      </p:ext>
+    </p:extLst>
+  </p:cSld>
+  <p:clrMapOvr>
+    <a:masterClrMapping/>
+  </p:clrMapOvr>
+  <p:timing>
+    <p:tnLst>
+      <p:par>
+        <p:cTn xmlns:p14="http://schemas.microsoft.com/office/powerpoint/2010/main" id="1" dur="indefinite" restart="never" nodeType="tmRoot"/>
+      </p:par>
+    </p:tnLst>
+  </p:timing>
+</p:sld>
+</file>
+
+<file path=ppt/slides/slide15.xml><?xml version="1.0" encoding="utf-8"?>
+<p:sld xmlns:a="http://schemas.openxmlformats.org/drawingml/2006/main" xmlns:r="http://schemas.openxmlformats.org/officeDocument/2006/relationships" xmlns:p="http://schemas.openxmlformats.org/presentationml/2006/main">
+  <p:cSld>
+    <p:spTree>
+      <p:nvGrpSpPr>
+        <p:cNvPr id="1" name=""/>
+        <p:cNvGrpSpPr/>
+        <p:nvPr/>
+      </p:nvGrpSpPr>
+      <p:grpSpPr>
+        <a:xfrm>
+          <a:off x="0" y="0"/>
+          <a:ext cx="0" cy="0"/>
+          <a:chOff x="0" y="0"/>
+          <a:chExt cx="0" cy="0"/>
+        </a:xfrm>
+      </p:grpSpPr>
+      <p:sp>
+        <p:nvSpPr>
+          <p:cNvPr id="2" name="Titel 1"/>
+          <p:cNvSpPr>
+            <a:spLocks noGrp="1"/>
+          </p:cNvSpPr>
+          <p:nvPr>
+            <p:ph type="title"/>
+          </p:nvPr>
+        </p:nvSpPr>
+        <p:spPr/>
+        <p:txBody>
+          <a:bodyPr/>
+          <a:lstStyle/>
+          <a:p>
+            <a:r>
+              <a:rPr lang="de-DE" dirty="0" smtClean="0">
+                <a:solidFill>
+                  <a:srgbClr val="E4C402"/>
+                </a:solidFill>
+              </a:rPr>
+              <a:t>Vielen Dank für Eure Aufmerksamkeit!</a:t>
+            </a:r>
+            <a:endParaRPr lang="de-DE" dirty="0">
+              <a:solidFill>
+                <a:srgbClr val="E4C402"/>
+              </a:solidFill>
+            </a:endParaRPr>
+          </a:p>
+        </p:txBody>
+      </p:sp>
+      <p:sp>
+        <p:nvSpPr>
+          <p:cNvPr id="3" name="Datumsplatzhalter 2"/>
+          <p:cNvSpPr>
+            <a:spLocks noGrp="1"/>
+          </p:cNvSpPr>
+          <p:nvPr>
+            <p:ph type="dt" sz="half" idx="10"/>
+          </p:nvPr>
+        </p:nvSpPr>
+        <p:spPr/>
+        <p:txBody>
+          <a:bodyPr/>
+          <a:lstStyle/>
+          <a:p>
+            <a:r>
+              <a:rPr lang="de-DE" smtClean="0"/>
+              <a:t>04.11.11</a:t>
+            </a:r>
+            <a:endParaRPr lang="en-US"/>
+          </a:p>
+        </p:txBody>
+      </p:sp>
+      <p:sp>
+        <p:nvSpPr>
+          <p:cNvPr id="4" name="Fußzeilenplatzhalter 3"/>
+          <p:cNvSpPr>
+            <a:spLocks noGrp="1"/>
+          </p:cNvSpPr>
+          <p:nvPr>
+            <p:ph type="ftr" sz="quarter" idx="11"/>
+          </p:nvPr>
+        </p:nvSpPr>
+        <p:spPr/>
+        <p:txBody>
+          <a:bodyPr/>
+          <a:lstStyle/>
+          <a:p>
+            <a:r>
+              <a:rPr lang="de-DE" smtClean="0"/>
+              <a:t>Star Greg</a:t>
+            </a:r>
+            <a:endParaRPr lang="en-US"/>
+          </a:p>
+        </p:txBody>
+      </p:sp>
+      <p:sp>
+        <p:nvSpPr>
+          <p:cNvPr id="5" name="Foliennummernplatzhalter 4"/>
+          <p:cNvSpPr>
+            <a:spLocks noGrp="1"/>
+          </p:cNvSpPr>
+          <p:nvPr>
+            <p:ph type="sldNum" sz="quarter" idx="12"/>
+          </p:nvPr>
+        </p:nvSpPr>
+        <p:spPr/>
+        <p:txBody>
+          <a:bodyPr/>
+          <a:lstStyle/>
+          <a:p>
+            <a:fld id="{4A822907-8A9D-4F6B-98F6-913902AD56B5}" type="slidenum">
+              <a:rPr lang="en-US" smtClean="0"/>
+              <a:t>15</a:t>
+            </a:fld>
+            <a:endParaRPr lang="en-US"/>
+          </a:p>
+        </p:txBody>
+      </p:sp>
+    </p:spTree>
+    <p:extLst>
+      <p:ext uri="{BB962C8B-B14F-4D97-AF65-F5344CB8AC3E}">
+        <p14:creationId xmlns:p14="http://schemas.microsoft.com/office/powerpoint/2010/main" val="2161015239"/>
+      </p:ext>
+    </p:extLst>
+  </p:cSld>
+  <p:clrMapOvr>
+    <a:masterClrMapping/>
+  </p:clrMapOvr>
+</p:sld>
+</file>
+
 <file path=ppt/slides/slide2.xml><?xml version="1.0" encoding="utf-8"?>
 <p:sld xmlns:a="http://schemas.openxmlformats.org/drawingml/2006/main" xmlns:r="http://schemas.openxmlformats.org/officeDocument/2006/relationships" xmlns:p="http://schemas.openxmlformats.org/presentationml/2006/main">
   <p:cSld>
@@ -8835,7 +9704,15 @@
                   <a:srgbClr val="E4C402"/>
                 </a:solidFill>
               </a:rPr>
-              <a:t> Case</a:t>
+              <a:t> </a:t>
+            </a:r>
+            <a:r>
+              <a:rPr lang="de-DE" dirty="0" smtClean="0">
+                <a:solidFill>
+                  <a:srgbClr val="E4C402"/>
+                </a:solidFill>
+              </a:rPr>
+              <a:t>Case Diagramm</a:t>
             </a:r>
             <a:endParaRPr lang="de-DE" dirty="0">
               <a:solidFill>
@@ -8959,18 +9836,54 @@
           <a:bodyPr/>
           <a:lstStyle/>
           <a:p>
-            <a:endParaRPr lang="de-DE"/>
-          </a:p>
-        </p:txBody>
-      </p:sp>
-      <p:sp>
-        <p:nvSpPr>
-          <p:cNvPr id="3" name="Inhaltsplatzhalter 2"/>
-          <p:cNvSpPr>
-            <a:spLocks noGrp="1"/>
-          </p:cNvSpPr>
-          <p:nvPr>
-            <p:ph sz="half" idx="1"/>
+            <a:r>
+              <a:rPr lang="de-DE" dirty="0" err="1" smtClean="0"/>
+              <a:t>Use</a:t>
+            </a:r>
+            <a:r>
+              <a:rPr lang="de-DE" dirty="0" smtClean="0"/>
+              <a:t> Case Diagramm</a:t>
+            </a:r>
+            <a:endParaRPr lang="de-DE" dirty="0"/>
+          </a:p>
+        </p:txBody>
+      </p:sp>
+      <p:pic>
+        <p:nvPicPr>
+          <p:cNvPr id="7" name="Inhaltsplatzhalter 6" descr="Screeny Shot 03.11.2011 13.09.08.png"/>
+          <p:cNvPicPr>
+            <a:picLocks noGrp="1" noChangeAspect="1"/>
+          </p:cNvPicPr>
+          <p:nvPr>
+            <p:ph idx="1"/>
+          </p:nvPr>
+        </p:nvPicPr>
+        <p:blipFill rotWithShape="1">
+          <a:blip r:embed="rId2">
+            <a:extLst>
+              <a:ext uri="{28A0092B-C50C-407E-A947-70E740481C1C}">
+                <a14:useLocalDpi xmlns:a14="http://schemas.microsoft.com/office/drawing/2010/main" val="0"/>
+              </a:ext>
+            </a:extLst>
+          </a:blip>
+          <a:srcRect l="-586" r="-404"/>
+          <a:stretch/>
+        </p:blipFill>
+        <p:spPr>
+          <a:xfrm>
+            <a:off x="1276324" y="2038256"/>
+            <a:ext cx="6333516" cy="4612099"/>
+          </a:xfrm>
+        </p:spPr>
+      </p:pic>
+      <p:sp>
+        <p:nvSpPr>
+          <p:cNvPr id="4" name="Datumsplatzhalter 3"/>
+          <p:cNvSpPr>
+            <a:spLocks noGrp="1"/>
+          </p:cNvSpPr>
+          <p:nvPr>
+            <p:ph type="dt" sz="half" idx="10"/>
           </p:nvPr>
         </p:nvSpPr>
         <p:spPr/>
@@ -8978,18 +9891,22 @@
           <a:bodyPr/>
           <a:lstStyle/>
           <a:p>
-            <a:endParaRPr lang="de-DE"/>
-          </a:p>
-        </p:txBody>
-      </p:sp>
-      <p:sp>
-        <p:nvSpPr>
-          <p:cNvPr id="4" name="Inhaltsplatzhalter 3"/>
-          <p:cNvSpPr>
-            <a:spLocks noGrp="1"/>
-          </p:cNvSpPr>
-          <p:nvPr>
-            <p:ph sz="half" idx="2"/>
+            <a:r>
+              <a:rPr lang="de-DE" smtClean="0"/>
+              <a:t>04.11.11</a:t>
+            </a:r>
+            <a:endParaRPr lang="en-US"/>
+          </a:p>
+        </p:txBody>
+      </p:sp>
+      <p:sp>
+        <p:nvSpPr>
+          <p:cNvPr id="5" name="Fußzeilenplatzhalter 4"/>
+          <p:cNvSpPr>
+            <a:spLocks noGrp="1"/>
+          </p:cNvSpPr>
+          <p:nvPr>
+            <p:ph type="ftr" sz="quarter" idx="11"/>
           </p:nvPr>
         </p:nvSpPr>
         <p:spPr/>
@@ -8997,28 +9914,9 @@
           <a:bodyPr/>
           <a:lstStyle/>
           <a:p>
-            <a:endParaRPr lang="de-DE"/>
-          </a:p>
-        </p:txBody>
-      </p:sp>
-      <p:sp>
-        <p:nvSpPr>
-          <p:cNvPr id="5" name="Datumsplatzhalter 4"/>
-          <p:cNvSpPr>
-            <a:spLocks noGrp="1"/>
-          </p:cNvSpPr>
-          <p:nvPr>
-            <p:ph type="dt" sz="half" idx="10"/>
-          </p:nvPr>
-        </p:nvSpPr>
-        <p:spPr/>
-        <p:txBody>
-          <a:bodyPr/>
-          <a:lstStyle/>
-          <a:p>
-            <a:r>
-              <a:rPr lang="de-DE" smtClean="0"/>
-              <a:t>04.11.11</a:t>
+            <a:r>
+              <a:rPr lang="de-DE" smtClean="0"/>
+              <a:t>Star Greg</a:t>
             </a:r>
             <a:endParaRPr lang="en-US"/>
           </a:p>
@@ -9026,30 +9924,7 @@
       </p:sp>
       <p:sp>
         <p:nvSpPr>
-          <p:cNvPr id="6" name="Fußzeilenplatzhalter 5"/>
-          <p:cNvSpPr>
-            <a:spLocks noGrp="1"/>
-          </p:cNvSpPr>
-          <p:nvPr>
-            <p:ph type="ftr" sz="quarter" idx="11"/>
-          </p:nvPr>
-        </p:nvSpPr>
-        <p:spPr/>
-        <p:txBody>
-          <a:bodyPr/>
-          <a:lstStyle/>
-          <a:p>
-            <a:r>
-              <a:rPr lang="de-DE" smtClean="0"/>
-              <a:t>Star Greg</a:t>
-            </a:r>
-            <a:endParaRPr lang="en-US"/>
-          </a:p>
-        </p:txBody>
-      </p:sp>
-      <p:sp>
-        <p:nvSpPr>
-          <p:cNvPr id="7" name="Foliennummernplatzhalter 6"/>
+          <p:cNvPr id="6" name="Foliennummernplatzhalter 5"/>
           <p:cNvSpPr>
             <a:spLocks noGrp="1"/>
           </p:cNvSpPr>
@@ -9073,13 +9948,20 @@
     </p:spTree>
     <p:extLst>
       <p:ext uri="{BB962C8B-B14F-4D97-AF65-F5344CB8AC3E}">
-        <p14:creationId xmlns:p14="http://schemas.microsoft.com/office/powerpoint/2010/main" val="39829115"/>
+        <p14:creationId xmlns:p14="http://schemas.microsoft.com/office/powerpoint/2010/main" val="1286755677"/>
       </p:ext>
     </p:extLst>
   </p:cSld>
   <p:clrMapOvr>
     <a:masterClrMapping/>
   </p:clrMapOvr>
+  <p:timing>
+    <p:tnLst>
+      <p:par>
+        <p:cTn xmlns:p14="http://schemas.microsoft.com/office/powerpoint/2010/main" id="1" dur="indefinite" restart="never" nodeType="tmRoot"/>
+      </p:par>
+    </p:tnLst>
+  </p:timing>
 </p:sld>
 </file>
 
@@ -9116,24 +9998,48 @@
           <a:lstStyle/>
           <a:p>
             <a:r>
-              <a:rPr lang="de-DE" dirty="0" smtClean="0">
-                <a:solidFill>
-                  <a:srgbClr val="E4C402"/>
-                </a:solidFill>
-              </a:rPr>
-              <a:t>Implementierung</a:t>
-            </a:r>
-            <a:endParaRPr lang="de-DE" dirty="0">
-              <a:solidFill>
-                <a:srgbClr val="E4C402"/>
-              </a:solidFill>
-            </a:endParaRPr>
-          </a:p>
-        </p:txBody>
-      </p:sp>
-      <p:sp>
-        <p:nvSpPr>
-          <p:cNvPr id="3" name="Datumsplatzhalter 2"/>
+              <a:rPr lang="de-DE" dirty="0" err="1" smtClean="0"/>
+              <a:t>Use</a:t>
+            </a:r>
+            <a:r>
+              <a:rPr lang="de-DE" dirty="0" smtClean="0"/>
+              <a:t> Case Diagramm</a:t>
+            </a:r>
+            <a:endParaRPr lang="de-DE" dirty="0"/>
+          </a:p>
+        </p:txBody>
+      </p:sp>
+      <p:pic>
+        <p:nvPicPr>
+          <p:cNvPr id="7" name="Inhaltsplatzhalter 6" descr="Screeny Shot 03.11.2011 13.09.08.png"/>
+          <p:cNvPicPr>
+            <a:picLocks noGrp="1" noChangeAspect="1"/>
+          </p:cNvPicPr>
+          <p:nvPr>
+            <p:ph idx="1"/>
+          </p:nvPr>
+        </p:nvPicPr>
+        <p:blipFill rotWithShape="1">
+          <a:blip r:embed="rId2">
+            <a:extLst>
+              <a:ext uri="{28A0092B-C50C-407E-A947-70E740481C1C}">
+                <a14:useLocalDpi xmlns:a14="http://schemas.microsoft.com/office/drawing/2010/main" val="0"/>
+              </a:ext>
+            </a:extLst>
+          </a:blip>
+          <a:srcRect l="-586" r="-404" b="60704"/>
+          <a:stretch/>
+        </p:blipFill>
+        <p:spPr>
+          <a:xfrm>
+            <a:off x="130459" y="2586896"/>
+            <a:ext cx="8659435" cy="2513424"/>
+          </a:xfrm>
+        </p:spPr>
+      </p:pic>
+      <p:sp>
+        <p:nvSpPr>
+          <p:cNvPr id="4" name="Datumsplatzhalter 3"/>
           <p:cNvSpPr>
             <a:spLocks noGrp="1"/>
           </p:cNvSpPr>
@@ -9156,7 +10062,7 @@
       </p:sp>
       <p:sp>
         <p:nvSpPr>
-          <p:cNvPr id="4" name="Fußzeilenplatzhalter 3"/>
+          <p:cNvPr id="5" name="Fußzeilenplatzhalter 4"/>
           <p:cNvSpPr>
             <a:spLocks noGrp="1"/>
           </p:cNvSpPr>
@@ -9179,7 +10085,7 @@
       </p:sp>
       <p:sp>
         <p:nvSpPr>
-          <p:cNvPr id="5" name="Foliennummernplatzhalter 4"/>
+          <p:cNvPr id="6" name="Foliennummernplatzhalter 5"/>
           <p:cNvSpPr>
             <a:spLocks noGrp="1"/>
           </p:cNvSpPr>
@@ -9200,16 +10106,159 @@
           </a:p>
         </p:txBody>
       </p:sp>
+      <p:grpSp>
+        <p:nvGrpSpPr>
+          <p:cNvPr id="17" name="Gruppierung 16"/>
+          <p:cNvGrpSpPr/>
+          <p:nvPr/>
+        </p:nvGrpSpPr>
+        <p:grpSpPr>
+          <a:xfrm>
+            <a:off x="1036320" y="4018280"/>
+            <a:ext cx="7677374" cy="1082040"/>
+            <a:chOff x="1036320" y="4018280"/>
+            <a:chExt cx="7677374" cy="1082040"/>
+          </a:xfrm>
+        </p:grpSpPr>
+        <p:sp>
+          <p:nvSpPr>
+            <p:cNvPr id="11" name="Rechteck 10"/>
+            <p:cNvSpPr/>
+            <p:nvPr/>
+          </p:nvSpPr>
+          <p:spPr>
+            <a:xfrm>
+              <a:off x="1310640" y="4378960"/>
+              <a:ext cx="7274560" cy="721360"/>
+            </a:xfrm>
+            <a:prstGeom prst="rect">
+              <a:avLst/>
+            </a:prstGeom>
+            <a:ln>
+              <a:solidFill>
+                <a:schemeClr val="bg1"/>
+              </a:solidFill>
+            </a:ln>
+          </p:spPr>
+          <p:style>
+            <a:lnRef idx="2">
+              <a:schemeClr val="accent6"/>
+            </a:lnRef>
+            <a:fillRef idx="1">
+              <a:schemeClr val="lt1"/>
+            </a:fillRef>
+            <a:effectRef idx="0">
+              <a:schemeClr val="accent6"/>
+            </a:effectRef>
+            <a:fontRef idx="minor">
+              <a:schemeClr val="dk1"/>
+            </a:fontRef>
+          </p:style>
+          <p:txBody>
+            <a:bodyPr rtlCol="0" anchor="ctr"/>
+            <a:lstStyle/>
+            <a:p>
+              <a:pPr algn="ctr"/>
+              <a:endParaRPr lang="de-DE"/>
+            </a:p>
+          </p:txBody>
+        </p:sp>
+        <p:sp>
+          <p:nvSpPr>
+            <p:cNvPr id="12" name="Rechteck 11"/>
+            <p:cNvSpPr/>
+            <p:nvPr/>
+          </p:nvSpPr>
+          <p:spPr>
+            <a:xfrm>
+              <a:off x="4216400" y="4018280"/>
+              <a:ext cx="1727200" cy="721360"/>
+            </a:xfrm>
+            <a:prstGeom prst="rect">
+              <a:avLst/>
+            </a:prstGeom>
+            <a:ln>
+              <a:solidFill>
+                <a:schemeClr val="bg1"/>
+              </a:solidFill>
+            </a:ln>
+          </p:spPr>
+          <p:style>
+            <a:lnRef idx="2">
+              <a:schemeClr val="accent6"/>
+            </a:lnRef>
+            <a:fillRef idx="1">
+              <a:schemeClr val="lt1"/>
+            </a:fillRef>
+            <a:effectRef idx="0">
+              <a:schemeClr val="accent6"/>
+            </a:effectRef>
+            <a:fontRef idx="minor">
+              <a:schemeClr val="dk1"/>
+            </a:fontRef>
+          </p:style>
+          <p:txBody>
+            <a:bodyPr rtlCol="0" anchor="ctr"/>
+            <a:lstStyle/>
+            <a:p>
+              <a:pPr algn="ctr"/>
+              <a:endParaRPr lang="de-DE"/>
+            </a:p>
+          </p:txBody>
+        </p:sp>
+        <p:cxnSp>
+          <p:nvCxnSpPr>
+            <p:cNvPr id="14" name="Gerade Verbindung 13"/>
+            <p:cNvCxnSpPr/>
+            <p:nvPr/>
+          </p:nvCxnSpPr>
+          <p:spPr>
+            <a:xfrm>
+              <a:off x="1036320" y="5100320"/>
+              <a:ext cx="7677374" cy="0"/>
+            </a:xfrm>
+            <a:prstGeom prst="line">
+              <a:avLst/>
+            </a:prstGeom>
+            <a:ln w="0">
+              <a:solidFill>
+                <a:schemeClr val="tx1"/>
+              </a:solidFill>
+            </a:ln>
+          </p:spPr>
+          <p:style>
+            <a:lnRef idx="2">
+              <a:schemeClr val="accent1"/>
+            </a:lnRef>
+            <a:fillRef idx="0">
+              <a:schemeClr val="accent1"/>
+            </a:fillRef>
+            <a:effectRef idx="1">
+              <a:schemeClr val="accent1"/>
+            </a:effectRef>
+            <a:fontRef idx="minor">
+              <a:schemeClr val="tx1"/>
+            </a:fontRef>
+          </p:style>
+        </p:cxnSp>
+      </p:grpSp>
     </p:spTree>
     <p:extLst>
       <p:ext uri="{BB962C8B-B14F-4D97-AF65-F5344CB8AC3E}">
-        <p14:creationId xmlns:p14="http://schemas.microsoft.com/office/powerpoint/2010/main" val="2161015239"/>
+        <p14:creationId xmlns:p14="http://schemas.microsoft.com/office/powerpoint/2010/main" val="1734862412"/>
       </p:ext>
     </p:extLst>
   </p:cSld>
   <p:clrMapOvr>
     <a:masterClrMapping/>
   </p:clrMapOvr>
+  <p:timing>
+    <p:tnLst>
+      <p:par>
+        <p:cTn xmlns:p14="http://schemas.microsoft.com/office/powerpoint/2010/main" id="1" dur="indefinite" restart="never" nodeType="tmRoot"/>
+      </p:par>
+    </p:tnLst>
+  </p:timing>
 </p:sld>
 </file>
 
@@ -9245,26 +10294,15 @@
           <a:bodyPr/>
           <a:lstStyle/>
           <a:p>
-            <a:endParaRPr lang="de-DE"/>
-          </a:p>
-        </p:txBody>
-      </p:sp>
-      <p:sp>
-        <p:nvSpPr>
-          <p:cNvPr id="3" name="Inhaltsplatzhalter 2"/>
-          <p:cNvSpPr>
-            <a:spLocks noGrp="1"/>
-          </p:cNvSpPr>
-          <p:nvPr>
-            <p:ph idx="1"/>
-          </p:nvPr>
-        </p:nvSpPr>
-        <p:spPr/>
-        <p:txBody>
-          <a:bodyPr/>
-          <a:lstStyle/>
-          <a:p>
-            <a:endParaRPr lang="de-DE"/>
+            <a:r>
+              <a:rPr lang="de-DE" dirty="0" err="1" smtClean="0"/>
+              <a:t>Use</a:t>
+            </a:r>
+            <a:r>
+              <a:rPr lang="de-DE" dirty="0" smtClean="0"/>
+              <a:t> Case Diagramm</a:t>
+            </a:r>
+            <a:endParaRPr lang="de-DE" dirty="0"/>
           </a:p>
         </p:txBody>
       </p:sp>
@@ -9337,16 +10375,207 @@
           </a:p>
         </p:txBody>
       </p:sp>
+      <p:pic>
+        <p:nvPicPr>
+          <p:cNvPr id="13" name="Inhaltsplatzhalter 6" descr="Screeny Shot 03.11.2011 13.09.08.png"/>
+          <p:cNvPicPr>
+            <a:picLocks noGrp="1" noChangeAspect="1"/>
+          </p:cNvPicPr>
+          <p:nvPr>
+            <p:ph idx="1"/>
+          </p:nvPr>
+        </p:nvPicPr>
+        <p:blipFill rotWithShape="1">
+          <a:blip r:embed="rId2">
+            <a:extLst>
+              <a:ext uri="{28A0092B-C50C-407E-A947-70E740481C1C}">
+                <a14:useLocalDpi xmlns:a14="http://schemas.microsoft.com/office/drawing/2010/main" val="0"/>
+              </a:ext>
+            </a:extLst>
+          </a:blip>
+          <a:srcRect l="-586" t="24758" r="-404"/>
+          <a:stretch/>
+        </p:blipFill>
+        <p:spPr>
+          <a:xfrm>
+            <a:off x="579120" y="2174240"/>
+            <a:ext cx="8134574" cy="4476115"/>
+          </a:xfrm>
+        </p:spPr>
+      </p:pic>
+      <p:sp>
+        <p:nvSpPr>
+          <p:cNvPr id="15" name="Rechteck 14"/>
+          <p:cNvSpPr/>
+          <p:nvPr/>
+        </p:nvSpPr>
+        <p:spPr>
+          <a:xfrm>
+            <a:off x="256988" y="2174240"/>
+            <a:ext cx="1480372" cy="812800"/>
+          </a:xfrm>
+          <a:prstGeom prst="rect">
+            <a:avLst/>
+          </a:prstGeom>
+          <a:ln>
+            <a:solidFill>
+              <a:schemeClr val="bg1"/>
+            </a:solidFill>
+          </a:ln>
+        </p:spPr>
+        <p:style>
+          <a:lnRef idx="2">
+            <a:schemeClr val="accent6"/>
+          </a:lnRef>
+          <a:fillRef idx="1">
+            <a:schemeClr val="lt1"/>
+          </a:fillRef>
+          <a:effectRef idx="0">
+            <a:schemeClr val="accent6"/>
+          </a:effectRef>
+          <a:fontRef idx="minor">
+            <a:schemeClr val="dk1"/>
+          </a:fontRef>
+        </p:style>
+        <p:txBody>
+          <a:bodyPr rtlCol="0" anchor="ctr"/>
+          <a:lstStyle/>
+          <a:p>
+            <a:pPr algn="ctr"/>
+            <a:endParaRPr lang="de-DE"/>
+          </a:p>
+        </p:txBody>
+      </p:sp>
+      <p:sp>
+        <p:nvSpPr>
+          <p:cNvPr id="16" name="Rechteck 15"/>
+          <p:cNvSpPr/>
+          <p:nvPr/>
+        </p:nvSpPr>
+        <p:spPr>
+          <a:xfrm>
+            <a:off x="1195294" y="2174240"/>
+            <a:ext cx="1084132" cy="223520"/>
+          </a:xfrm>
+          <a:prstGeom prst="rect">
+            <a:avLst/>
+          </a:prstGeom>
+          <a:ln>
+            <a:solidFill>
+              <a:schemeClr val="bg1"/>
+            </a:solidFill>
+          </a:ln>
+        </p:spPr>
+        <p:style>
+          <a:lnRef idx="2">
+            <a:schemeClr val="accent6"/>
+          </a:lnRef>
+          <a:fillRef idx="1">
+            <a:schemeClr val="lt1"/>
+          </a:fillRef>
+          <a:effectRef idx="0">
+            <a:schemeClr val="accent6"/>
+          </a:effectRef>
+          <a:fontRef idx="minor">
+            <a:schemeClr val="dk1"/>
+          </a:fontRef>
+        </p:style>
+        <p:txBody>
+          <a:bodyPr rtlCol="0" anchor="ctr"/>
+          <a:lstStyle/>
+          <a:p>
+            <a:pPr algn="ctr"/>
+            <a:endParaRPr lang="de-DE"/>
+          </a:p>
+        </p:txBody>
+      </p:sp>
+      <p:cxnSp>
+        <p:nvCxnSpPr>
+          <p:cNvPr id="18" name="Gerade Verbindung 17"/>
+          <p:cNvCxnSpPr/>
+          <p:nvPr/>
+        </p:nvCxnSpPr>
+        <p:spPr>
+          <a:xfrm>
+            <a:off x="1422400" y="2174240"/>
+            <a:ext cx="7210014" cy="0"/>
+          </a:xfrm>
+          <a:prstGeom prst="line">
+            <a:avLst/>
+          </a:prstGeom>
+          <a:ln w="0">
+            <a:solidFill>
+              <a:schemeClr val="tx1"/>
+            </a:solidFill>
+          </a:ln>
+        </p:spPr>
+        <p:style>
+          <a:lnRef idx="2">
+            <a:schemeClr val="accent1"/>
+          </a:lnRef>
+          <a:fillRef idx="0">
+            <a:schemeClr val="accent1"/>
+          </a:fillRef>
+          <a:effectRef idx="1">
+            <a:schemeClr val="accent1"/>
+          </a:effectRef>
+          <a:fontRef idx="minor">
+            <a:schemeClr val="tx1"/>
+          </a:fontRef>
+        </p:style>
+      </p:cxnSp>
+      <p:cxnSp>
+        <p:nvCxnSpPr>
+          <p:cNvPr id="19" name="Gerade Verbindung 18"/>
+          <p:cNvCxnSpPr/>
+          <p:nvPr/>
+        </p:nvCxnSpPr>
+        <p:spPr>
+          <a:xfrm>
+            <a:off x="1422400" y="2174240"/>
+            <a:ext cx="0" cy="848963"/>
+          </a:xfrm>
+          <a:prstGeom prst="line">
+            <a:avLst/>
+          </a:prstGeom>
+          <a:ln w="0">
+            <a:solidFill>
+              <a:schemeClr val="tx1"/>
+            </a:solidFill>
+          </a:ln>
+        </p:spPr>
+        <p:style>
+          <a:lnRef idx="2">
+            <a:schemeClr val="accent1"/>
+          </a:lnRef>
+          <a:fillRef idx="0">
+            <a:schemeClr val="accent1"/>
+          </a:fillRef>
+          <a:effectRef idx="1">
+            <a:schemeClr val="accent1"/>
+          </a:effectRef>
+          <a:fontRef idx="minor">
+            <a:schemeClr val="tx1"/>
+          </a:fontRef>
+        </p:style>
+      </p:cxnSp>
     </p:spTree>
     <p:extLst>
       <p:ext uri="{BB962C8B-B14F-4D97-AF65-F5344CB8AC3E}">
-        <p14:creationId xmlns:p14="http://schemas.microsoft.com/office/powerpoint/2010/main" val="296993480"/>
+        <p14:creationId xmlns:p14="http://schemas.microsoft.com/office/powerpoint/2010/main" val="2294136572"/>
       </p:ext>
     </p:extLst>
   </p:cSld>
   <p:clrMapOvr>
     <a:masterClrMapping/>
   </p:clrMapOvr>
+  <p:timing>
+    <p:tnLst>
+      <p:par>
+        <p:cTn xmlns:p14="http://schemas.microsoft.com/office/powerpoint/2010/main" id="1" dur="indefinite" restart="never" nodeType="tmRoot"/>
+      </p:par>
+    </p:tnLst>
+  </p:timing>
 </p:sld>
 </file>
 
@@ -9383,12 +10612,12 @@
           <a:lstStyle/>
           <a:p>
             <a:r>
-              <a:rPr lang="de-DE" dirty="0" smtClean="0">
+              <a:rPr lang="de-DE" dirty="0" err="1" smtClean="0">
                 <a:solidFill>
                   <a:srgbClr val="E4C402"/>
                 </a:solidFill>
               </a:rPr>
-              <a:t>Vielen Dank für Eure Aufmerksamkeit!</a:t>
+              <a:t>Mockups</a:t>
             </a:r>
             <a:endParaRPr lang="de-DE" dirty="0">
               <a:solidFill>
@@ -9470,7 +10699,7 @@
     </p:spTree>
     <p:extLst>
       <p:ext uri="{BB962C8B-B14F-4D97-AF65-F5344CB8AC3E}">
-        <p14:creationId xmlns:p14="http://schemas.microsoft.com/office/powerpoint/2010/main" val="2161015239"/>
+        <p14:creationId xmlns:p14="http://schemas.microsoft.com/office/powerpoint/2010/main" val="1317621908"/>
       </p:ext>
     </p:extLst>
   </p:cSld>

</xml_diff>

<commit_message>
Julias Aenderungen an Praesentation
</commit_message>
<xml_diff>
--- a/70 Praesentation/30 StarGreg Julia.pptx
+++ b/70 Praesentation/30 StarGreg Julia.pptx
@@ -1009,6 +1009,886 @@
 </file>
 
 <file path=ppt/diagrams/colors2.xml><?xml version="1.0" encoding="utf-8"?>
+<dgm:colorsDef xmlns:dgm="http://schemas.openxmlformats.org/drawingml/2006/diagram" xmlns:a="http://schemas.openxmlformats.org/drawingml/2006/main" uniqueId="urn:microsoft.com/office/officeart/2005/8/colors/accent3_5">
+  <dgm:title val=""/>
+  <dgm:desc val=""/>
+  <dgm:catLst>
+    <dgm:cat type="accent3" pri="11500"/>
+  </dgm:catLst>
+  <dgm:styleLbl name="node0">
+    <dgm:fillClrLst meth="cycle">
+      <a:schemeClr val="accent3">
+        <a:alpha val="80000"/>
+      </a:schemeClr>
+    </dgm:fillClrLst>
+    <dgm:linClrLst meth="repeat">
+      <a:schemeClr val="lt1"/>
+    </dgm:linClrLst>
+    <dgm:effectClrLst/>
+    <dgm:txLinClrLst/>
+    <dgm:txFillClrLst/>
+    <dgm:txEffectClrLst/>
+  </dgm:styleLbl>
+  <dgm:styleLbl name="node1">
+    <dgm:fillClrLst>
+      <a:schemeClr val="accent3">
+        <a:alpha val="90000"/>
+      </a:schemeClr>
+      <a:schemeClr val="accent3">
+        <a:alpha val="50000"/>
+      </a:schemeClr>
+    </dgm:fillClrLst>
+    <dgm:linClrLst meth="repeat">
+      <a:schemeClr val="lt1"/>
+    </dgm:linClrLst>
+    <dgm:effectClrLst/>
+    <dgm:txLinClrLst/>
+    <dgm:txFillClrLst/>
+    <dgm:txEffectClrLst/>
+  </dgm:styleLbl>
+  <dgm:styleLbl name="alignNode1">
+    <dgm:fillClrLst>
+      <a:schemeClr val="accent3">
+        <a:alpha val="90000"/>
+      </a:schemeClr>
+      <a:schemeClr val="accent3">
+        <a:alpha val="50000"/>
+      </a:schemeClr>
+    </dgm:fillClrLst>
+    <dgm:linClrLst>
+      <a:schemeClr val="accent3">
+        <a:alpha val="90000"/>
+      </a:schemeClr>
+      <a:schemeClr val="accent3">
+        <a:alpha val="50000"/>
+      </a:schemeClr>
+    </dgm:linClrLst>
+    <dgm:effectClrLst/>
+    <dgm:txLinClrLst/>
+    <dgm:txFillClrLst/>
+    <dgm:txEffectClrLst/>
+  </dgm:styleLbl>
+  <dgm:styleLbl name="lnNode1">
+    <dgm:fillClrLst>
+      <a:schemeClr val="accent3">
+        <a:shade val="90000"/>
+      </a:schemeClr>
+      <a:schemeClr val="accent3">
+        <a:alpha val="50000"/>
+        <a:tint val="50000"/>
+      </a:schemeClr>
+    </dgm:fillClrLst>
+    <dgm:linClrLst meth="repeat">
+      <a:schemeClr val="lt1"/>
+    </dgm:linClrLst>
+    <dgm:effectClrLst/>
+    <dgm:txLinClrLst/>
+    <dgm:txFillClrLst/>
+    <dgm:txEffectClrLst/>
+  </dgm:styleLbl>
+  <dgm:styleLbl name="vennNode1">
+    <dgm:fillClrLst>
+      <a:schemeClr val="accent3">
+        <a:shade val="80000"/>
+        <a:alpha val="50000"/>
+      </a:schemeClr>
+      <a:schemeClr val="accent3">
+        <a:alpha val="80000"/>
+      </a:schemeClr>
+    </dgm:fillClrLst>
+    <dgm:linClrLst meth="repeat">
+      <a:schemeClr val="lt1"/>
+    </dgm:linClrLst>
+    <dgm:effectClrLst/>
+    <dgm:txLinClrLst/>
+    <dgm:txFillClrLst/>
+    <dgm:txEffectClrLst/>
+  </dgm:styleLbl>
+  <dgm:styleLbl name="node2">
+    <dgm:fillClrLst>
+      <a:schemeClr val="accent3">
+        <a:alpha val="70000"/>
+      </a:schemeClr>
+    </dgm:fillClrLst>
+    <dgm:linClrLst meth="repeat">
+      <a:schemeClr val="lt1"/>
+    </dgm:linClrLst>
+    <dgm:effectClrLst/>
+    <dgm:txLinClrLst/>
+    <dgm:txFillClrLst/>
+    <dgm:txEffectClrLst/>
+  </dgm:styleLbl>
+  <dgm:styleLbl name="node3">
+    <dgm:fillClrLst>
+      <a:schemeClr val="accent3">
+        <a:alpha val="50000"/>
+      </a:schemeClr>
+    </dgm:fillClrLst>
+    <dgm:linClrLst meth="repeat">
+      <a:schemeClr val="lt1"/>
+    </dgm:linClrLst>
+    <dgm:effectClrLst/>
+    <dgm:txLinClrLst/>
+    <dgm:txFillClrLst/>
+    <dgm:txEffectClrLst/>
+  </dgm:styleLbl>
+  <dgm:styleLbl name="node4">
+    <dgm:fillClrLst>
+      <a:schemeClr val="accent3">
+        <a:alpha val="30000"/>
+      </a:schemeClr>
+    </dgm:fillClrLst>
+    <dgm:linClrLst meth="repeat">
+      <a:schemeClr val="lt1"/>
+    </dgm:linClrLst>
+    <dgm:effectClrLst/>
+    <dgm:txLinClrLst/>
+    <dgm:txFillClrLst/>
+    <dgm:txEffectClrLst/>
+  </dgm:styleLbl>
+  <dgm:styleLbl name="fgImgPlace1">
+    <dgm:fillClrLst>
+      <a:schemeClr val="accent3">
+        <a:tint val="50000"/>
+        <a:alpha val="90000"/>
+      </a:schemeClr>
+      <a:schemeClr val="accent3">
+        <a:tint val="20000"/>
+        <a:alpha val="50000"/>
+      </a:schemeClr>
+    </dgm:fillClrLst>
+    <dgm:linClrLst meth="repeat">
+      <a:schemeClr val="lt1"/>
+    </dgm:linClrLst>
+    <dgm:effectClrLst/>
+    <dgm:txLinClrLst/>
+    <dgm:txFillClrLst meth="repeat">
+      <a:schemeClr val="lt1"/>
+    </dgm:txFillClrLst>
+    <dgm:txEffectClrLst/>
+  </dgm:styleLbl>
+  <dgm:styleLbl name="alignImgPlace1">
+    <dgm:fillClrLst>
+      <a:schemeClr val="accent3">
+        <a:tint val="50000"/>
+      </a:schemeClr>
+      <a:schemeClr val="accent3">
+        <a:tint val="20000"/>
+      </a:schemeClr>
+    </dgm:fillClrLst>
+    <dgm:linClrLst meth="repeat">
+      <a:schemeClr val="lt1"/>
+    </dgm:linClrLst>
+    <dgm:effectClrLst/>
+    <dgm:txLinClrLst/>
+    <dgm:txFillClrLst meth="repeat">
+      <a:schemeClr val="lt1"/>
+    </dgm:txFillClrLst>
+    <dgm:txEffectClrLst/>
+  </dgm:styleLbl>
+  <dgm:styleLbl name="bgImgPlace1">
+    <dgm:fillClrLst>
+      <a:schemeClr val="accent3">
+        <a:tint val="50000"/>
+      </a:schemeClr>
+      <a:schemeClr val="accent3">
+        <a:tint val="20000"/>
+      </a:schemeClr>
+    </dgm:fillClrLst>
+    <dgm:linClrLst meth="repeat">
+      <a:schemeClr val="lt1"/>
+    </dgm:linClrLst>
+    <dgm:effectClrLst/>
+    <dgm:txLinClrLst/>
+    <dgm:txFillClrLst meth="repeat">
+      <a:schemeClr val="lt1"/>
+    </dgm:txFillClrLst>
+    <dgm:txEffectClrLst/>
+  </dgm:styleLbl>
+  <dgm:styleLbl name="sibTrans2D1">
+    <dgm:fillClrLst>
+      <a:schemeClr val="accent3">
+        <a:shade val="90000"/>
+      </a:schemeClr>
+      <a:schemeClr val="accent3">
+        <a:tint val="50000"/>
+      </a:schemeClr>
+    </dgm:fillClrLst>
+    <dgm:linClrLst>
+      <a:schemeClr val="accent3">
+        <a:shade val="90000"/>
+      </a:schemeClr>
+      <a:schemeClr val="accent3">
+        <a:tint val="50000"/>
+      </a:schemeClr>
+    </dgm:linClrLst>
+    <dgm:effectClrLst/>
+    <dgm:txLinClrLst/>
+    <dgm:txFillClrLst/>
+    <dgm:txEffectClrLst/>
+  </dgm:styleLbl>
+  <dgm:styleLbl name="fgSibTrans2D1">
+    <dgm:fillClrLst>
+      <a:schemeClr val="accent3">
+        <a:shade val="90000"/>
+      </a:schemeClr>
+      <a:schemeClr val="accent3">
+        <a:tint val="50000"/>
+      </a:schemeClr>
+    </dgm:fillClrLst>
+    <dgm:linClrLst>
+      <a:schemeClr val="accent3">
+        <a:shade val="90000"/>
+      </a:schemeClr>
+      <a:schemeClr val="accent3">
+        <a:tint val="50000"/>
+      </a:schemeClr>
+    </dgm:linClrLst>
+    <dgm:effectClrLst/>
+    <dgm:txLinClrLst/>
+    <dgm:txFillClrLst/>
+    <dgm:txEffectClrLst/>
+  </dgm:styleLbl>
+  <dgm:styleLbl name="bgSibTrans2D1">
+    <dgm:fillClrLst>
+      <a:schemeClr val="accent3">
+        <a:shade val="90000"/>
+      </a:schemeClr>
+      <a:schemeClr val="accent3">
+        <a:tint val="50000"/>
+      </a:schemeClr>
+    </dgm:fillClrLst>
+    <dgm:linClrLst>
+      <a:schemeClr val="accent3">
+        <a:shade val="90000"/>
+      </a:schemeClr>
+      <a:schemeClr val="accent3">
+        <a:tint val="50000"/>
+      </a:schemeClr>
+    </dgm:linClrLst>
+    <dgm:effectClrLst/>
+    <dgm:txLinClrLst/>
+    <dgm:txFillClrLst/>
+    <dgm:txEffectClrLst/>
+  </dgm:styleLbl>
+  <dgm:styleLbl name="sibTrans1D1">
+    <dgm:fillClrLst>
+      <a:schemeClr val="accent3">
+        <a:shade val="90000"/>
+      </a:schemeClr>
+      <a:schemeClr val="accent3">
+        <a:tint val="50000"/>
+      </a:schemeClr>
+    </dgm:fillClrLst>
+    <dgm:linClrLst>
+      <a:schemeClr val="accent3">
+        <a:shade val="90000"/>
+      </a:schemeClr>
+      <a:schemeClr val="accent3">
+        <a:tint val="50000"/>
+      </a:schemeClr>
+    </dgm:linClrLst>
+    <dgm:effectClrLst/>
+    <dgm:txLinClrLst/>
+    <dgm:txFillClrLst meth="repeat">
+      <a:schemeClr val="tx1"/>
+    </dgm:txFillClrLst>
+    <dgm:txEffectClrLst/>
+  </dgm:styleLbl>
+  <dgm:styleLbl name="callout">
+    <dgm:fillClrLst meth="repeat">
+      <a:schemeClr val="accent3"/>
+    </dgm:fillClrLst>
+    <dgm:linClrLst meth="repeat">
+      <a:schemeClr val="accent3"/>
+    </dgm:linClrLst>
+    <dgm:effectClrLst/>
+    <dgm:txLinClrLst/>
+    <dgm:txFillClrLst meth="repeat">
+      <a:schemeClr val="tx1"/>
+    </dgm:txFillClrLst>
+    <dgm:txEffectClrLst/>
+  </dgm:styleLbl>
+  <dgm:styleLbl name="asst0">
+    <dgm:fillClrLst meth="repeat">
+      <a:schemeClr val="accent3">
+        <a:alpha val="90000"/>
+      </a:schemeClr>
+    </dgm:fillClrLst>
+    <dgm:linClrLst meth="repeat">
+      <a:schemeClr val="lt1"/>
+    </dgm:linClrLst>
+    <dgm:effectClrLst/>
+    <dgm:txLinClrLst/>
+    <dgm:txFillClrLst/>
+    <dgm:txEffectClrLst/>
+  </dgm:styleLbl>
+  <dgm:styleLbl name="asst1">
+    <dgm:fillClrLst meth="repeat">
+      <a:schemeClr val="accent3">
+        <a:alpha val="90000"/>
+      </a:schemeClr>
+    </dgm:fillClrLst>
+    <dgm:linClrLst meth="repeat">
+      <a:schemeClr val="lt1"/>
+    </dgm:linClrLst>
+    <dgm:effectClrLst/>
+    <dgm:txLinClrLst/>
+    <dgm:txFillClrLst/>
+    <dgm:txEffectClrLst/>
+  </dgm:styleLbl>
+  <dgm:styleLbl name="asst2">
+    <dgm:fillClrLst>
+      <a:schemeClr val="accent3">
+        <a:alpha val="90000"/>
+      </a:schemeClr>
+    </dgm:fillClrLst>
+    <dgm:linClrLst meth="repeat">
+      <a:schemeClr val="lt1"/>
+    </dgm:linClrLst>
+    <dgm:effectClrLst/>
+    <dgm:txLinClrLst/>
+    <dgm:txFillClrLst/>
+    <dgm:txEffectClrLst/>
+  </dgm:styleLbl>
+  <dgm:styleLbl name="asst3">
+    <dgm:fillClrLst>
+      <a:schemeClr val="accent3">
+        <a:alpha val="70000"/>
+      </a:schemeClr>
+    </dgm:fillClrLst>
+    <dgm:linClrLst meth="repeat">
+      <a:schemeClr val="lt1"/>
+    </dgm:linClrLst>
+    <dgm:effectClrLst/>
+    <dgm:txLinClrLst/>
+    <dgm:txFillClrLst/>
+    <dgm:txEffectClrLst/>
+  </dgm:styleLbl>
+  <dgm:styleLbl name="asst4">
+    <dgm:fillClrLst>
+      <a:schemeClr val="accent3">
+        <a:alpha val="50000"/>
+      </a:schemeClr>
+    </dgm:fillClrLst>
+    <dgm:linClrLst meth="repeat">
+      <a:schemeClr val="lt1"/>
+    </dgm:linClrLst>
+    <dgm:effectClrLst/>
+    <dgm:txLinClrLst/>
+    <dgm:txFillClrLst/>
+    <dgm:txEffectClrLst/>
+  </dgm:styleLbl>
+  <dgm:styleLbl name="parChTrans2D1">
+    <dgm:fillClrLst meth="repeat">
+      <a:schemeClr val="accent3">
+        <a:shade val="80000"/>
+      </a:schemeClr>
+    </dgm:fillClrLst>
+    <dgm:linClrLst meth="repeat">
+      <a:schemeClr val="accent3">
+        <a:shade val="80000"/>
+      </a:schemeClr>
+    </dgm:linClrLst>
+    <dgm:effectClrLst/>
+    <dgm:txLinClrLst/>
+    <dgm:txFillClrLst/>
+    <dgm:txEffectClrLst/>
+  </dgm:styleLbl>
+  <dgm:styleLbl name="parChTrans2D2">
+    <dgm:fillClrLst meth="repeat">
+      <a:schemeClr val="accent3">
+        <a:tint val="90000"/>
+      </a:schemeClr>
+    </dgm:fillClrLst>
+    <dgm:linClrLst meth="repeat">
+      <a:schemeClr val="accent3">
+        <a:tint val="90000"/>
+      </a:schemeClr>
+    </dgm:linClrLst>
+    <dgm:effectClrLst/>
+    <dgm:txLinClrLst/>
+    <dgm:txFillClrLst/>
+    <dgm:txEffectClrLst/>
+  </dgm:styleLbl>
+  <dgm:styleLbl name="parChTrans2D3">
+    <dgm:fillClrLst meth="repeat">
+      <a:schemeClr val="accent3">
+        <a:tint val="70000"/>
+      </a:schemeClr>
+    </dgm:fillClrLst>
+    <dgm:linClrLst meth="repeat">
+      <a:schemeClr val="accent3">
+        <a:tint val="70000"/>
+      </a:schemeClr>
+    </dgm:linClrLst>
+    <dgm:effectClrLst/>
+    <dgm:txLinClrLst/>
+    <dgm:txFillClrLst/>
+    <dgm:txEffectClrLst/>
+  </dgm:styleLbl>
+  <dgm:styleLbl name="parChTrans2D4">
+    <dgm:fillClrLst meth="repeat">
+      <a:schemeClr val="accent3">
+        <a:tint val="50000"/>
+      </a:schemeClr>
+    </dgm:fillClrLst>
+    <dgm:linClrLst meth="repeat">
+      <a:schemeClr val="accent3">
+        <a:tint val="50000"/>
+      </a:schemeClr>
+    </dgm:linClrLst>
+    <dgm:effectClrLst/>
+    <dgm:txLinClrLst/>
+    <dgm:txFillClrLst meth="repeat">
+      <a:schemeClr val="dk1"/>
+    </dgm:txFillClrLst>
+    <dgm:txEffectClrLst/>
+  </dgm:styleLbl>
+  <dgm:styleLbl name="parChTrans1D1">
+    <dgm:fillClrLst meth="repeat">
+      <a:schemeClr val="accent3">
+        <a:shade val="80000"/>
+      </a:schemeClr>
+    </dgm:fillClrLst>
+    <dgm:linClrLst meth="repeat">
+      <a:schemeClr val="accent3">
+        <a:shade val="80000"/>
+      </a:schemeClr>
+    </dgm:linClrLst>
+    <dgm:effectClrLst/>
+    <dgm:txLinClrLst/>
+    <dgm:txFillClrLst meth="repeat">
+      <a:schemeClr val="tx1"/>
+    </dgm:txFillClrLst>
+    <dgm:txEffectClrLst/>
+  </dgm:styleLbl>
+  <dgm:styleLbl name="parChTrans1D2">
+    <dgm:fillClrLst meth="repeat">
+      <a:schemeClr val="accent3">
+        <a:tint val="90000"/>
+      </a:schemeClr>
+    </dgm:fillClrLst>
+    <dgm:linClrLst meth="repeat">
+      <a:schemeClr val="accent3">
+        <a:tint val="90000"/>
+      </a:schemeClr>
+    </dgm:linClrLst>
+    <dgm:effectClrLst/>
+    <dgm:txLinClrLst/>
+    <dgm:txFillClrLst meth="repeat">
+      <a:schemeClr val="tx1"/>
+    </dgm:txFillClrLst>
+    <dgm:txEffectClrLst/>
+  </dgm:styleLbl>
+  <dgm:styleLbl name="parChTrans1D3">
+    <dgm:fillClrLst meth="repeat">
+      <a:schemeClr val="accent3">
+        <a:tint val="70000"/>
+      </a:schemeClr>
+    </dgm:fillClrLst>
+    <dgm:linClrLst meth="repeat">
+      <a:schemeClr val="accent3">
+        <a:tint val="70000"/>
+      </a:schemeClr>
+    </dgm:linClrLst>
+    <dgm:effectClrLst/>
+    <dgm:txLinClrLst/>
+    <dgm:txFillClrLst meth="repeat">
+      <a:schemeClr val="tx1"/>
+    </dgm:txFillClrLst>
+    <dgm:txEffectClrLst/>
+  </dgm:styleLbl>
+  <dgm:styleLbl name="parChTrans1D4">
+    <dgm:fillClrLst meth="repeat">
+      <a:schemeClr val="accent3">
+        <a:tint val="50000"/>
+      </a:schemeClr>
+    </dgm:fillClrLst>
+    <dgm:linClrLst meth="repeat">
+      <a:schemeClr val="accent3">
+        <a:tint val="50000"/>
+      </a:schemeClr>
+    </dgm:linClrLst>
+    <dgm:effectClrLst/>
+    <dgm:txLinClrLst/>
+    <dgm:txFillClrLst meth="repeat">
+      <a:schemeClr val="tx1"/>
+    </dgm:txFillClrLst>
+    <dgm:txEffectClrLst/>
+  </dgm:styleLbl>
+  <dgm:styleLbl name="fgAcc1">
+    <dgm:fillClrLst meth="repeat">
+      <a:schemeClr val="lt1">
+        <a:alpha val="90000"/>
+      </a:schemeClr>
+    </dgm:fillClrLst>
+    <dgm:linClrLst>
+      <a:schemeClr val="accent3">
+        <a:alpha val="90000"/>
+      </a:schemeClr>
+      <a:schemeClr val="accent3">
+        <a:alpha val="50000"/>
+      </a:schemeClr>
+    </dgm:linClrLst>
+    <dgm:effectClrLst/>
+    <dgm:txLinClrLst/>
+    <dgm:txFillClrLst meth="repeat">
+      <a:schemeClr val="dk1"/>
+    </dgm:txFillClrLst>
+    <dgm:txEffectClrLst/>
+  </dgm:styleLbl>
+  <dgm:styleLbl name="conFgAcc1">
+    <dgm:fillClrLst meth="repeat">
+      <a:schemeClr val="lt1">
+        <a:alpha val="90000"/>
+      </a:schemeClr>
+    </dgm:fillClrLst>
+    <dgm:linClrLst>
+      <a:schemeClr val="accent3">
+        <a:alpha val="90000"/>
+      </a:schemeClr>
+      <a:schemeClr val="accent3">
+        <a:alpha val="50000"/>
+      </a:schemeClr>
+    </dgm:linClrLst>
+    <dgm:effectClrLst/>
+    <dgm:txLinClrLst/>
+    <dgm:txFillClrLst meth="repeat">
+      <a:schemeClr val="dk1"/>
+    </dgm:txFillClrLst>
+    <dgm:txEffectClrLst/>
+  </dgm:styleLbl>
+  <dgm:styleLbl name="alignAcc1">
+    <dgm:fillClrLst meth="repeat">
+      <a:schemeClr val="lt1">
+        <a:alpha val="90000"/>
+      </a:schemeClr>
+    </dgm:fillClrLst>
+    <dgm:linClrLst>
+      <a:schemeClr val="accent3">
+        <a:alpha val="90000"/>
+      </a:schemeClr>
+      <a:schemeClr val="accent3">
+        <a:alpha val="50000"/>
+      </a:schemeClr>
+    </dgm:linClrLst>
+    <dgm:effectClrLst/>
+    <dgm:txLinClrLst/>
+    <dgm:txFillClrLst meth="repeat">
+      <a:schemeClr val="dk1"/>
+    </dgm:txFillClrLst>
+    <dgm:txEffectClrLst/>
+  </dgm:styleLbl>
+  <dgm:styleLbl name="trAlignAcc1">
+    <dgm:fillClrLst meth="repeat">
+      <a:schemeClr val="lt1">
+        <a:alpha val="40000"/>
+      </a:schemeClr>
+    </dgm:fillClrLst>
+    <dgm:linClrLst>
+      <a:schemeClr val="accent3">
+        <a:alpha val="90000"/>
+      </a:schemeClr>
+      <a:schemeClr val="accent3">
+        <a:alpha val="50000"/>
+      </a:schemeClr>
+    </dgm:linClrLst>
+    <dgm:effectClrLst/>
+    <dgm:txLinClrLst/>
+    <dgm:txFillClrLst meth="repeat">
+      <a:schemeClr val="dk1"/>
+    </dgm:txFillClrLst>
+    <dgm:txEffectClrLst/>
+  </dgm:styleLbl>
+  <dgm:styleLbl name="bgAcc1">
+    <dgm:fillClrLst meth="repeat">
+      <a:schemeClr val="lt1">
+        <a:alpha val="90000"/>
+      </a:schemeClr>
+    </dgm:fillClrLst>
+    <dgm:linClrLst>
+      <a:schemeClr val="accent3">
+        <a:alpha val="90000"/>
+      </a:schemeClr>
+      <a:schemeClr val="accent3">
+        <a:alpha val="50000"/>
+      </a:schemeClr>
+    </dgm:linClrLst>
+    <dgm:effectClrLst/>
+    <dgm:txLinClrLst/>
+    <dgm:txFillClrLst meth="repeat">
+      <a:schemeClr val="dk1"/>
+    </dgm:txFillClrLst>
+    <dgm:txEffectClrLst/>
+  </dgm:styleLbl>
+  <dgm:styleLbl name="solidFgAcc1">
+    <dgm:fillClrLst meth="repeat">
+      <a:schemeClr val="lt1"/>
+    </dgm:fillClrLst>
+    <dgm:linClrLst>
+      <a:schemeClr val="accent3">
+        <a:alpha val="90000"/>
+      </a:schemeClr>
+      <a:schemeClr val="accent3">
+        <a:alpha val="50000"/>
+      </a:schemeClr>
+    </dgm:linClrLst>
+    <dgm:effectClrLst/>
+    <dgm:txLinClrLst/>
+    <dgm:txFillClrLst meth="repeat">
+      <a:schemeClr val="dk1"/>
+    </dgm:txFillClrLst>
+    <dgm:txEffectClrLst/>
+  </dgm:styleLbl>
+  <dgm:styleLbl name="solidAlignAcc1">
+    <dgm:fillClrLst meth="repeat">
+      <a:schemeClr val="lt1"/>
+    </dgm:fillClrLst>
+    <dgm:linClrLst meth="repeat">
+      <a:schemeClr val="accent3"/>
+    </dgm:linClrLst>
+    <dgm:effectClrLst/>
+    <dgm:txLinClrLst/>
+    <dgm:txFillClrLst meth="repeat">
+      <a:schemeClr val="dk1"/>
+    </dgm:txFillClrLst>
+    <dgm:txEffectClrLst/>
+  </dgm:styleLbl>
+  <dgm:styleLbl name="solidBgAcc1">
+    <dgm:fillClrLst meth="repeat">
+      <a:schemeClr val="lt1"/>
+    </dgm:fillClrLst>
+    <dgm:linClrLst meth="repeat">
+      <a:schemeClr val="accent3"/>
+    </dgm:linClrLst>
+    <dgm:effectClrLst/>
+    <dgm:txLinClrLst/>
+    <dgm:txFillClrLst meth="repeat">
+      <a:schemeClr val="dk1"/>
+    </dgm:txFillClrLst>
+    <dgm:txEffectClrLst/>
+  </dgm:styleLbl>
+  <dgm:styleLbl name="fgAccFollowNode1">
+    <dgm:fillClrLst>
+      <a:schemeClr val="accent3">
+        <a:alpha val="90000"/>
+        <a:tint val="40000"/>
+      </a:schemeClr>
+      <a:schemeClr val="accent3">
+        <a:alpha val="50000"/>
+        <a:tint val="40000"/>
+      </a:schemeClr>
+    </dgm:fillClrLst>
+    <dgm:linClrLst meth="repeat">
+      <a:schemeClr val="accent3">
+        <a:alpha val="90000"/>
+        <a:tint val="40000"/>
+      </a:schemeClr>
+    </dgm:linClrLst>
+    <dgm:effectClrLst/>
+    <dgm:txLinClrLst/>
+    <dgm:txFillClrLst meth="repeat">
+      <a:schemeClr val="dk1"/>
+    </dgm:txFillClrLst>
+    <dgm:txEffectClrLst/>
+  </dgm:styleLbl>
+  <dgm:styleLbl name="alignAccFollowNode1">
+    <dgm:fillClrLst meth="repeat">
+      <a:schemeClr val="accent3">
+        <a:alpha val="90000"/>
+        <a:tint val="40000"/>
+      </a:schemeClr>
+    </dgm:fillClrLst>
+    <dgm:linClrLst meth="repeat">
+      <a:schemeClr val="accent3">
+        <a:alpha val="90000"/>
+        <a:tint val="40000"/>
+      </a:schemeClr>
+    </dgm:linClrLst>
+    <dgm:effectClrLst/>
+    <dgm:txLinClrLst/>
+    <dgm:txFillClrLst meth="repeat">
+      <a:schemeClr val="dk1"/>
+    </dgm:txFillClrLst>
+    <dgm:txEffectClrLst/>
+  </dgm:styleLbl>
+  <dgm:styleLbl name="bgAccFollowNode1">
+    <dgm:fillClrLst meth="repeat">
+      <a:schemeClr val="accent3">
+        <a:alpha val="90000"/>
+        <a:tint val="40000"/>
+      </a:schemeClr>
+    </dgm:fillClrLst>
+    <dgm:linClrLst meth="repeat">
+      <a:schemeClr val="lt1"/>
+    </dgm:linClrLst>
+    <dgm:effectClrLst/>
+    <dgm:txLinClrLst/>
+    <dgm:txFillClrLst meth="repeat">
+      <a:schemeClr val="dk1"/>
+    </dgm:txFillClrLst>
+    <dgm:txEffectClrLst/>
+  </dgm:styleLbl>
+  <dgm:styleLbl name="fgAcc0">
+    <dgm:fillClrLst meth="repeat">
+      <a:schemeClr val="lt1">
+        <a:alpha val="90000"/>
+      </a:schemeClr>
+    </dgm:fillClrLst>
+    <dgm:linClrLst meth="repeat">
+      <a:schemeClr val="accent3">
+        <a:shade val="80000"/>
+      </a:schemeClr>
+    </dgm:linClrLst>
+    <dgm:effectClrLst/>
+    <dgm:txLinClrLst/>
+    <dgm:txFillClrLst meth="repeat">
+      <a:schemeClr val="dk1"/>
+    </dgm:txFillClrLst>
+    <dgm:txEffectClrLst/>
+  </dgm:styleLbl>
+  <dgm:styleLbl name="fgAcc2">
+    <dgm:fillClrLst meth="repeat">
+      <a:schemeClr val="lt1">
+        <a:alpha val="90000"/>
+      </a:schemeClr>
+    </dgm:fillClrLst>
+    <dgm:linClrLst meth="repeat">
+      <a:schemeClr val="accent3">
+        <a:tint val="90000"/>
+      </a:schemeClr>
+    </dgm:linClrLst>
+    <dgm:effectClrLst/>
+    <dgm:txLinClrLst/>
+    <dgm:txFillClrLst meth="repeat">
+      <a:schemeClr val="dk1"/>
+    </dgm:txFillClrLst>
+    <dgm:txEffectClrLst/>
+  </dgm:styleLbl>
+  <dgm:styleLbl name="fgAcc3">
+    <dgm:fillClrLst meth="repeat">
+      <a:schemeClr val="lt1">
+        <a:alpha val="90000"/>
+      </a:schemeClr>
+    </dgm:fillClrLst>
+    <dgm:linClrLst meth="repeat">
+      <a:schemeClr val="accent3">
+        <a:tint val="70000"/>
+      </a:schemeClr>
+    </dgm:linClrLst>
+    <dgm:effectClrLst/>
+    <dgm:txLinClrLst/>
+    <dgm:txFillClrLst meth="repeat">
+      <a:schemeClr val="dk1"/>
+    </dgm:txFillClrLst>
+    <dgm:txEffectClrLst/>
+  </dgm:styleLbl>
+  <dgm:styleLbl name="fgAcc4">
+    <dgm:fillClrLst meth="repeat">
+      <a:schemeClr val="lt1">
+        <a:alpha val="90000"/>
+      </a:schemeClr>
+    </dgm:fillClrLst>
+    <dgm:linClrLst meth="repeat">
+      <a:schemeClr val="accent3">
+        <a:tint val="50000"/>
+      </a:schemeClr>
+    </dgm:linClrLst>
+    <dgm:effectClrLst/>
+    <dgm:txLinClrLst/>
+    <dgm:txFillClrLst meth="repeat">
+      <a:schemeClr val="dk1"/>
+    </dgm:txFillClrLst>
+    <dgm:txEffectClrLst/>
+  </dgm:styleLbl>
+  <dgm:styleLbl name="bgShp">
+    <dgm:fillClrLst meth="repeat">
+      <a:schemeClr val="accent3">
+        <a:tint val="40000"/>
+      </a:schemeClr>
+    </dgm:fillClrLst>
+    <dgm:linClrLst meth="repeat">
+      <a:schemeClr val="dk1"/>
+    </dgm:linClrLst>
+    <dgm:effectClrLst/>
+    <dgm:txLinClrLst/>
+    <dgm:txFillClrLst meth="repeat">
+      <a:schemeClr val="dk1"/>
+    </dgm:txFillClrLst>
+    <dgm:txEffectClrLst/>
+  </dgm:styleLbl>
+  <dgm:styleLbl name="dkBgShp">
+    <dgm:fillClrLst meth="repeat">
+      <a:schemeClr val="accent3">
+        <a:shade val="90000"/>
+      </a:schemeClr>
+    </dgm:fillClrLst>
+    <dgm:linClrLst meth="repeat">
+      <a:schemeClr val="dk1"/>
+    </dgm:linClrLst>
+    <dgm:effectClrLst/>
+    <dgm:txLinClrLst/>
+    <dgm:txFillClrLst meth="repeat">
+      <a:schemeClr val="lt1"/>
+    </dgm:txFillClrLst>
+    <dgm:txEffectClrLst/>
+  </dgm:styleLbl>
+  <dgm:styleLbl name="trBgShp">
+    <dgm:fillClrLst meth="repeat">
+      <a:schemeClr val="accent3">
+        <a:tint val="50000"/>
+        <a:alpha val="40000"/>
+      </a:schemeClr>
+    </dgm:fillClrLst>
+    <dgm:linClrLst meth="repeat">
+      <a:schemeClr val="accent3"/>
+    </dgm:linClrLst>
+    <dgm:effectClrLst/>
+    <dgm:txLinClrLst/>
+    <dgm:txFillClrLst meth="repeat">
+      <a:schemeClr val="lt1"/>
+    </dgm:txFillClrLst>
+    <dgm:txEffectClrLst/>
+  </dgm:styleLbl>
+  <dgm:styleLbl name="fgShp">
+    <dgm:fillClrLst meth="repeat">
+      <a:schemeClr val="accent3">
+        <a:tint val="40000"/>
+      </a:schemeClr>
+    </dgm:fillClrLst>
+    <dgm:linClrLst meth="repeat">
+      <a:schemeClr val="lt1"/>
+    </dgm:linClrLst>
+    <dgm:effectClrLst/>
+    <dgm:txLinClrLst/>
+    <dgm:txFillClrLst meth="repeat">
+      <a:schemeClr val="dk1"/>
+    </dgm:txFillClrLst>
+    <dgm:txEffectClrLst/>
+  </dgm:styleLbl>
+  <dgm:styleLbl name="revTx">
+    <dgm:fillClrLst meth="repeat">
+      <a:schemeClr val="lt1">
+        <a:alpha val="0"/>
+      </a:schemeClr>
+    </dgm:fillClrLst>
+    <dgm:linClrLst meth="repeat">
+      <a:schemeClr val="dk1">
+        <a:alpha val="0"/>
+      </a:schemeClr>
+    </dgm:linClrLst>
+    <dgm:effectClrLst/>
+    <dgm:txLinClrLst/>
+    <dgm:txFillClrLst meth="repeat">
+      <a:schemeClr val="tx1"/>
+    </dgm:txFillClrLst>
+    <dgm:txEffectClrLst/>
+  </dgm:styleLbl>
+</dgm:colorsDef>
+</file>
+
+<file path=ppt/diagrams/colors3.xml><?xml version="1.0" encoding="utf-8"?>
 <dgm:colorsDef xmlns:dgm="http://schemas.openxmlformats.org/drawingml/2006/diagram" xmlns:a="http://schemas.openxmlformats.org/drawingml/2006/main" uniqueId="urn:microsoft.com/office/officeart/2005/8/colors/accent3_5">
   <dgm:title val=""/>
   <dgm:desc val=""/>
@@ -2193,14 +3073,14 @@
         <a:lstStyle/>
         <a:p>
           <a:r>
-            <a:rPr lang="de-DE" sz="1100" b="1" dirty="0" smtClean="0">
+            <a:rPr lang="de-DE" sz="1600" b="0" dirty="0" smtClean="0">
               <a:solidFill>
                 <a:srgbClr val="000000"/>
               </a:solidFill>
             </a:rPr>
             <a:t>Unternehmen einrichten</a:t>
           </a:r>
-          <a:endParaRPr lang="de-DE" sz="1100" b="1" dirty="0">
+          <a:endParaRPr lang="de-DE" sz="1600" b="0" dirty="0">
             <a:solidFill>
               <a:srgbClr val="000000"/>
             </a:solidFill>
@@ -2215,7 +3095,7 @@
         <a:bodyPr/>
         <a:lstStyle/>
         <a:p>
-          <a:endParaRPr lang="de-DE" sz="1100" b="1">
+          <a:endParaRPr lang="de-DE" sz="1600" b="0">
             <a:solidFill>
               <a:srgbClr val="000000"/>
             </a:solidFill>
@@ -2230,7 +3110,7 @@
         <a:bodyPr/>
         <a:lstStyle/>
         <a:p>
-          <a:endParaRPr lang="de-DE" sz="1100" b="1">
+          <a:endParaRPr lang="de-DE" sz="1600" b="0">
             <a:solidFill>
               <a:srgbClr val="000000"/>
             </a:solidFill>
@@ -2246,14 +3126,14 @@
         <a:lstStyle/>
         <a:p>
           <a:r>
-            <a:rPr lang="de-DE" sz="1100" b="1" dirty="0" smtClean="0">
+            <a:rPr lang="de-DE" sz="1600" b="0" dirty="0" smtClean="0">
               <a:solidFill>
                 <a:srgbClr val="000000"/>
               </a:solidFill>
             </a:rPr>
-            <a:t>Einkauf von Bauteilen</a:t>
+            <a:t>Bauteile einkaufen</a:t>
           </a:r>
-          <a:endParaRPr lang="de-DE" sz="1100" b="1" dirty="0">
+          <a:endParaRPr lang="de-DE" sz="1600" b="0" dirty="0">
             <a:solidFill>
               <a:srgbClr val="000000"/>
             </a:solidFill>
@@ -2268,7 +3148,7 @@
         <a:bodyPr/>
         <a:lstStyle/>
         <a:p>
-          <a:endParaRPr lang="de-DE" sz="1100" b="1">
+          <a:endParaRPr lang="de-DE" sz="1600" b="0">
             <a:solidFill>
               <a:srgbClr val="000000"/>
             </a:solidFill>
@@ -2283,60 +3163,7 @@
         <a:bodyPr/>
         <a:lstStyle/>
         <a:p>
-          <a:endParaRPr lang="de-DE" sz="1100" b="1">
-            <a:solidFill>
-              <a:srgbClr val="000000"/>
-            </a:solidFill>
-          </a:endParaRPr>
-        </a:p>
-      </dgm:t>
-    </dgm:pt>
-    <dgm:pt modelId="{220C9FC0-804D-A243-BA99-4A37EC4FAF79}">
-      <dgm:prSet phldrT="[Text]" custT="1"/>
-      <dgm:spPr/>
-      <dgm:t>
-        <a:bodyPr/>
-        <a:lstStyle/>
-        <a:p>
-          <a:r>
-            <a:rPr lang="de-DE" sz="1100" b="1" dirty="0" smtClean="0">
-              <a:solidFill>
-                <a:srgbClr val="000000"/>
-              </a:solidFill>
-            </a:rPr>
-            <a:t>End-bewertung einsehen</a:t>
-          </a:r>
-          <a:endParaRPr lang="de-DE" sz="1100" b="1" dirty="0">
-            <a:solidFill>
-              <a:srgbClr val="000000"/>
-            </a:solidFill>
-          </a:endParaRPr>
-        </a:p>
-      </dgm:t>
-    </dgm:pt>
-    <dgm:pt modelId="{FFDEBB18-C7E7-104E-9419-28A8E939EB44}" type="parTrans" cxnId="{FAC7922D-2C3F-0A46-B90A-AC8577EB5CA6}">
-      <dgm:prSet/>
-      <dgm:spPr/>
-      <dgm:t>
-        <a:bodyPr/>
-        <a:lstStyle/>
-        <a:p>
-          <a:endParaRPr lang="de-DE" sz="1100" b="1">
-            <a:solidFill>
-              <a:srgbClr val="000000"/>
-            </a:solidFill>
-          </a:endParaRPr>
-        </a:p>
-      </dgm:t>
-    </dgm:pt>
-    <dgm:pt modelId="{36C4C393-9444-8241-A8AA-A6635E7FD28D}" type="sibTrans" cxnId="{FAC7922D-2C3F-0A46-B90A-AC8577EB5CA6}">
-      <dgm:prSet/>
-      <dgm:spPr/>
-      <dgm:t>
-        <a:bodyPr/>
-        <a:lstStyle/>
-        <a:p>
-          <a:endParaRPr lang="de-DE" sz="1100" b="1">
+          <a:endParaRPr lang="de-DE" sz="1600" b="0">
             <a:solidFill>
               <a:srgbClr val="000000"/>
             </a:solidFill>
@@ -2352,14 +3179,14 @@
         <a:lstStyle/>
         <a:p>
           <a:r>
-            <a:rPr lang="de-DE" sz="1100" b="1" dirty="0" smtClean="0">
+            <a:rPr lang="de-DE" sz="1600" b="0" dirty="0" smtClean="0">
               <a:solidFill>
                 <a:srgbClr val="000000"/>
               </a:solidFill>
             </a:rPr>
             <a:t>Finanzen einsehen</a:t>
           </a:r>
-          <a:endParaRPr lang="de-DE" sz="1100" b="1" dirty="0">
+          <a:endParaRPr lang="de-DE" sz="1600" b="0" dirty="0">
             <a:solidFill>
               <a:srgbClr val="000000"/>
             </a:solidFill>
@@ -2374,7 +3201,7 @@
         <a:bodyPr/>
         <a:lstStyle/>
         <a:p>
-          <a:endParaRPr lang="de-DE" sz="1100" b="1">
+          <a:endParaRPr lang="de-DE" sz="1600" b="0">
             <a:solidFill>
               <a:srgbClr val="000000"/>
             </a:solidFill>
@@ -2389,113 +3216,7 @@
         <a:bodyPr/>
         <a:lstStyle/>
         <a:p>
-          <a:endParaRPr lang="de-DE" sz="1100" b="1">
-            <a:solidFill>
-              <a:srgbClr val="000000"/>
-            </a:solidFill>
-          </a:endParaRPr>
-        </a:p>
-      </dgm:t>
-    </dgm:pt>
-    <dgm:pt modelId="{3E72EB09-A805-8042-8284-473C39DBB89E}">
-      <dgm:prSet phldrT="[Text]" custT="1"/>
-      <dgm:spPr/>
-      <dgm:t>
-        <a:bodyPr/>
-        <a:lstStyle/>
-        <a:p>
-          <a:r>
-            <a:rPr lang="de-DE" sz="1100" b="1" dirty="0" smtClean="0">
-              <a:solidFill>
-                <a:srgbClr val="000000"/>
-              </a:solidFill>
-            </a:rPr>
-            <a:t>Produktion der Raumschiffe</a:t>
-          </a:r>
-          <a:endParaRPr lang="de-DE" sz="1100" b="1" dirty="0">
-            <a:solidFill>
-              <a:srgbClr val="000000"/>
-            </a:solidFill>
-          </a:endParaRPr>
-        </a:p>
-      </dgm:t>
-    </dgm:pt>
-    <dgm:pt modelId="{C5366902-FFA8-9F4B-8FBC-F0AD549E6B3F}" type="parTrans" cxnId="{7AC59F8E-D846-B74A-AC6B-C0B9990DBEB3}">
-      <dgm:prSet/>
-      <dgm:spPr/>
-      <dgm:t>
-        <a:bodyPr/>
-        <a:lstStyle/>
-        <a:p>
-          <a:endParaRPr lang="de-DE" sz="1100" b="1">
-            <a:solidFill>
-              <a:srgbClr val="000000"/>
-            </a:solidFill>
-          </a:endParaRPr>
-        </a:p>
-      </dgm:t>
-    </dgm:pt>
-    <dgm:pt modelId="{A0683585-F385-E44B-8FF7-95B75B061591}" type="sibTrans" cxnId="{7AC59F8E-D846-B74A-AC6B-C0B9990DBEB3}">
-      <dgm:prSet custT="1"/>
-      <dgm:spPr/>
-      <dgm:t>
-        <a:bodyPr/>
-        <a:lstStyle/>
-        <a:p>
-          <a:endParaRPr lang="de-DE" sz="1100" b="1">
-            <a:solidFill>
-              <a:srgbClr val="000000"/>
-            </a:solidFill>
-          </a:endParaRPr>
-        </a:p>
-      </dgm:t>
-    </dgm:pt>
-    <dgm:pt modelId="{D49F52E3-2C50-594F-AEBB-B62483FB24EC}">
-      <dgm:prSet phldrT="[Text]" custT="1"/>
-      <dgm:spPr/>
-      <dgm:t>
-        <a:bodyPr/>
-        <a:lstStyle/>
-        <a:p>
-          <a:r>
-            <a:rPr lang="de-DE" sz="1100" b="1" dirty="0" smtClean="0">
-              <a:solidFill>
-                <a:srgbClr val="000000"/>
-              </a:solidFill>
-            </a:rPr>
-            <a:t>Verkaufspreis angeben</a:t>
-          </a:r>
-          <a:endParaRPr lang="de-DE" sz="1100" b="1" dirty="0">
-            <a:solidFill>
-              <a:srgbClr val="000000"/>
-            </a:solidFill>
-          </a:endParaRPr>
-        </a:p>
-      </dgm:t>
-    </dgm:pt>
-    <dgm:pt modelId="{F32BE426-0194-D747-BF9B-0016E1A3E16E}" type="parTrans" cxnId="{46C4958D-8611-D643-802E-9ADA41EAAF27}">
-      <dgm:prSet/>
-      <dgm:spPr/>
-      <dgm:t>
-        <a:bodyPr/>
-        <a:lstStyle/>
-        <a:p>
-          <a:endParaRPr lang="de-DE" sz="1100" b="1">
-            <a:solidFill>
-              <a:srgbClr val="000000"/>
-            </a:solidFill>
-          </a:endParaRPr>
-        </a:p>
-      </dgm:t>
-    </dgm:pt>
-    <dgm:pt modelId="{9C22986B-59B7-E847-AF67-B73B70C867E7}" type="sibTrans" cxnId="{46C4958D-8611-D643-802E-9ADA41EAAF27}">
-      <dgm:prSet custT="1"/>
-      <dgm:spPr/>
-      <dgm:t>
-        <a:bodyPr/>
-        <a:lstStyle/>
-        <a:p>
-          <a:endParaRPr lang="de-DE" sz="1100" b="1">
+          <a:endParaRPr lang="de-DE" sz="1600" b="0">
             <a:solidFill>
               <a:srgbClr val="000000"/>
             </a:solidFill>
@@ -2511,14 +3232,14 @@
         <a:lstStyle/>
         <a:p>
           <a:r>
-            <a:rPr lang="de-DE" sz="1100" b="1" dirty="0" smtClean="0">
+            <a:rPr lang="de-DE" sz="1600" b="0" dirty="0" smtClean="0">
               <a:solidFill>
                 <a:srgbClr val="000000"/>
               </a:solidFill>
             </a:rPr>
             <a:t>Personal verwalten</a:t>
           </a:r>
-          <a:endParaRPr lang="de-DE" sz="1100" b="1" dirty="0">
+          <a:endParaRPr lang="de-DE" sz="1600" b="0" dirty="0">
             <a:solidFill>
               <a:srgbClr val="000000"/>
             </a:solidFill>
@@ -2533,7 +3254,7 @@
         <a:bodyPr/>
         <a:lstStyle/>
         <a:p>
-          <a:endParaRPr lang="de-DE" sz="1100" b="1">
+          <a:endParaRPr lang="de-DE" sz="1600" b="0">
             <a:solidFill>
               <a:srgbClr val="000000"/>
             </a:solidFill>
@@ -2548,7 +3269,7 @@
         <a:bodyPr/>
         <a:lstStyle/>
         <a:p>
-          <a:endParaRPr lang="de-DE" sz="1100" b="1">
+          <a:endParaRPr lang="de-DE" sz="1600" b="0">
             <a:solidFill>
               <a:srgbClr val="000000"/>
             </a:solidFill>
@@ -2566,87 +3287,7 @@
       <dgm:spPr/>
     </dgm:pt>
     <dgm:pt modelId="{AE55DD43-9428-7F41-B73D-EC2DB59DD4BA}" type="pres">
-      <dgm:prSet presAssocID="{34D5D93B-D935-2244-A2EB-C171CE4E98F7}" presName="node" presStyleLbl="node1" presStyleIdx="0" presStyleCnt="7" custScaleX="249309" custScaleY="105330">
-        <dgm:presLayoutVars>
-          <dgm:bulletEnabled val="1"/>
-        </dgm:presLayoutVars>
-      </dgm:prSet>
-      <dgm:spPr/>
-    </dgm:pt>
-    <dgm:pt modelId="{7A0C3CCD-92B0-7F46-99CB-E288AF3BB621}" type="pres">
-      <dgm:prSet presAssocID="{F207E7EC-AED7-4845-8367-AA4026D6930F}" presName="sibTrans" presStyleLbl="sibTrans2D1" presStyleIdx="0" presStyleCnt="6" custScaleX="156988" custScaleY="106715"/>
-      <dgm:spPr/>
-    </dgm:pt>
-    <dgm:pt modelId="{8B5DC07A-9F34-B743-9FDF-DCB01A24E059}" type="pres">
-      <dgm:prSet presAssocID="{F207E7EC-AED7-4845-8367-AA4026D6930F}" presName="connectorText" presStyleLbl="sibTrans2D1" presStyleIdx="0" presStyleCnt="6"/>
-      <dgm:spPr/>
-    </dgm:pt>
-    <dgm:pt modelId="{6B4FAB92-B09E-D84C-8D61-5D5788845DDE}" type="pres">
-      <dgm:prSet presAssocID="{1FFC97CC-192F-BB43-96CE-789A2BABF600}" presName="node" presStyleLbl="node1" presStyleIdx="1" presStyleCnt="7" custScaleX="249309" custScaleY="105330">
-        <dgm:presLayoutVars>
-          <dgm:bulletEnabled val="1"/>
-        </dgm:presLayoutVars>
-      </dgm:prSet>
-      <dgm:spPr/>
-    </dgm:pt>
-    <dgm:pt modelId="{9D5F9421-7680-D644-9D45-AF8251FC1D83}" type="pres">
-      <dgm:prSet presAssocID="{125684C6-AC6A-4E4A-93DD-98CCCDA3C39D}" presName="sibTrans" presStyleLbl="sibTrans2D1" presStyleIdx="1" presStyleCnt="6" custScaleX="156988"/>
-      <dgm:spPr/>
-    </dgm:pt>
-    <dgm:pt modelId="{FE2EF869-92CD-0841-90F9-F7C63F139F03}" type="pres">
-      <dgm:prSet presAssocID="{125684C6-AC6A-4E4A-93DD-98CCCDA3C39D}" presName="connectorText" presStyleLbl="sibTrans2D1" presStyleIdx="1" presStyleCnt="6"/>
-      <dgm:spPr/>
-    </dgm:pt>
-    <dgm:pt modelId="{6D5F24C4-C754-0346-9A17-9000437579E8}" type="pres">
-      <dgm:prSet presAssocID="{33AEC942-7FD8-3743-93A2-A411A439D0A3}" presName="node" presStyleLbl="node1" presStyleIdx="2" presStyleCnt="7" custScaleX="249309" custScaleY="105330">
-        <dgm:presLayoutVars>
-          <dgm:bulletEnabled val="1"/>
-        </dgm:presLayoutVars>
-      </dgm:prSet>
-      <dgm:spPr/>
-    </dgm:pt>
-    <dgm:pt modelId="{2CDEA237-215F-6048-A36D-CA48F653B9F0}" type="pres">
-      <dgm:prSet presAssocID="{A187CACE-1A9F-4445-85C6-E7A2673F2871}" presName="sibTrans" presStyleLbl="sibTrans2D1" presStyleIdx="2" presStyleCnt="6" custScaleX="156988"/>
-      <dgm:spPr/>
-    </dgm:pt>
-    <dgm:pt modelId="{C0241DD2-0583-A94C-AF6E-BB7D822F6684}" type="pres">
-      <dgm:prSet presAssocID="{A187CACE-1A9F-4445-85C6-E7A2673F2871}" presName="connectorText" presStyleLbl="sibTrans2D1" presStyleIdx="2" presStyleCnt="6"/>
-      <dgm:spPr/>
-    </dgm:pt>
-    <dgm:pt modelId="{EF9A7DCF-E5B0-2C49-805A-AC2B4B728B76}" type="pres">
-      <dgm:prSet presAssocID="{B2625FE4-41E1-8B4F-A4C3-E1AB54273876}" presName="node" presStyleLbl="node1" presStyleIdx="3" presStyleCnt="7" custScaleX="249309" custScaleY="105330">
-        <dgm:presLayoutVars>
-          <dgm:bulletEnabled val="1"/>
-        </dgm:presLayoutVars>
-      </dgm:prSet>
-      <dgm:spPr/>
-    </dgm:pt>
-    <dgm:pt modelId="{3A5AC82B-7463-1047-85AB-EC94B837835A}" type="pres">
-      <dgm:prSet presAssocID="{516C1B19-F191-134C-B5BA-6B1EA19CF487}" presName="sibTrans" presStyleLbl="sibTrans2D1" presStyleIdx="3" presStyleCnt="6" custScaleX="156988"/>
-      <dgm:spPr/>
-    </dgm:pt>
-    <dgm:pt modelId="{DA312926-DF29-F04B-B593-75F9628D5C4B}" type="pres">
-      <dgm:prSet presAssocID="{516C1B19-F191-134C-B5BA-6B1EA19CF487}" presName="connectorText" presStyleLbl="sibTrans2D1" presStyleIdx="3" presStyleCnt="6"/>
-      <dgm:spPr/>
-    </dgm:pt>
-    <dgm:pt modelId="{E9040923-0347-3940-94B6-75FF8AF184B0}" type="pres">
-      <dgm:prSet presAssocID="{3E72EB09-A805-8042-8284-473C39DBB89E}" presName="node" presStyleLbl="node1" presStyleIdx="4" presStyleCnt="7" custScaleX="249309" custScaleY="105330">
-        <dgm:presLayoutVars>
-          <dgm:bulletEnabled val="1"/>
-        </dgm:presLayoutVars>
-      </dgm:prSet>
-      <dgm:spPr/>
-    </dgm:pt>
-    <dgm:pt modelId="{B81F8AF9-FF83-714C-9CEE-E2E108C4A052}" type="pres">
-      <dgm:prSet presAssocID="{A0683585-F385-E44B-8FF7-95B75B061591}" presName="sibTrans" presStyleLbl="sibTrans2D1" presStyleIdx="4" presStyleCnt="6" custScaleX="156988"/>
-      <dgm:spPr/>
-    </dgm:pt>
-    <dgm:pt modelId="{89026EF0-7529-0546-9FE1-8519999F5341}" type="pres">
-      <dgm:prSet presAssocID="{A0683585-F385-E44B-8FF7-95B75B061591}" presName="connectorText" presStyleLbl="sibTrans2D1" presStyleIdx="4" presStyleCnt="6"/>
-      <dgm:spPr/>
-    </dgm:pt>
-    <dgm:pt modelId="{8B2FAF1A-C258-A84D-B1E1-138BBC85B83B}" type="pres">
-      <dgm:prSet presAssocID="{D49F52E3-2C50-594F-AEBB-B62483FB24EC}" presName="node" presStyleLbl="node1" presStyleIdx="5" presStyleCnt="7" custScaleX="249309" custScaleY="105330">
+      <dgm:prSet presAssocID="{34D5D93B-D935-2244-A2EB-C171CE4E98F7}" presName="node" presStyleLbl="node1" presStyleIdx="0" presStyleCnt="4" custScaleX="249309" custScaleY="105330">
         <dgm:presLayoutVars>
           <dgm:bulletEnabled val="1"/>
         </dgm:presLayoutVars>
@@ -2660,16 +3301,104 @@
         </a:p>
       </dgm:t>
     </dgm:pt>
-    <dgm:pt modelId="{337DA1A1-C713-7A4B-9877-A8F9D2567B3E}" type="pres">
-      <dgm:prSet presAssocID="{9C22986B-59B7-E847-AF67-B73B70C867E7}" presName="sibTrans" presStyleLbl="sibTrans2D1" presStyleIdx="5" presStyleCnt="6" custScaleX="156988"/>
+    <dgm:pt modelId="{7A0C3CCD-92B0-7F46-99CB-E288AF3BB621}" type="pres">
+      <dgm:prSet presAssocID="{F207E7EC-AED7-4845-8367-AA4026D6930F}" presName="sibTrans" presStyleLbl="sibTrans2D1" presStyleIdx="0" presStyleCnt="3" custScaleX="156988" custScaleY="113282"/>
       <dgm:spPr/>
+      <dgm:t>
+        <a:bodyPr/>
+        <a:lstStyle/>
+        <a:p>
+          <a:endParaRPr lang="de-DE"/>
+        </a:p>
+      </dgm:t>
     </dgm:pt>
-    <dgm:pt modelId="{E83BE352-74AD-9047-BC69-217AD3C26912}" type="pres">
-      <dgm:prSet presAssocID="{9C22986B-59B7-E847-AF67-B73B70C867E7}" presName="connectorText" presStyleLbl="sibTrans2D1" presStyleIdx="5" presStyleCnt="6"/>
+    <dgm:pt modelId="{8B5DC07A-9F34-B743-9FDF-DCB01A24E059}" type="pres">
+      <dgm:prSet presAssocID="{F207E7EC-AED7-4845-8367-AA4026D6930F}" presName="connectorText" presStyleLbl="sibTrans2D1" presStyleIdx="0" presStyleCnt="3"/>
       <dgm:spPr/>
+      <dgm:t>
+        <a:bodyPr/>
+        <a:lstStyle/>
+        <a:p>
+          <a:endParaRPr lang="de-DE"/>
+        </a:p>
+      </dgm:t>
     </dgm:pt>
-    <dgm:pt modelId="{E9DC2F37-07D7-4447-BB56-EA2233686C2B}" type="pres">
-      <dgm:prSet presAssocID="{220C9FC0-804D-A243-BA99-4A37EC4FAF79}" presName="node" presStyleLbl="node1" presStyleIdx="6" presStyleCnt="7" custScaleX="249309" custScaleY="105330">
+    <dgm:pt modelId="{6B4FAB92-B09E-D84C-8D61-5D5788845DDE}" type="pres">
+      <dgm:prSet presAssocID="{1FFC97CC-192F-BB43-96CE-789A2BABF600}" presName="node" presStyleLbl="node1" presStyleIdx="1" presStyleCnt="4" custScaleX="249309" custScaleY="105330">
+        <dgm:presLayoutVars>
+          <dgm:bulletEnabled val="1"/>
+        </dgm:presLayoutVars>
+      </dgm:prSet>
+      <dgm:spPr/>
+      <dgm:t>
+        <a:bodyPr/>
+        <a:lstStyle/>
+        <a:p>
+          <a:endParaRPr lang="de-DE"/>
+        </a:p>
+      </dgm:t>
+    </dgm:pt>
+    <dgm:pt modelId="{9D5F9421-7680-D644-9D45-AF8251FC1D83}" type="pres">
+      <dgm:prSet presAssocID="{125684C6-AC6A-4E4A-93DD-98CCCDA3C39D}" presName="sibTrans" presStyleLbl="sibTrans2D1" presStyleIdx="1" presStyleCnt="3" custScaleX="156988" custScaleY="113282"/>
+      <dgm:spPr/>
+      <dgm:t>
+        <a:bodyPr/>
+        <a:lstStyle/>
+        <a:p>
+          <a:endParaRPr lang="de-DE"/>
+        </a:p>
+      </dgm:t>
+    </dgm:pt>
+    <dgm:pt modelId="{FE2EF869-92CD-0841-90F9-F7C63F139F03}" type="pres">
+      <dgm:prSet presAssocID="{125684C6-AC6A-4E4A-93DD-98CCCDA3C39D}" presName="connectorText" presStyleLbl="sibTrans2D1" presStyleIdx="1" presStyleCnt="3"/>
+      <dgm:spPr/>
+      <dgm:t>
+        <a:bodyPr/>
+        <a:lstStyle/>
+        <a:p>
+          <a:endParaRPr lang="de-DE"/>
+        </a:p>
+      </dgm:t>
+    </dgm:pt>
+    <dgm:pt modelId="{6D5F24C4-C754-0346-9A17-9000437579E8}" type="pres">
+      <dgm:prSet presAssocID="{33AEC942-7FD8-3743-93A2-A411A439D0A3}" presName="node" presStyleLbl="node1" presStyleIdx="2" presStyleCnt="4" custScaleX="249309" custScaleY="105330">
+        <dgm:presLayoutVars>
+          <dgm:bulletEnabled val="1"/>
+        </dgm:presLayoutVars>
+      </dgm:prSet>
+      <dgm:spPr/>
+      <dgm:t>
+        <a:bodyPr/>
+        <a:lstStyle/>
+        <a:p>
+          <a:endParaRPr lang="de-DE"/>
+        </a:p>
+      </dgm:t>
+    </dgm:pt>
+    <dgm:pt modelId="{2CDEA237-215F-6048-A36D-CA48F653B9F0}" type="pres">
+      <dgm:prSet presAssocID="{A187CACE-1A9F-4445-85C6-E7A2673F2871}" presName="sibTrans" presStyleLbl="sibTrans2D1" presStyleIdx="2" presStyleCnt="3" custScaleX="156988" custScaleY="113282"/>
+      <dgm:spPr/>
+      <dgm:t>
+        <a:bodyPr/>
+        <a:lstStyle/>
+        <a:p>
+          <a:endParaRPr lang="de-DE"/>
+        </a:p>
+      </dgm:t>
+    </dgm:pt>
+    <dgm:pt modelId="{C0241DD2-0583-A94C-AF6E-BB7D822F6684}" type="pres">
+      <dgm:prSet presAssocID="{A187CACE-1A9F-4445-85C6-E7A2673F2871}" presName="connectorText" presStyleLbl="sibTrans2D1" presStyleIdx="2" presStyleCnt="3"/>
+      <dgm:spPr/>
+      <dgm:t>
+        <a:bodyPr/>
+        <a:lstStyle/>
+        <a:p>
+          <a:endParaRPr lang="de-DE"/>
+        </a:p>
+      </dgm:t>
+    </dgm:pt>
+    <dgm:pt modelId="{EF9A7DCF-E5B0-2C49-805A-AC2B4B728B76}" type="pres">
+      <dgm:prSet presAssocID="{B2625FE4-41E1-8B4F-A4C3-E1AB54273876}" presName="node" presStyleLbl="node1" presStyleIdx="3" presStyleCnt="4" custScaleX="249309" custScaleY="105330">
         <dgm:presLayoutVars>
           <dgm:bulletEnabled val="1"/>
         </dgm:presLayoutVars>
@@ -2685,33 +3414,21 @@
     </dgm:pt>
   </dgm:ptLst>
   <dgm:cxnLst>
-    <dgm:cxn modelId="{70594CEE-2888-2141-A073-67DA896060ED}" type="presOf" srcId="{516C1B19-F191-134C-B5BA-6B1EA19CF487}" destId="{3A5AC82B-7463-1047-85AB-EC94B837835A}" srcOrd="0" destOrd="0" presId="urn:microsoft.com/office/officeart/2005/8/layout/process1"/>
+    <dgm:cxn modelId="{5B2C91CC-9514-F444-8C5D-48B8FE2C1ED7}" srcId="{09437C96-73CE-9049-8693-6C70329C166A}" destId="{33AEC942-7FD8-3743-93A2-A411A439D0A3}" srcOrd="2" destOrd="0" parTransId="{E40A04E6-72B2-784A-B871-CAB34F534692}" sibTransId="{A187CACE-1A9F-4445-85C6-E7A2673F2871}"/>
+    <dgm:cxn modelId="{31A5C530-D060-FD47-815F-62F39920C475}" type="presOf" srcId="{1FFC97CC-192F-BB43-96CE-789A2BABF600}" destId="{6B4FAB92-B09E-D84C-8D61-5D5788845DDE}" srcOrd="0" destOrd="0" presId="urn:microsoft.com/office/officeart/2005/8/layout/process1"/>
+    <dgm:cxn modelId="{FD47E8C0-E36D-3C46-A3E8-99909C48B39C}" srcId="{09437C96-73CE-9049-8693-6C70329C166A}" destId="{34D5D93B-D935-2244-A2EB-C171CE4E98F7}" srcOrd="0" destOrd="0" parTransId="{50D0A18A-603A-1C47-947B-68A6DB532133}" sibTransId="{F207E7EC-AED7-4845-8367-AA4026D6930F}"/>
+    <dgm:cxn modelId="{BC615487-564F-9D49-B445-0351478BBC50}" type="presOf" srcId="{125684C6-AC6A-4E4A-93DD-98CCCDA3C39D}" destId="{9D5F9421-7680-D644-9D45-AF8251FC1D83}" srcOrd="0" destOrd="0" presId="urn:microsoft.com/office/officeart/2005/8/layout/process1"/>
+    <dgm:cxn modelId="{6BB1E088-1D68-BC4C-A74E-D6CB96357973}" type="presOf" srcId="{09437C96-73CE-9049-8693-6C70329C166A}" destId="{9C1C64A5-7F20-2445-A484-F09327961FC7}" srcOrd="0" destOrd="0" presId="urn:microsoft.com/office/officeart/2005/8/layout/process1"/>
+    <dgm:cxn modelId="{EE07CFF1-401D-884F-A258-8C1984872C9A}" type="presOf" srcId="{33AEC942-7FD8-3743-93A2-A411A439D0A3}" destId="{6D5F24C4-C754-0346-9A17-9000437579E8}" srcOrd="0" destOrd="0" presId="urn:microsoft.com/office/officeart/2005/8/layout/process1"/>
+    <dgm:cxn modelId="{8F81B1E0-5361-C746-B123-B9FBE09AF882}" type="presOf" srcId="{125684C6-AC6A-4E4A-93DD-98CCCDA3C39D}" destId="{FE2EF869-92CD-0841-90F9-F7C63F139F03}" srcOrd="1" destOrd="0" presId="urn:microsoft.com/office/officeart/2005/8/layout/process1"/>
     <dgm:cxn modelId="{E915EAF6-7B98-F746-8FC2-86FD868471A8}" type="presOf" srcId="{A187CACE-1A9F-4445-85C6-E7A2673F2871}" destId="{2CDEA237-215F-6048-A36D-CA48F653B9F0}" srcOrd="0" destOrd="0" presId="urn:microsoft.com/office/officeart/2005/8/layout/process1"/>
-    <dgm:cxn modelId="{EE07CFF1-401D-884F-A258-8C1984872C9A}" type="presOf" srcId="{33AEC942-7FD8-3743-93A2-A411A439D0A3}" destId="{6D5F24C4-C754-0346-9A17-9000437579E8}" srcOrd="0" destOrd="0" presId="urn:microsoft.com/office/officeart/2005/8/layout/process1"/>
+    <dgm:cxn modelId="{E5AB2683-A2C4-FB42-A417-99CED0219209}" type="presOf" srcId="{F207E7EC-AED7-4845-8367-AA4026D6930F}" destId="{7A0C3CCD-92B0-7F46-99CB-E288AF3BB621}" srcOrd="0" destOrd="0" presId="urn:microsoft.com/office/officeart/2005/8/layout/process1"/>
+    <dgm:cxn modelId="{98D69D64-6C65-A344-A064-1A4EDC4E2E02}" type="presOf" srcId="{F207E7EC-AED7-4845-8367-AA4026D6930F}" destId="{8B5DC07A-9F34-B743-9FDF-DCB01A24E059}" srcOrd="1" destOrd="0" presId="urn:microsoft.com/office/officeart/2005/8/layout/process1"/>
+    <dgm:cxn modelId="{F10D8C78-1F14-A14A-A8B8-A69D2FFD6809}" srcId="{09437C96-73CE-9049-8693-6C70329C166A}" destId="{B2625FE4-41E1-8B4F-A4C3-E1AB54273876}" srcOrd="3" destOrd="0" parTransId="{DFABC3A3-7482-C546-B8EA-C4895952A32F}" sibTransId="{516C1B19-F191-134C-B5BA-6B1EA19CF487}"/>
+    <dgm:cxn modelId="{E955759C-2D6A-5D41-8EA0-7CAD2178F14A}" type="presOf" srcId="{A187CACE-1A9F-4445-85C6-E7A2673F2871}" destId="{C0241DD2-0583-A94C-AF6E-BB7D822F6684}" srcOrd="1" destOrd="0" presId="urn:microsoft.com/office/officeart/2005/8/layout/process1"/>
+    <dgm:cxn modelId="{85DD8D18-75EB-A44A-9AF8-0CAB50C11C42}" type="presOf" srcId="{34D5D93B-D935-2244-A2EB-C171CE4E98F7}" destId="{AE55DD43-9428-7F41-B73D-EC2DB59DD4BA}" srcOrd="0" destOrd="0" presId="urn:microsoft.com/office/officeart/2005/8/layout/process1"/>
     <dgm:cxn modelId="{10FCDBF0-F18A-6345-BD2F-86CB40F8A9FF}" type="presOf" srcId="{B2625FE4-41E1-8B4F-A4C3-E1AB54273876}" destId="{EF9A7DCF-E5B0-2C49-805A-AC2B4B728B76}" srcOrd="0" destOrd="0" presId="urn:microsoft.com/office/officeart/2005/8/layout/process1"/>
-    <dgm:cxn modelId="{5B2C91CC-9514-F444-8C5D-48B8FE2C1ED7}" srcId="{09437C96-73CE-9049-8693-6C70329C166A}" destId="{33AEC942-7FD8-3743-93A2-A411A439D0A3}" srcOrd="2" destOrd="0" parTransId="{E40A04E6-72B2-784A-B871-CAB34F534692}" sibTransId="{A187CACE-1A9F-4445-85C6-E7A2673F2871}"/>
-    <dgm:cxn modelId="{3928ED93-1247-A54A-909F-8D694A7408AD}" type="presOf" srcId="{516C1B19-F191-134C-B5BA-6B1EA19CF487}" destId="{DA312926-DF29-F04B-B593-75F9628D5C4B}" srcOrd="1" destOrd="0" presId="urn:microsoft.com/office/officeart/2005/8/layout/process1"/>
-    <dgm:cxn modelId="{BEFC8645-BA36-BC4A-AF45-2016420A8AF8}" type="presOf" srcId="{A0683585-F385-E44B-8FF7-95B75B061591}" destId="{B81F8AF9-FF83-714C-9CEE-E2E108C4A052}" srcOrd="0" destOrd="0" presId="urn:microsoft.com/office/officeart/2005/8/layout/process1"/>
-    <dgm:cxn modelId="{BC615487-564F-9D49-B445-0351478BBC50}" type="presOf" srcId="{125684C6-AC6A-4E4A-93DD-98CCCDA3C39D}" destId="{9D5F9421-7680-D644-9D45-AF8251FC1D83}" srcOrd="0" destOrd="0" presId="urn:microsoft.com/office/officeart/2005/8/layout/process1"/>
-    <dgm:cxn modelId="{8F81B1E0-5361-C746-B123-B9FBE09AF882}" type="presOf" srcId="{125684C6-AC6A-4E4A-93DD-98CCCDA3C39D}" destId="{FE2EF869-92CD-0841-90F9-F7C63F139F03}" srcOrd="1" destOrd="0" presId="urn:microsoft.com/office/officeart/2005/8/layout/process1"/>
-    <dgm:cxn modelId="{C1D8DB6B-39E5-A84C-8F9F-EA509F232828}" type="presOf" srcId="{A0683585-F385-E44B-8FF7-95B75B061591}" destId="{89026EF0-7529-0546-9FE1-8519999F5341}" srcOrd="1" destOrd="0" presId="urn:microsoft.com/office/officeart/2005/8/layout/process1"/>
-    <dgm:cxn modelId="{98D69D64-6C65-A344-A064-1A4EDC4E2E02}" type="presOf" srcId="{F207E7EC-AED7-4845-8367-AA4026D6930F}" destId="{8B5DC07A-9F34-B743-9FDF-DCB01A24E059}" srcOrd="1" destOrd="0" presId="urn:microsoft.com/office/officeart/2005/8/layout/process1"/>
-    <dgm:cxn modelId="{750A535E-1746-5942-9EBE-7C294B26A435}" type="presOf" srcId="{D49F52E3-2C50-594F-AEBB-B62483FB24EC}" destId="{8B2FAF1A-C258-A84D-B1E1-138BBC85B83B}" srcOrd="0" destOrd="0" presId="urn:microsoft.com/office/officeart/2005/8/layout/process1"/>
-    <dgm:cxn modelId="{46C4958D-8611-D643-802E-9ADA41EAAF27}" srcId="{09437C96-73CE-9049-8693-6C70329C166A}" destId="{D49F52E3-2C50-594F-AEBB-B62483FB24EC}" srcOrd="5" destOrd="0" parTransId="{F32BE426-0194-D747-BF9B-0016E1A3E16E}" sibTransId="{9C22986B-59B7-E847-AF67-B73B70C867E7}"/>
-    <dgm:cxn modelId="{FD47E8C0-E36D-3C46-A3E8-99909C48B39C}" srcId="{09437C96-73CE-9049-8693-6C70329C166A}" destId="{34D5D93B-D935-2244-A2EB-C171CE4E98F7}" srcOrd="0" destOrd="0" parTransId="{50D0A18A-603A-1C47-947B-68A6DB532133}" sibTransId="{F207E7EC-AED7-4845-8367-AA4026D6930F}"/>
     <dgm:cxn modelId="{C2249D80-25C6-0D42-A4D2-AB5E5C70B204}" srcId="{09437C96-73CE-9049-8693-6C70329C166A}" destId="{1FFC97CC-192F-BB43-96CE-789A2BABF600}" srcOrd="1" destOrd="0" parTransId="{EC56717B-4D58-6143-A3FC-DBA3806110F1}" sibTransId="{125684C6-AC6A-4E4A-93DD-98CCCDA3C39D}"/>
-    <dgm:cxn modelId="{6BB1E088-1D68-BC4C-A74E-D6CB96357973}" type="presOf" srcId="{09437C96-73CE-9049-8693-6C70329C166A}" destId="{9C1C64A5-7F20-2445-A484-F09327961FC7}" srcOrd="0" destOrd="0" presId="urn:microsoft.com/office/officeart/2005/8/layout/process1"/>
-    <dgm:cxn modelId="{E5AB2683-A2C4-FB42-A417-99CED0219209}" type="presOf" srcId="{F207E7EC-AED7-4845-8367-AA4026D6930F}" destId="{7A0C3CCD-92B0-7F46-99CB-E288AF3BB621}" srcOrd="0" destOrd="0" presId="urn:microsoft.com/office/officeart/2005/8/layout/process1"/>
-    <dgm:cxn modelId="{F10D8C78-1F14-A14A-A8B8-A69D2FFD6809}" srcId="{09437C96-73CE-9049-8693-6C70329C166A}" destId="{B2625FE4-41E1-8B4F-A4C3-E1AB54273876}" srcOrd="3" destOrd="0" parTransId="{DFABC3A3-7482-C546-B8EA-C4895952A32F}" sibTransId="{516C1B19-F191-134C-B5BA-6B1EA19CF487}"/>
-    <dgm:cxn modelId="{7FCFCE00-8768-CB43-B258-8F0C8934ACB4}" type="presOf" srcId="{3E72EB09-A805-8042-8284-473C39DBB89E}" destId="{E9040923-0347-3940-94B6-75FF8AF184B0}" srcOrd="0" destOrd="0" presId="urn:microsoft.com/office/officeart/2005/8/layout/process1"/>
-    <dgm:cxn modelId="{FAC7922D-2C3F-0A46-B90A-AC8577EB5CA6}" srcId="{09437C96-73CE-9049-8693-6C70329C166A}" destId="{220C9FC0-804D-A243-BA99-4A37EC4FAF79}" srcOrd="6" destOrd="0" parTransId="{FFDEBB18-C7E7-104E-9419-28A8E939EB44}" sibTransId="{36C4C393-9444-8241-A8AA-A6635E7FD28D}"/>
-    <dgm:cxn modelId="{41F60C61-6A32-0743-99E2-7138A6886296}" type="presOf" srcId="{9C22986B-59B7-E847-AF67-B73B70C867E7}" destId="{E83BE352-74AD-9047-BC69-217AD3C26912}" srcOrd="1" destOrd="0" presId="urn:microsoft.com/office/officeart/2005/8/layout/process1"/>
-    <dgm:cxn modelId="{E955759C-2D6A-5D41-8EA0-7CAD2178F14A}" type="presOf" srcId="{A187CACE-1A9F-4445-85C6-E7A2673F2871}" destId="{C0241DD2-0583-A94C-AF6E-BB7D822F6684}" srcOrd="1" destOrd="0" presId="urn:microsoft.com/office/officeart/2005/8/layout/process1"/>
-    <dgm:cxn modelId="{31A5C530-D060-FD47-815F-62F39920C475}" type="presOf" srcId="{1FFC97CC-192F-BB43-96CE-789A2BABF600}" destId="{6B4FAB92-B09E-D84C-8D61-5D5788845DDE}" srcOrd="0" destOrd="0" presId="urn:microsoft.com/office/officeart/2005/8/layout/process1"/>
-    <dgm:cxn modelId="{D6F88FD4-A52A-1546-AB8A-36C2637F2AFF}" type="presOf" srcId="{9C22986B-59B7-E847-AF67-B73B70C867E7}" destId="{337DA1A1-C713-7A4B-9877-A8F9D2567B3E}" srcOrd="0" destOrd="0" presId="urn:microsoft.com/office/officeart/2005/8/layout/process1"/>
-    <dgm:cxn modelId="{84A5BFDE-CEBC-8D4B-A6AE-8F71CE6CBC4B}" type="presOf" srcId="{220C9FC0-804D-A243-BA99-4A37EC4FAF79}" destId="{E9DC2F37-07D7-4447-BB56-EA2233686C2B}" srcOrd="0" destOrd="0" presId="urn:microsoft.com/office/officeart/2005/8/layout/process1"/>
-    <dgm:cxn modelId="{85DD8D18-75EB-A44A-9AF8-0CAB50C11C42}" type="presOf" srcId="{34D5D93B-D935-2244-A2EB-C171CE4E98F7}" destId="{AE55DD43-9428-7F41-B73D-EC2DB59DD4BA}" srcOrd="0" destOrd="0" presId="urn:microsoft.com/office/officeart/2005/8/layout/process1"/>
-    <dgm:cxn modelId="{7AC59F8E-D846-B74A-AC6B-C0B9990DBEB3}" srcId="{09437C96-73CE-9049-8693-6C70329C166A}" destId="{3E72EB09-A805-8042-8284-473C39DBB89E}" srcOrd="4" destOrd="0" parTransId="{C5366902-FFA8-9F4B-8FBC-F0AD549E6B3F}" sibTransId="{A0683585-F385-E44B-8FF7-95B75B061591}"/>
     <dgm:cxn modelId="{619196F4-3CA7-EE47-B5D9-323C70B3F540}" type="presParOf" srcId="{9C1C64A5-7F20-2445-A484-F09327961FC7}" destId="{AE55DD43-9428-7F41-B73D-EC2DB59DD4BA}" srcOrd="0" destOrd="0" presId="urn:microsoft.com/office/officeart/2005/8/layout/process1"/>
     <dgm:cxn modelId="{58D3CF22-EC1F-0647-BD12-8937A61EA456}" type="presParOf" srcId="{9C1C64A5-7F20-2445-A484-F09327961FC7}" destId="{7A0C3CCD-92B0-7F46-99CB-E288AF3BB621}" srcOrd="1" destOrd="0" presId="urn:microsoft.com/office/officeart/2005/8/layout/process1"/>
     <dgm:cxn modelId="{8A5C6B21-4CA4-AD44-BA1E-469839CE31BC}" type="presParOf" srcId="{7A0C3CCD-92B0-7F46-99CB-E288AF3BB621}" destId="{8B5DC07A-9F34-B743-9FDF-DCB01A24E059}" srcOrd="0" destOrd="0" presId="urn:microsoft.com/office/officeart/2005/8/layout/process1"/>
@@ -2722,21 +3439,279 @@
     <dgm:cxn modelId="{310C82FB-AF78-584C-BB8E-0BC6F8DE39CF}" type="presParOf" srcId="{9C1C64A5-7F20-2445-A484-F09327961FC7}" destId="{2CDEA237-215F-6048-A36D-CA48F653B9F0}" srcOrd="5" destOrd="0" presId="urn:microsoft.com/office/officeart/2005/8/layout/process1"/>
     <dgm:cxn modelId="{530AC415-06FB-E447-A1A0-C2F87C96CFDD}" type="presParOf" srcId="{2CDEA237-215F-6048-A36D-CA48F653B9F0}" destId="{C0241DD2-0583-A94C-AF6E-BB7D822F6684}" srcOrd="0" destOrd="0" presId="urn:microsoft.com/office/officeart/2005/8/layout/process1"/>
     <dgm:cxn modelId="{4F1DD8BF-C736-FD4F-9F63-F772F3938659}" type="presParOf" srcId="{9C1C64A5-7F20-2445-A484-F09327961FC7}" destId="{EF9A7DCF-E5B0-2C49-805A-AC2B4B728B76}" srcOrd="6" destOrd="0" presId="urn:microsoft.com/office/officeart/2005/8/layout/process1"/>
-    <dgm:cxn modelId="{7748C5EE-03FD-6C4E-8112-E74E23FC47F7}" type="presParOf" srcId="{9C1C64A5-7F20-2445-A484-F09327961FC7}" destId="{3A5AC82B-7463-1047-85AB-EC94B837835A}" srcOrd="7" destOrd="0" presId="urn:microsoft.com/office/officeart/2005/8/layout/process1"/>
-    <dgm:cxn modelId="{49CA64DD-343C-9040-B5E6-D1527A8BD4BE}" type="presParOf" srcId="{3A5AC82B-7463-1047-85AB-EC94B837835A}" destId="{DA312926-DF29-F04B-B593-75F9628D5C4B}" srcOrd="0" destOrd="0" presId="urn:microsoft.com/office/officeart/2005/8/layout/process1"/>
-    <dgm:cxn modelId="{D1A23EE2-BF18-AD49-BB64-5C9FE750C331}" type="presParOf" srcId="{9C1C64A5-7F20-2445-A484-F09327961FC7}" destId="{E9040923-0347-3940-94B6-75FF8AF184B0}" srcOrd="8" destOrd="0" presId="urn:microsoft.com/office/officeart/2005/8/layout/process1"/>
-    <dgm:cxn modelId="{4B1EC07E-B512-4F48-8EB2-98BE343D7ABB}" type="presParOf" srcId="{9C1C64A5-7F20-2445-A484-F09327961FC7}" destId="{B81F8AF9-FF83-714C-9CEE-E2E108C4A052}" srcOrd="9" destOrd="0" presId="urn:microsoft.com/office/officeart/2005/8/layout/process1"/>
-    <dgm:cxn modelId="{E0FD734A-48A8-DC43-ABA4-61CB1E51692A}" type="presParOf" srcId="{B81F8AF9-FF83-714C-9CEE-E2E108C4A052}" destId="{89026EF0-7529-0546-9FE1-8519999F5341}" srcOrd="0" destOrd="0" presId="urn:microsoft.com/office/officeart/2005/8/layout/process1"/>
-    <dgm:cxn modelId="{792AF697-EC63-0748-A303-F3446EFAEAE3}" type="presParOf" srcId="{9C1C64A5-7F20-2445-A484-F09327961FC7}" destId="{8B2FAF1A-C258-A84D-B1E1-138BBC85B83B}" srcOrd="10" destOrd="0" presId="urn:microsoft.com/office/officeart/2005/8/layout/process1"/>
-    <dgm:cxn modelId="{CD1ED063-8ABA-DB4B-AD26-B93DF26EB43C}" type="presParOf" srcId="{9C1C64A5-7F20-2445-A484-F09327961FC7}" destId="{337DA1A1-C713-7A4B-9877-A8F9D2567B3E}" srcOrd="11" destOrd="0" presId="urn:microsoft.com/office/officeart/2005/8/layout/process1"/>
-    <dgm:cxn modelId="{80AD864D-0E77-4647-A452-C1F644A1A2C3}" type="presParOf" srcId="{337DA1A1-C713-7A4B-9877-A8F9D2567B3E}" destId="{E83BE352-74AD-9047-BC69-217AD3C26912}" srcOrd="0" destOrd="0" presId="urn:microsoft.com/office/officeart/2005/8/layout/process1"/>
-    <dgm:cxn modelId="{4954B8CF-62CD-B944-A053-4110E150B73C}" type="presParOf" srcId="{9C1C64A5-7F20-2445-A484-F09327961FC7}" destId="{E9DC2F37-07D7-4447-BB56-EA2233686C2B}" srcOrd="12" destOrd="0" presId="urn:microsoft.com/office/officeart/2005/8/layout/process1"/>
   </dgm:cxnLst>
   <dgm:bg/>
   <dgm:whole/>
   <dgm:extLst>
     <a:ext uri="http://schemas.microsoft.com/office/drawing/2008/diagram">
       <dsp:dataModelExt xmlns:dsp="http://schemas.microsoft.com/office/drawing/2008/diagram" relId="rId6" minVer="http://schemas.openxmlformats.org/drawingml/2006/diagram"/>
+    </a:ext>
+  </dgm:extLst>
+</dgm:dataModel>
+</file>
+
+<file path=ppt/diagrams/data3.xml><?xml version="1.0" encoding="utf-8"?>
+<dgm:dataModel xmlns:dgm="http://schemas.openxmlformats.org/drawingml/2006/diagram" xmlns:a="http://schemas.openxmlformats.org/drawingml/2006/main">
+  <dgm:ptLst>
+    <dgm:pt modelId="{AF23D8A7-C2B3-1A47-B494-3E0553D5BEA9}" type="doc">
+      <dgm:prSet loTypeId="urn:microsoft.com/office/officeart/2005/8/layout/process1" loCatId="" qsTypeId="urn:microsoft.com/office/officeart/2005/8/quickstyle/simple1" qsCatId="simple" csTypeId="urn:microsoft.com/office/officeart/2005/8/colors/accent3_5" csCatId="accent3" phldr="1"/>
+      <dgm:spPr/>
+    </dgm:pt>
+    <dgm:pt modelId="{CB1DA230-CCF4-3C45-85F0-D73708EB90C3}">
+      <dgm:prSet phldrT="[Text]" custT="1"/>
+      <dgm:spPr/>
+      <dgm:t>
+        <a:bodyPr/>
+        <a:lstStyle/>
+        <a:p>
+          <a:r>
+            <a:rPr lang="de-DE" sz="1600" b="0" dirty="0" smtClean="0">
+              <a:solidFill>
+                <a:srgbClr val="000000"/>
+              </a:solidFill>
+            </a:rPr>
+            <a:t>Produktion der Raumschiffe</a:t>
+          </a:r>
+          <a:endParaRPr lang="de-DE" sz="1600" b="0" dirty="0">
+            <a:solidFill>
+              <a:srgbClr val="000000"/>
+            </a:solidFill>
+          </a:endParaRPr>
+        </a:p>
+      </dgm:t>
+    </dgm:pt>
+    <dgm:pt modelId="{7850B116-6013-D74D-BB77-790120AAE26B}" type="parTrans" cxnId="{05947BC5-79E4-0F49-8976-73FBAD2C3050}">
+      <dgm:prSet/>
+      <dgm:spPr/>
+      <dgm:t>
+        <a:bodyPr/>
+        <a:lstStyle/>
+        <a:p>
+          <a:endParaRPr lang="de-DE" sz="1600" b="0">
+            <a:solidFill>
+              <a:srgbClr val="000000"/>
+            </a:solidFill>
+          </a:endParaRPr>
+        </a:p>
+      </dgm:t>
+    </dgm:pt>
+    <dgm:pt modelId="{32C1D379-9854-2B4E-A0C6-B5F57867148C}" type="sibTrans" cxnId="{05947BC5-79E4-0F49-8976-73FBAD2C3050}">
+      <dgm:prSet custT="1"/>
+      <dgm:spPr/>
+      <dgm:t>
+        <a:bodyPr/>
+        <a:lstStyle/>
+        <a:p>
+          <a:endParaRPr lang="de-DE" sz="1600" b="0">
+            <a:solidFill>
+              <a:srgbClr val="000000"/>
+            </a:solidFill>
+          </a:endParaRPr>
+        </a:p>
+      </dgm:t>
+    </dgm:pt>
+    <dgm:pt modelId="{1AFAF34A-E1B2-154B-90D9-4A0CD2F3FE81}">
+      <dgm:prSet phldrT="[Text]" custT="1"/>
+      <dgm:spPr/>
+      <dgm:t>
+        <a:bodyPr/>
+        <a:lstStyle/>
+        <a:p>
+          <a:r>
+            <a:rPr lang="de-DE" sz="1600" b="0" dirty="0" smtClean="0">
+              <a:solidFill>
+                <a:srgbClr val="000000"/>
+              </a:solidFill>
+            </a:rPr>
+            <a:t>Verkaufspreis angeben</a:t>
+          </a:r>
+          <a:endParaRPr lang="de-DE" sz="1600" b="0" dirty="0">
+            <a:solidFill>
+              <a:srgbClr val="000000"/>
+            </a:solidFill>
+          </a:endParaRPr>
+        </a:p>
+      </dgm:t>
+    </dgm:pt>
+    <dgm:pt modelId="{3D56E4CD-5A2E-3044-A9D3-839AF1DFE9FB}" type="parTrans" cxnId="{95517537-C2C8-3F46-A9F1-9AC01850650C}">
+      <dgm:prSet/>
+      <dgm:spPr/>
+      <dgm:t>
+        <a:bodyPr/>
+        <a:lstStyle/>
+        <a:p>
+          <a:endParaRPr lang="de-DE" sz="1600" b="0">
+            <a:solidFill>
+              <a:srgbClr val="000000"/>
+            </a:solidFill>
+          </a:endParaRPr>
+        </a:p>
+      </dgm:t>
+    </dgm:pt>
+    <dgm:pt modelId="{DC2C48DA-B35C-FE45-A462-40787174793A}" type="sibTrans" cxnId="{95517537-C2C8-3F46-A9F1-9AC01850650C}">
+      <dgm:prSet custT="1"/>
+      <dgm:spPr/>
+      <dgm:t>
+        <a:bodyPr/>
+        <a:lstStyle/>
+        <a:p>
+          <a:endParaRPr lang="de-DE" sz="1600" b="0">
+            <a:solidFill>
+              <a:srgbClr val="000000"/>
+            </a:solidFill>
+          </a:endParaRPr>
+        </a:p>
+      </dgm:t>
+    </dgm:pt>
+    <dgm:pt modelId="{9FCABB5E-045B-B048-BBF8-C54F53615083}">
+      <dgm:prSet phldrT="[Text]" custT="1"/>
+      <dgm:spPr/>
+      <dgm:t>
+        <a:bodyPr/>
+        <a:lstStyle/>
+        <a:p>
+          <a:r>
+            <a:rPr lang="de-DE" sz="1600" b="0" dirty="0" smtClean="0">
+              <a:solidFill>
+                <a:srgbClr val="000000"/>
+              </a:solidFill>
+            </a:rPr>
+            <a:t>Endbewertung einsehen</a:t>
+          </a:r>
+          <a:endParaRPr lang="de-DE" sz="1600" b="0" dirty="0">
+            <a:solidFill>
+              <a:srgbClr val="000000"/>
+            </a:solidFill>
+          </a:endParaRPr>
+        </a:p>
+      </dgm:t>
+    </dgm:pt>
+    <dgm:pt modelId="{2CB20DDB-0D25-2A46-A932-D53F2F3B7085}" type="parTrans" cxnId="{05A67396-FEC3-5F4D-A90E-7D188D89B187}">
+      <dgm:prSet/>
+      <dgm:spPr/>
+      <dgm:t>
+        <a:bodyPr/>
+        <a:lstStyle/>
+        <a:p>
+          <a:endParaRPr lang="de-DE" sz="1600" b="0">
+            <a:solidFill>
+              <a:srgbClr val="000000"/>
+            </a:solidFill>
+          </a:endParaRPr>
+        </a:p>
+      </dgm:t>
+    </dgm:pt>
+    <dgm:pt modelId="{6DAB5E50-EB2A-404A-944D-705D2A00E428}" type="sibTrans" cxnId="{05A67396-FEC3-5F4D-A90E-7D188D89B187}">
+      <dgm:prSet/>
+      <dgm:spPr/>
+      <dgm:t>
+        <a:bodyPr/>
+        <a:lstStyle/>
+        <a:p>
+          <a:endParaRPr lang="de-DE" sz="1600" b="0">
+            <a:solidFill>
+              <a:srgbClr val="000000"/>
+            </a:solidFill>
+          </a:endParaRPr>
+        </a:p>
+      </dgm:t>
+    </dgm:pt>
+    <dgm:pt modelId="{FF4E22DE-1B6D-AF45-BD25-C7396D2DB401}" type="pres">
+      <dgm:prSet presAssocID="{AF23D8A7-C2B3-1A47-B494-3E0553D5BEA9}" presName="Name0" presStyleCnt="0">
+        <dgm:presLayoutVars>
+          <dgm:dir/>
+          <dgm:resizeHandles val="exact"/>
+        </dgm:presLayoutVars>
+      </dgm:prSet>
+      <dgm:spPr/>
+    </dgm:pt>
+    <dgm:pt modelId="{E6425510-8B26-7849-A295-79452E90961A}" type="pres">
+      <dgm:prSet presAssocID="{CB1DA230-CCF4-3C45-85F0-D73708EB90C3}" presName="node" presStyleLbl="node1" presStyleIdx="0" presStyleCnt="3" custScaleX="249309" custScaleY="105330">
+        <dgm:presLayoutVars>
+          <dgm:bulletEnabled val="1"/>
+        </dgm:presLayoutVars>
+      </dgm:prSet>
+      <dgm:spPr/>
+      <dgm:t>
+        <a:bodyPr/>
+        <a:lstStyle/>
+        <a:p>
+          <a:endParaRPr lang="de-DE"/>
+        </a:p>
+      </dgm:t>
+    </dgm:pt>
+    <dgm:pt modelId="{E480A885-A9E0-FD4E-A5CF-CDBA992E26F6}" type="pres">
+      <dgm:prSet presAssocID="{32C1D379-9854-2B4E-A0C6-B5F57867148C}" presName="sibTrans" presStyleLbl="sibTrans2D1" presStyleIdx="0" presStyleCnt="2" custScaleX="173301"/>
+      <dgm:spPr/>
+    </dgm:pt>
+    <dgm:pt modelId="{2DB73D5B-3003-7742-8914-FA8BA0249315}" type="pres">
+      <dgm:prSet presAssocID="{32C1D379-9854-2B4E-A0C6-B5F57867148C}" presName="connectorText" presStyleLbl="sibTrans2D1" presStyleIdx="0" presStyleCnt="2"/>
+      <dgm:spPr/>
+    </dgm:pt>
+    <dgm:pt modelId="{D17F0578-8FEE-8A4E-AB84-16BEC830AA93}" type="pres">
+      <dgm:prSet presAssocID="{1AFAF34A-E1B2-154B-90D9-4A0CD2F3FE81}" presName="node" presStyleLbl="node1" presStyleIdx="1" presStyleCnt="3" custScaleX="249309" custScaleY="105330">
+        <dgm:presLayoutVars>
+          <dgm:bulletEnabled val="1"/>
+        </dgm:presLayoutVars>
+      </dgm:prSet>
+      <dgm:spPr/>
+      <dgm:t>
+        <a:bodyPr/>
+        <a:lstStyle/>
+        <a:p>
+          <a:endParaRPr lang="de-DE"/>
+        </a:p>
+      </dgm:t>
+    </dgm:pt>
+    <dgm:pt modelId="{E96175F9-A158-C843-9DD7-C6D35B266C27}" type="pres">
+      <dgm:prSet presAssocID="{DC2C48DA-B35C-FE45-A462-40787174793A}" presName="sibTrans" presStyleLbl="sibTrans2D1" presStyleIdx="1" presStyleCnt="2" custScaleX="173301"/>
+      <dgm:spPr/>
+    </dgm:pt>
+    <dgm:pt modelId="{D711B9FD-3B49-3B46-B3C2-F7FD6945ED53}" type="pres">
+      <dgm:prSet presAssocID="{DC2C48DA-B35C-FE45-A462-40787174793A}" presName="connectorText" presStyleLbl="sibTrans2D1" presStyleIdx="1" presStyleCnt="2"/>
+      <dgm:spPr/>
+    </dgm:pt>
+    <dgm:pt modelId="{C0EF3B12-5BA0-4C4A-A8C7-7CC0D8910FD8}" type="pres">
+      <dgm:prSet presAssocID="{9FCABB5E-045B-B048-BBF8-C54F53615083}" presName="node" presStyleLbl="node1" presStyleIdx="2" presStyleCnt="3" custScaleX="249309" custScaleY="105330">
+        <dgm:presLayoutVars>
+          <dgm:bulletEnabled val="1"/>
+        </dgm:presLayoutVars>
+      </dgm:prSet>
+      <dgm:spPr/>
+      <dgm:t>
+        <a:bodyPr/>
+        <a:lstStyle/>
+        <a:p>
+          <a:endParaRPr lang="de-DE"/>
+        </a:p>
+      </dgm:t>
+    </dgm:pt>
+  </dgm:ptLst>
+  <dgm:cxnLst>
+    <dgm:cxn modelId="{8073CE99-9C61-9844-A927-08CB3F3D2755}" type="presOf" srcId="{9FCABB5E-045B-B048-BBF8-C54F53615083}" destId="{C0EF3B12-5BA0-4C4A-A8C7-7CC0D8910FD8}" srcOrd="0" destOrd="0" presId="urn:microsoft.com/office/officeart/2005/8/layout/process1"/>
+    <dgm:cxn modelId="{754B43AE-0377-1041-BA03-443A622AE39C}" type="presOf" srcId="{CB1DA230-CCF4-3C45-85F0-D73708EB90C3}" destId="{E6425510-8B26-7849-A295-79452E90961A}" srcOrd="0" destOrd="0" presId="urn:microsoft.com/office/officeart/2005/8/layout/process1"/>
+    <dgm:cxn modelId="{06A915E7-C4E2-C147-AD52-ECF280EAC3C0}" type="presOf" srcId="{32C1D379-9854-2B4E-A0C6-B5F57867148C}" destId="{2DB73D5B-3003-7742-8914-FA8BA0249315}" srcOrd="1" destOrd="0" presId="urn:microsoft.com/office/officeart/2005/8/layout/process1"/>
+    <dgm:cxn modelId="{7D1A2E21-B785-6644-8BDA-4D4E40944F25}" type="presOf" srcId="{DC2C48DA-B35C-FE45-A462-40787174793A}" destId="{D711B9FD-3B49-3B46-B3C2-F7FD6945ED53}" srcOrd="1" destOrd="0" presId="urn:microsoft.com/office/officeart/2005/8/layout/process1"/>
+    <dgm:cxn modelId="{05A67396-FEC3-5F4D-A90E-7D188D89B187}" srcId="{AF23D8A7-C2B3-1A47-B494-3E0553D5BEA9}" destId="{9FCABB5E-045B-B048-BBF8-C54F53615083}" srcOrd="2" destOrd="0" parTransId="{2CB20DDB-0D25-2A46-A932-D53F2F3B7085}" sibTransId="{6DAB5E50-EB2A-404A-944D-705D2A00E428}"/>
+    <dgm:cxn modelId="{7CD0C7F5-106A-CE42-9B6F-387A551655CF}" type="presOf" srcId="{1AFAF34A-E1B2-154B-90D9-4A0CD2F3FE81}" destId="{D17F0578-8FEE-8A4E-AB84-16BEC830AA93}" srcOrd="0" destOrd="0" presId="urn:microsoft.com/office/officeart/2005/8/layout/process1"/>
+    <dgm:cxn modelId="{9D305B23-779B-F84A-A81A-63F27F27220F}" type="presOf" srcId="{DC2C48DA-B35C-FE45-A462-40787174793A}" destId="{E96175F9-A158-C843-9DD7-C6D35B266C27}" srcOrd="0" destOrd="0" presId="urn:microsoft.com/office/officeart/2005/8/layout/process1"/>
+    <dgm:cxn modelId="{05947BC5-79E4-0F49-8976-73FBAD2C3050}" srcId="{AF23D8A7-C2B3-1A47-B494-3E0553D5BEA9}" destId="{CB1DA230-CCF4-3C45-85F0-D73708EB90C3}" srcOrd="0" destOrd="0" parTransId="{7850B116-6013-D74D-BB77-790120AAE26B}" sibTransId="{32C1D379-9854-2B4E-A0C6-B5F57867148C}"/>
+    <dgm:cxn modelId="{2C227A3D-9A1E-E448-AD16-8BC7CB25EBEF}" type="presOf" srcId="{AF23D8A7-C2B3-1A47-B494-3E0553D5BEA9}" destId="{FF4E22DE-1B6D-AF45-BD25-C7396D2DB401}" srcOrd="0" destOrd="0" presId="urn:microsoft.com/office/officeart/2005/8/layout/process1"/>
+    <dgm:cxn modelId="{55D42001-56AC-AE4B-91A0-A37D9823C309}" type="presOf" srcId="{32C1D379-9854-2B4E-A0C6-B5F57867148C}" destId="{E480A885-A9E0-FD4E-A5CF-CDBA992E26F6}" srcOrd="0" destOrd="0" presId="urn:microsoft.com/office/officeart/2005/8/layout/process1"/>
+    <dgm:cxn modelId="{95517537-C2C8-3F46-A9F1-9AC01850650C}" srcId="{AF23D8A7-C2B3-1A47-B494-3E0553D5BEA9}" destId="{1AFAF34A-E1B2-154B-90D9-4A0CD2F3FE81}" srcOrd="1" destOrd="0" parTransId="{3D56E4CD-5A2E-3044-A9D3-839AF1DFE9FB}" sibTransId="{DC2C48DA-B35C-FE45-A462-40787174793A}"/>
+    <dgm:cxn modelId="{A95A6931-A63E-6F43-A9FD-3A78F3D0254D}" type="presParOf" srcId="{FF4E22DE-1B6D-AF45-BD25-C7396D2DB401}" destId="{E6425510-8B26-7849-A295-79452E90961A}" srcOrd="0" destOrd="0" presId="urn:microsoft.com/office/officeart/2005/8/layout/process1"/>
+    <dgm:cxn modelId="{CF24D23F-9564-C247-AB29-FF24EF8351A5}" type="presParOf" srcId="{FF4E22DE-1B6D-AF45-BD25-C7396D2DB401}" destId="{E480A885-A9E0-FD4E-A5CF-CDBA992E26F6}" srcOrd="1" destOrd="0" presId="urn:microsoft.com/office/officeart/2005/8/layout/process1"/>
+    <dgm:cxn modelId="{304F7A1F-4983-D449-853D-55FFC1A22DF2}" type="presParOf" srcId="{E480A885-A9E0-FD4E-A5CF-CDBA992E26F6}" destId="{2DB73D5B-3003-7742-8914-FA8BA0249315}" srcOrd="0" destOrd="0" presId="urn:microsoft.com/office/officeart/2005/8/layout/process1"/>
+    <dgm:cxn modelId="{BF13DE2D-9EA4-E345-99DB-2CADC7BAC8CF}" type="presParOf" srcId="{FF4E22DE-1B6D-AF45-BD25-C7396D2DB401}" destId="{D17F0578-8FEE-8A4E-AB84-16BEC830AA93}" srcOrd="2" destOrd="0" presId="urn:microsoft.com/office/officeart/2005/8/layout/process1"/>
+    <dgm:cxn modelId="{9F1F0EAF-7922-624E-83E6-6E450E34D0A8}" type="presParOf" srcId="{FF4E22DE-1B6D-AF45-BD25-C7396D2DB401}" destId="{E96175F9-A158-C843-9DD7-C6D35B266C27}" srcOrd="3" destOrd="0" presId="urn:microsoft.com/office/officeart/2005/8/layout/process1"/>
+    <dgm:cxn modelId="{1AE63F93-6829-9141-9D44-C683894FA0B5}" type="presParOf" srcId="{E96175F9-A158-C843-9DD7-C6D35B266C27}" destId="{D711B9FD-3B49-3B46-B3C2-F7FD6945ED53}" srcOrd="0" destOrd="0" presId="urn:microsoft.com/office/officeart/2005/8/layout/process1"/>
+    <dgm:cxn modelId="{31698D8F-58B8-D645-82D5-0DA146A5CFBA}" type="presParOf" srcId="{FF4E22DE-1B6D-AF45-BD25-C7396D2DB401}" destId="{C0EF3B12-5BA0-4C4A-A8C7-7CC0D8910FD8}" srcOrd="4" destOrd="0" presId="urn:microsoft.com/office/officeart/2005/8/layout/process1"/>
+  </dgm:cxnLst>
+  <dgm:bg/>
+  <dgm:whole/>
+  <dgm:extLst>
+    <a:ext uri="http://schemas.microsoft.com/office/drawing/2008/diagram">
+      <dsp:dataModelExt xmlns:dsp="http://schemas.microsoft.com/office/drawing/2008/diagram" relId="rId11" minVer="http://schemas.openxmlformats.org/drawingml/2006/diagram"/>
     </a:ext>
   </dgm:extLst>
 </dgm:dataModel>
@@ -3027,8 +4002,8 @@
       </dsp:nvSpPr>
       <dsp:spPr>
         <a:xfrm>
-          <a:off x="5879" y="1527803"/>
-          <a:ext cx="1078694" cy="615160"/>
+          <a:off x="4402" y="297656"/>
+          <a:ext cx="1508424" cy="659815"/>
         </a:xfrm>
         <a:prstGeom prst="roundRect">
           <a:avLst>
@@ -3072,12 +4047,12 @@
         </a:fontRef>
       </dsp:style>
       <dsp:txBody>
-        <a:bodyPr spcFirstLastPara="0" vert="horz" wrap="square" lIns="41910" tIns="41910" rIns="41910" bIns="41910" numCol="1" spcCol="1270" anchor="ctr" anchorCtr="0">
+        <a:bodyPr spcFirstLastPara="0" vert="horz" wrap="square" lIns="60960" tIns="60960" rIns="60960" bIns="60960" numCol="1" spcCol="1270" anchor="ctr" anchorCtr="0">
           <a:noAutofit/>
         </a:bodyPr>
         <a:lstStyle/>
         <a:p>
-          <a:pPr lvl="0" algn="ctr" defTabSz="488950">
+          <a:pPr lvl="0" algn="ctr" defTabSz="711200">
             <a:lnSpc>
               <a:spcPct val="90000"/>
             </a:lnSpc>
@@ -3089,14 +4064,14 @@
             </a:spcAft>
           </a:pPr>
           <a:r>
-            <a:rPr lang="de-DE" sz="1100" b="1" kern="1200" dirty="0" smtClean="0">
+            <a:rPr lang="de-DE" sz="1600" b="0" kern="1200" dirty="0" smtClean="0">
               <a:solidFill>
                 <a:srgbClr val="000000"/>
               </a:solidFill>
             </a:rPr>
             <a:t>Unternehmen einrichten</a:t>
           </a:r>
-          <a:endParaRPr lang="de-DE" sz="1100" b="1" kern="1200" dirty="0">
+          <a:endParaRPr lang="de-DE" sz="1600" b="0" kern="1200" dirty="0">
             <a:solidFill>
               <a:srgbClr val="000000"/>
             </a:solidFill>
@@ -3104,8 +4079,8 @@
         </a:p>
       </dsp:txBody>
       <dsp:txXfrm>
-        <a:off x="23896" y="1545820"/>
-        <a:ext cx="1042660" cy="579126"/>
+        <a:off x="23727" y="316981"/>
+        <a:ext cx="1469774" cy="621165"/>
       </dsp:txXfrm>
     </dsp:sp>
     <dsp:sp modelId="{7A0C3CCD-92B0-7F46-99CB-E288AF3BB621}">
@@ -3115,8 +4090,8 @@
       </dsp:nvSpPr>
       <dsp:spPr>
         <a:xfrm>
-          <a:off x="1101704" y="1778129"/>
-          <a:ext cx="144000" cy="114508"/>
+          <a:off x="1536782" y="542574"/>
+          <a:ext cx="201366" cy="169980"/>
         </a:xfrm>
         <a:prstGeom prst="rightArrow">
           <a:avLst>
@@ -3158,7 +4133,7 @@
         </a:bodyPr>
         <a:lstStyle/>
         <a:p>
-          <a:pPr lvl="0" algn="ctr" defTabSz="488950">
+          <a:pPr lvl="0" algn="ctr" defTabSz="711200">
             <a:lnSpc>
               <a:spcPct val="90000"/>
             </a:lnSpc>
@@ -3169,7 +4144,7 @@
               <a:spcPct val="35000"/>
             </a:spcAft>
           </a:pPr>
-          <a:endParaRPr lang="de-DE" sz="1100" b="1" kern="1200">
+          <a:endParaRPr lang="de-DE" sz="1600" b="0" kern="1200">
             <a:solidFill>
               <a:srgbClr val="000000"/>
             </a:solidFill>
@@ -3177,8 +4152,8 @@
         </a:p>
       </dsp:txBody>
       <dsp:txXfrm>
-        <a:off x="1101704" y="1801031"/>
-        <a:ext cx="109648" cy="68704"/>
+        <a:off x="1536782" y="576570"/>
+        <a:ext cx="150372" cy="101988"/>
       </dsp:txXfrm>
     </dsp:sp>
     <dsp:sp modelId="{6B4FAB92-B09E-D84C-8D61-5D5788845DDE}">
@@ -3188,169 +4163,8 @@
       </dsp:nvSpPr>
       <dsp:spPr>
         <a:xfrm>
-          <a:off x="1257643" y="1527803"/>
-          <a:ext cx="1078694" cy="615160"/>
-        </a:xfrm>
-        <a:prstGeom prst="roundRect">
-          <a:avLst>
-            <a:gd name="adj" fmla="val 10000"/>
-          </a:avLst>
-        </a:prstGeom>
-        <a:solidFill>
-          <a:schemeClr val="accent3">
-            <a:alpha val="90000"/>
-            <a:hueOff val="0"/>
-            <a:satOff val="0"/>
-            <a:lumOff val="0"/>
-            <a:alphaOff val="-6667"/>
-          </a:schemeClr>
-        </a:solidFill>
-        <a:ln w="25400" cap="flat" cmpd="sng" algn="ctr">
-          <a:solidFill>
-            <a:schemeClr val="lt1">
-              <a:hueOff val="0"/>
-              <a:satOff val="0"/>
-              <a:lumOff val="0"/>
-              <a:alphaOff val="0"/>
-            </a:schemeClr>
-          </a:solidFill>
-          <a:prstDash val="solid"/>
-        </a:ln>
-        <a:effectLst/>
-      </dsp:spPr>
-      <dsp:style>
-        <a:lnRef idx="2">
-          <a:scrgbClr r="0" g="0" b="0"/>
-        </a:lnRef>
-        <a:fillRef idx="1">
-          <a:scrgbClr r="0" g="0" b="0"/>
-        </a:fillRef>
-        <a:effectRef idx="0">
-          <a:scrgbClr r="0" g="0" b="0"/>
-        </a:effectRef>
-        <a:fontRef idx="minor">
-          <a:schemeClr val="lt1"/>
-        </a:fontRef>
-      </dsp:style>
-      <dsp:txBody>
-        <a:bodyPr spcFirstLastPara="0" vert="horz" wrap="square" lIns="41910" tIns="41910" rIns="41910" bIns="41910" numCol="1" spcCol="1270" anchor="ctr" anchorCtr="0">
-          <a:noAutofit/>
-        </a:bodyPr>
-        <a:lstStyle/>
-        <a:p>
-          <a:pPr lvl="0" algn="ctr" defTabSz="488950">
-            <a:lnSpc>
-              <a:spcPct val="90000"/>
-            </a:lnSpc>
-            <a:spcBef>
-              <a:spcPct val="0"/>
-            </a:spcBef>
-            <a:spcAft>
-              <a:spcPct val="35000"/>
-            </a:spcAft>
-          </a:pPr>
-          <a:r>
-            <a:rPr lang="de-DE" sz="1100" b="1" kern="1200" dirty="0" smtClean="0">
-              <a:solidFill>
-                <a:srgbClr val="000000"/>
-              </a:solidFill>
-            </a:rPr>
-            <a:t>Finanzen einsehen</a:t>
-          </a:r>
-          <a:endParaRPr lang="de-DE" sz="1100" b="1" kern="1200" dirty="0">
-            <a:solidFill>
-              <a:srgbClr val="000000"/>
-            </a:solidFill>
-          </a:endParaRPr>
-        </a:p>
-      </dsp:txBody>
-      <dsp:txXfrm>
-        <a:off x="1275660" y="1545820"/>
-        <a:ext cx="1042660" cy="579126"/>
-      </dsp:txXfrm>
-    </dsp:sp>
-    <dsp:sp modelId="{9D5F9421-7680-D644-9D45-AF8251FC1D83}">
-      <dsp:nvSpPr>
-        <dsp:cNvPr id="0" name=""/>
-        <dsp:cNvSpPr/>
-      </dsp:nvSpPr>
-      <dsp:spPr>
-        <a:xfrm>
-          <a:off x="2353467" y="1781731"/>
-          <a:ext cx="144000" cy="107303"/>
-        </a:xfrm>
-        <a:prstGeom prst="rightArrow">
-          <a:avLst>
-            <a:gd name="adj1" fmla="val 60000"/>
-            <a:gd name="adj2" fmla="val 50000"/>
-          </a:avLst>
-        </a:prstGeom>
-        <a:solidFill>
-          <a:schemeClr val="accent3">
-            <a:shade val="90000"/>
-            <a:hueOff val="-82658"/>
-            <a:satOff val="-6135"/>
-            <a:lumOff val="8241"/>
-            <a:alphaOff val="0"/>
-          </a:schemeClr>
-        </a:solidFill>
-        <a:ln>
-          <a:noFill/>
-        </a:ln>
-        <a:effectLst/>
-      </dsp:spPr>
-      <dsp:style>
-        <a:lnRef idx="0">
-          <a:scrgbClr r="0" g="0" b="0"/>
-        </a:lnRef>
-        <a:fillRef idx="1">
-          <a:scrgbClr r="0" g="0" b="0"/>
-        </a:fillRef>
-        <a:effectRef idx="0">
-          <a:scrgbClr r="0" g="0" b="0"/>
-        </a:effectRef>
-        <a:fontRef idx="minor">
-          <a:schemeClr val="lt1"/>
-        </a:fontRef>
-      </dsp:style>
-      <dsp:txBody>
-        <a:bodyPr spcFirstLastPara="0" vert="horz" wrap="square" lIns="0" tIns="0" rIns="0" bIns="0" numCol="1" spcCol="1270" anchor="ctr" anchorCtr="0">
-          <a:noAutofit/>
-        </a:bodyPr>
-        <a:lstStyle/>
-        <a:p>
-          <a:pPr lvl="0" algn="ctr" defTabSz="488950">
-            <a:lnSpc>
-              <a:spcPct val="90000"/>
-            </a:lnSpc>
-            <a:spcBef>
-              <a:spcPct val="0"/>
-            </a:spcBef>
-            <a:spcAft>
-              <a:spcPct val="35000"/>
-            </a:spcAft>
-          </a:pPr>
-          <a:endParaRPr lang="de-DE" sz="1100" b="1" kern="1200">
-            <a:solidFill>
-              <a:srgbClr val="000000"/>
-            </a:solidFill>
-          </a:endParaRPr>
-        </a:p>
-      </dsp:txBody>
-      <dsp:txXfrm>
-        <a:off x="2353467" y="1803192"/>
-        <a:ext cx="111809" cy="64381"/>
-      </dsp:txXfrm>
-    </dsp:sp>
-    <dsp:sp modelId="{6D5F24C4-C754-0346-9A17-9000437579E8}">
-      <dsp:nvSpPr>
-        <dsp:cNvPr id="0" name=""/>
-        <dsp:cNvSpPr/>
-      </dsp:nvSpPr>
-      <dsp:spPr>
-        <a:xfrm>
-          <a:off x="2509406" y="1527803"/>
-          <a:ext cx="1078694" cy="615160"/>
+          <a:off x="1754844" y="297656"/>
+          <a:ext cx="1508424" cy="659815"/>
         </a:xfrm>
         <a:prstGeom prst="roundRect">
           <a:avLst>
@@ -3394,12 +4208,12 @@
         </a:fontRef>
       </dsp:style>
       <dsp:txBody>
-        <a:bodyPr spcFirstLastPara="0" vert="horz" wrap="square" lIns="41910" tIns="41910" rIns="41910" bIns="41910" numCol="1" spcCol="1270" anchor="ctr" anchorCtr="0">
+        <a:bodyPr spcFirstLastPara="0" vert="horz" wrap="square" lIns="60960" tIns="60960" rIns="60960" bIns="60960" numCol="1" spcCol="1270" anchor="ctr" anchorCtr="0">
           <a:noAutofit/>
         </a:bodyPr>
         <a:lstStyle/>
         <a:p>
-          <a:pPr lvl="0" algn="ctr" defTabSz="488950">
+          <a:pPr lvl="0" algn="ctr" defTabSz="711200">
             <a:lnSpc>
               <a:spcPct val="90000"/>
             </a:lnSpc>
@@ -3411,14 +4225,14 @@
             </a:spcAft>
           </a:pPr>
           <a:r>
-            <a:rPr lang="de-DE" sz="1100" b="1" kern="1200" dirty="0" smtClean="0">
+            <a:rPr lang="de-DE" sz="1600" b="0" kern="1200" dirty="0" smtClean="0">
               <a:solidFill>
                 <a:srgbClr val="000000"/>
               </a:solidFill>
             </a:rPr>
-            <a:t>Einkauf von Bauteilen</a:t>
+            <a:t>Finanzen einsehen</a:t>
           </a:r>
-          <a:endParaRPr lang="de-DE" sz="1100" b="1" kern="1200" dirty="0">
+          <a:endParaRPr lang="de-DE" sz="1600" b="0" kern="1200" dirty="0">
             <a:solidFill>
               <a:srgbClr val="000000"/>
             </a:solidFill>
@@ -3426,19 +4240,19 @@
         </a:p>
       </dsp:txBody>
       <dsp:txXfrm>
-        <a:off x="2527423" y="1545820"/>
-        <a:ext cx="1042660" cy="579126"/>
+        <a:off x="1774169" y="316981"/>
+        <a:ext cx="1469774" cy="621165"/>
       </dsp:txXfrm>
     </dsp:sp>
-    <dsp:sp modelId="{2CDEA237-215F-6048-A36D-CA48F653B9F0}">
+    <dsp:sp modelId="{9D5F9421-7680-D644-9D45-AF8251FC1D83}">
       <dsp:nvSpPr>
         <dsp:cNvPr id="0" name=""/>
         <dsp:cNvSpPr/>
       </dsp:nvSpPr>
       <dsp:spPr>
         <a:xfrm>
-          <a:off x="3605231" y="1781731"/>
-          <a:ext cx="144000" cy="107303"/>
+          <a:off x="3287224" y="542574"/>
+          <a:ext cx="201366" cy="169980"/>
         </a:xfrm>
         <a:prstGeom prst="rightArrow">
           <a:avLst>
@@ -3449,9 +4263,9 @@
         <a:solidFill>
           <a:schemeClr val="accent3">
             <a:shade val="90000"/>
-            <a:hueOff val="-165316"/>
-            <a:satOff val="-12270"/>
-            <a:lumOff val="16482"/>
+            <a:hueOff val="-206645"/>
+            <a:satOff val="-15338"/>
+            <a:lumOff val="20602"/>
             <a:alphaOff val="0"/>
           </a:schemeClr>
         </a:solidFill>
@@ -3480,7 +4294,7 @@
         </a:bodyPr>
         <a:lstStyle/>
         <a:p>
-          <a:pPr lvl="0" algn="ctr" defTabSz="488950">
+          <a:pPr lvl="0" algn="ctr" defTabSz="711200">
             <a:lnSpc>
               <a:spcPct val="90000"/>
             </a:lnSpc>
@@ -3491,7 +4305,7 @@
               <a:spcPct val="35000"/>
             </a:spcAft>
           </a:pPr>
-          <a:endParaRPr lang="de-DE" sz="1100" b="1" kern="1200">
+          <a:endParaRPr lang="de-DE" sz="1600" b="0" kern="1200">
             <a:solidFill>
               <a:srgbClr val="000000"/>
             </a:solidFill>
@@ -3499,8 +4313,169 @@
         </a:p>
       </dsp:txBody>
       <dsp:txXfrm>
-        <a:off x="3605231" y="1803192"/>
-        <a:ext cx="111809" cy="64381"/>
+        <a:off x="3287224" y="576570"/>
+        <a:ext cx="150372" cy="101988"/>
+      </dsp:txXfrm>
+    </dsp:sp>
+    <dsp:sp modelId="{6D5F24C4-C754-0346-9A17-9000437579E8}">
+      <dsp:nvSpPr>
+        <dsp:cNvPr id="0" name=""/>
+        <dsp:cNvSpPr/>
+      </dsp:nvSpPr>
+      <dsp:spPr>
+        <a:xfrm>
+          <a:off x="3505285" y="297656"/>
+          <a:ext cx="1508424" cy="659815"/>
+        </a:xfrm>
+        <a:prstGeom prst="roundRect">
+          <a:avLst>
+            <a:gd name="adj" fmla="val 10000"/>
+          </a:avLst>
+        </a:prstGeom>
+        <a:solidFill>
+          <a:schemeClr val="accent3">
+            <a:alpha val="90000"/>
+            <a:hueOff val="0"/>
+            <a:satOff val="0"/>
+            <a:lumOff val="0"/>
+            <a:alphaOff val="-26667"/>
+          </a:schemeClr>
+        </a:solidFill>
+        <a:ln w="25400" cap="flat" cmpd="sng" algn="ctr">
+          <a:solidFill>
+            <a:schemeClr val="lt1">
+              <a:hueOff val="0"/>
+              <a:satOff val="0"/>
+              <a:lumOff val="0"/>
+              <a:alphaOff val="0"/>
+            </a:schemeClr>
+          </a:solidFill>
+          <a:prstDash val="solid"/>
+        </a:ln>
+        <a:effectLst/>
+      </dsp:spPr>
+      <dsp:style>
+        <a:lnRef idx="2">
+          <a:scrgbClr r="0" g="0" b="0"/>
+        </a:lnRef>
+        <a:fillRef idx="1">
+          <a:scrgbClr r="0" g="0" b="0"/>
+        </a:fillRef>
+        <a:effectRef idx="0">
+          <a:scrgbClr r="0" g="0" b="0"/>
+        </a:effectRef>
+        <a:fontRef idx="minor">
+          <a:schemeClr val="lt1"/>
+        </a:fontRef>
+      </dsp:style>
+      <dsp:txBody>
+        <a:bodyPr spcFirstLastPara="0" vert="horz" wrap="square" lIns="60960" tIns="60960" rIns="60960" bIns="60960" numCol="1" spcCol="1270" anchor="ctr" anchorCtr="0">
+          <a:noAutofit/>
+        </a:bodyPr>
+        <a:lstStyle/>
+        <a:p>
+          <a:pPr lvl="0" algn="ctr" defTabSz="711200">
+            <a:lnSpc>
+              <a:spcPct val="90000"/>
+            </a:lnSpc>
+            <a:spcBef>
+              <a:spcPct val="0"/>
+            </a:spcBef>
+            <a:spcAft>
+              <a:spcPct val="35000"/>
+            </a:spcAft>
+          </a:pPr>
+          <a:r>
+            <a:rPr lang="de-DE" sz="1600" b="0" kern="1200" dirty="0" smtClean="0">
+              <a:solidFill>
+                <a:srgbClr val="000000"/>
+              </a:solidFill>
+            </a:rPr>
+            <a:t>Bauteile einkaufen</a:t>
+          </a:r>
+          <a:endParaRPr lang="de-DE" sz="1600" b="0" kern="1200" dirty="0">
+            <a:solidFill>
+              <a:srgbClr val="000000"/>
+            </a:solidFill>
+          </a:endParaRPr>
+        </a:p>
+      </dsp:txBody>
+      <dsp:txXfrm>
+        <a:off x="3524610" y="316981"/>
+        <a:ext cx="1469774" cy="621165"/>
+      </dsp:txXfrm>
+    </dsp:sp>
+    <dsp:sp modelId="{2CDEA237-215F-6048-A36D-CA48F653B9F0}">
+      <dsp:nvSpPr>
+        <dsp:cNvPr id="0" name=""/>
+        <dsp:cNvSpPr/>
+      </dsp:nvSpPr>
+      <dsp:spPr>
+        <a:xfrm>
+          <a:off x="5037665" y="542574"/>
+          <a:ext cx="201366" cy="169980"/>
+        </a:xfrm>
+        <a:prstGeom prst="rightArrow">
+          <a:avLst>
+            <a:gd name="adj1" fmla="val 60000"/>
+            <a:gd name="adj2" fmla="val 50000"/>
+          </a:avLst>
+        </a:prstGeom>
+        <a:solidFill>
+          <a:schemeClr val="accent3">
+            <a:shade val="90000"/>
+            <a:hueOff val="-413290"/>
+            <a:satOff val="-30676"/>
+            <a:lumOff val="41205"/>
+            <a:alphaOff val="0"/>
+          </a:schemeClr>
+        </a:solidFill>
+        <a:ln>
+          <a:noFill/>
+        </a:ln>
+        <a:effectLst/>
+      </dsp:spPr>
+      <dsp:style>
+        <a:lnRef idx="0">
+          <a:scrgbClr r="0" g="0" b="0"/>
+        </a:lnRef>
+        <a:fillRef idx="1">
+          <a:scrgbClr r="0" g="0" b="0"/>
+        </a:fillRef>
+        <a:effectRef idx="0">
+          <a:scrgbClr r="0" g="0" b="0"/>
+        </a:effectRef>
+        <a:fontRef idx="minor">
+          <a:schemeClr val="lt1"/>
+        </a:fontRef>
+      </dsp:style>
+      <dsp:txBody>
+        <a:bodyPr spcFirstLastPara="0" vert="horz" wrap="square" lIns="0" tIns="0" rIns="0" bIns="0" numCol="1" spcCol="1270" anchor="ctr" anchorCtr="0">
+          <a:noAutofit/>
+        </a:bodyPr>
+        <a:lstStyle/>
+        <a:p>
+          <a:pPr lvl="0" algn="ctr" defTabSz="711200">
+            <a:lnSpc>
+              <a:spcPct val="90000"/>
+            </a:lnSpc>
+            <a:spcBef>
+              <a:spcPct val="0"/>
+            </a:spcBef>
+            <a:spcAft>
+              <a:spcPct val="35000"/>
+            </a:spcAft>
+          </a:pPr>
+          <a:endParaRPr lang="de-DE" sz="1600" b="0" kern="1200">
+            <a:solidFill>
+              <a:srgbClr val="000000"/>
+            </a:solidFill>
+          </a:endParaRPr>
+        </a:p>
+      </dsp:txBody>
+      <dsp:txXfrm>
+        <a:off x="5037665" y="576570"/>
+        <a:ext cx="150372" cy="101988"/>
       </dsp:txXfrm>
     </dsp:sp>
     <dsp:sp modelId="{EF9A7DCF-E5B0-2C49-805A-AC2B4B728B76}">
@@ -3510,8 +4485,269 @@
       </dsp:nvSpPr>
       <dsp:spPr>
         <a:xfrm>
-          <a:off x="3761170" y="1527803"/>
-          <a:ext cx="1078694" cy="615160"/>
+          <a:off x="5255727" y="297656"/>
+          <a:ext cx="1508424" cy="659815"/>
+        </a:xfrm>
+        <a:prstGeom prst="roundRect">
+          <a:avLst>
+            <a:gd name="adj" fmla="val 10000"/>
+          </a:avLst>
+        </a:prstGeom>
+        <a:solidFill>
+          <a:schemeClr val="accent3">
+            <a:alpha val="90000"/>
+            <a:hueOff val="0"/>
+            <a:satOff val="0"/>
+            <a:lumOff val="0"/>
+            <a:alphaOff val="-40000"/>
+          </a:schemeClr>
+        </a:solidFill>
+        <a:ln w="25400" cap="flat" cmpd="sng" algn="ctr">
+          <a:solidFill>
+            <a:schemeClr val="lt1">
+              <a:hueOff val="0"/>
+              <a:satOff val="0"/>
+              <a:lumOff val="0"/>
+              <a:alphaOff val="0"/>
+            </a:schemeClr>
+          </a:solidFill>
+          <a:prstDash val="solid"/>
+        </a:ln>
+        <a:effectLst/>
+      </dsp:spPr>
+      <dsp:style>
+        <a:lnRef idx="2">
+          <a:scrgbClr r="0" g="0" b="0"/>
+        </a:lnRef>
+        <a:fillRef idx="1">
+          <a:scrgbClr r="0" g="0" b="0"/>
+        </a:fillRef>
+        <a:effectRef idx="0">
+          <a:scrgbClr r="0" g="0" b="0"/>
+        </a:effectRef>
+        <a:fontRef idx="minor">
+          <a:schemeClr val="lt1"/>
+        </a:fontRef>
+      </dsp:style>
+      <dsp:txBody>
+        <a:bodyPr spcFirstLastPara="0" vert="horz" wrap="square" lIns="60960" tIns="60960" rIns="60960" bIns="60960" numCol="1" spcCol="1270" anchor="ctr" anchorCtr="0">
+          <a:noAutofit/>
+        </a:bodyPr>
+        <a:lstStyle/>
+        <a:p>
+          <a:pPr lvl="0" algn="ctr" defTabSz="711200">
+            <a:lnSpc>
+              <a:spcPct val="90000"/>
+            </a:lnSpc>
+            <a:spcBef>
+              <a:spcPct val="0"/>
+            </a:spcBef>
+            <a:spcAft>
+              <a:spcPct val="35000"/>
+            </a:spcAft>
+          </a:pPr>
+          <a:r>
+            <a:rPr lang="de-DE" sz="1600" b="0" kern="1200" dirty="0" smtClean="0">
+              <a:solidFill>
+                <a:srgbClr val="000000"/>
+              </a:solidFill>
+            </a:rPr>
+            <a:t>Personal verwalten</a:t>
+          </a:r>
+          <a:endParaRPr lang="de-DE" sz="1600" b="0" kern="1200" dirty="0">
+            <a:solidFill>
+              <a:srgbClr val="000000"/>
+            </a:solidFill>
+          </a:endParaRPr>
+        </a:p>
+      </dsp:txBody>
+      <dsp:txXfrm>
+        <a:off x="5275052" y="316981"/>
+        <a:ext cx="1469774" cy="621165"/>
+      </dsp:txXfrm>
+    </dsp:sp>
+  </dsp:spTree>
+</dsp:drawing>
+</file>
+
+<file path=ppt/diagrams/drawing3.xml><?xml version="1.0" encoding="utf-8"?>
+<dsp:drawing xmlns:dgm="http://schemas.openxmlformats.org/drawingml/2006/diagram" xmlns:dsp="http://schemas.microsoft.com/office/drawing/2008/diagram" xmlns:a="http://schemas.openxmlformats.org/drawingml/2006/main">
+  <dsp:spTree>
+    <dsp:nvGrpSpPr>
+      <dsp:cNvPr id="0" name=""/>
+      <dsp:cNvGrpSpPr/>
+    </dsp:nvGrpSpPr>
+    <dsp:grpSpPr/>
+    <dsp:sp modelId="{E6425510-8B26-7849-A295-79452E90961A}">
+      <dsp:nvSpPr>
+        <dsp:cNvPr id="0" name=""/>
+        <dsp:cNvSpPr/>
+      </dsp:nvSpPr>
+      <dsp:spPr>
+        <a:xfrm>
+          <a:off x="3871" y="566102"/>
+          <a:ext cx="1616769" cy="656795"/>
+        </a:xfrm>
+        <a:prstGeom prst="roundRect">
+          <a:avLst>
+            <a:gd name="adj" fmla="val 10000"/>
+          </a:avLst>
+        </a:prstGeom>
+        <a:solidFill>
+          <a:schemeClr val="accent3">
+            <a:alpha val="90000"/>
+            <a:hueOff val="0"/>
+            <a:satOff val="0"/>
+            <a:lumOff val="0"/>
+            <a:alphaOff val="0"/>
+          </a:schemeClr>
+        </a:solidFill>
+        <a:ln w="25400" cap="flat" cmpd="sng" algn="ctr">
+          <a:solidFill>
+            <a:schemeClr val="lt1">
+              <a:hueOff val="0"/>
+              <a:satOff val="0"/>
+              <a:lumOff val="0"/>
+              <a:alphaOff val="0"/>
+            </a:schemeClr>
+          </a:solidFill>
+          <a:prstDash val="solid"/>
+        </a:ln>
+        <a:effectLst/>
+      </dsp:spPr>
+      <dsp:style>
+        <a:lnRef idx="2">
+          <a:scrgbClr r="0" g="0" b="0"/>
+        </a:lnRef>
+        <a:fillRef idx="1">
+          <a:scrgbClr r="0" g="0" b="0"/>
+        </a:fillRef>
+        <a:effectRef idx="0">
+          <a:scrgbClr r="0" g="0" b="0"/>
+        </a:effectRef>
+        <a:fontRef idx="minor">
+          <a:schemeClr val="lt1"/>
+        </a:fontRef>
+      </dsp:style>
+      <dsp:txBody>
+        <a:bodyPr spcFirstLastPara="0" vert="horz" wrap="square" lIns="60960" tIns="60960" rIns="60960" bIns="60960" numCol="1" spcCol="1270" anchor="ctr" anchorCtr="0">
+          <a:noAutofit/>
+        </a:bodyPr>
+        <a:lstStyle/>
+        <a:p>
+          <a:pPr lvl="0" algn="ctr" defTabSz="711200">
+            <a:lnSpc>
+              <a:spcPct val="90000"/>
+            </a:lnSpc>
+            <a:spcBef>
+              <a:spcPct val="0"/>
+            </a:spcBef>
+            <a:spcAft>
+              <a:spcPct val="35000"/>
+            </a:spcAft>
+          </a:pPr>
+          <a:r>
+            <a:rPr lang="de-DE" sz="1600" b="0" kern="1200" dirty="0" smtClean="0">
+              <a:solidFill>
+                <a:srgbClr val="000000"/>
+              </a:solidFill>
+            </a:rPr>
+            <a:t>Produktion der Raumschiffe</a:t>
+          </a:r>
+          <a:endParaRPr lang="de-DE" sz="1600" b="0" kern="1200" dirty="0">
+            <a:solidFill>
+              <a:srgbClr val="000000"/>
+            </a:solidFill>
+          </a:endParaRPr>
+        </a:p>
+      </dsp:txBody>
+      <dsp:txXfrm>
+        <a:off x="23108" y="585339"/>
+        <a:ext cx="1578295" cy="618321"/>
+      </dsp:txXfrm>
+    </dsp:sp>
+    <dsp:sp modelId="{E480A885-A9E0-FD4E-A5CF-CDBA992E26F6}">
+      <dsp:nvSpPr>
+        <dsp:cNvPr id="0" name=""/>
+        <dsp:cNvSpPr/>
+      </dsp:nvSpPr>
+      <dsp:spPr>
+        <a:xfrm>
+          <a:off x="1635103" y="814085"/>
+          <a:ext cx="238257" cy="160828"/>
+        </a:xfrm>
+        <a:prstGeom prst="rightArrow">
+          <a:avLst>
+            <a:gd name="adj1" fmla="val 60000"/>
+            <a:gd name="adj2" fmla="val 50000"/>
+          </a:avLst>
+        </a:prstGeom>
+        <a:solidFill>
+          <a:schemeClr val="accent3">
+            <a:shade val="90000"/>
+            <a:hueOff val="0"/>
+            <a:satOff val="0"/>
+            <a:lumOff val="0"/>
+            <a:alphaOff val="0"/>
+          </a:schemeClr>
+        </a:solidFill>
+        <a:ln>
+          <a:noFill/>
+        </a:ln>
+        <a:effectLst/>
+      </dsp:spPr>
+      <dsp:style>
+        <a:lnRef idx="0">
+          <a:scrgbClr r="0" g="0" b="0"/>
+        </a:lnRef>
+        <a:fillRef idx="1">
+          <a:scrgbClr r="0" g="0" b="0"/>
+        </a:fillRef>
+        <a:effectRef idx="0">
+          <a:scrgbClr r="0" g="0" b="0"/>
+        </a:effectRef>
+        <a:fontRef idx="minor">
+          <a:schemeClr val="lt1"/>
+        </a:fontRef>
+      </dsp:style>
+      <dsp:txBody>
+        <a:bodyPr spcFirstLastPara="0" vert="horz" wrap="square" lIns="0" tIns="0" rIns="0" bIns="0" numCol="1" spcCol="1270" anchor="ctr" anchorCtr="0">
+          <a:noAutofit/>
+        </a:bodyPr>
+        <a:lstStyle/>
+        <a:p>
+          <a:pPr lvl="0" algn="ctr" defTabSz="711200">
+            <a:lnSpc>
+              <a:spcPct val="90000"/>
+            </a:lnSpc>
+            <a:spcBef>
+              <a:spcPct val="0"/>
+            </a:spcBef>
+            <a:spcAft>
+              <a:spcPct val="35000"/>
+            </a:spcAft>
+          </a:pPr>
+          <a:endParaRPr lang="de-DE" sz="1600" b="0" kern="1200">
+            <a:solidFill>
+              <a:srgbClr val="000000"/>
+            </a:solidFill>
+          </a:endParaRPr>
+        </a:p>
+      </dsp:txBody>
+      <dsp:txXfrm>
+        <a:off x="1635103" y="846251"/>
+        <a:ext cx="190009" cy="96496"/>
+      </dsp:txXfrm>
+    </dsp:sp>
+    <dsp:sp modelId="{D17F0578-8FEE-8A4E-AB84-16BEC830AA93}">
+      <dsp:nvSpPr>
+        <dsp:cNvPr id="0" name=""/>
+        <dsp:cNvSpPr/>
+      </dsp:nvSpPr>
+      <dsp:spPr>
+        <a:xfrm>
+          <a:off x="1880041" y="566102"/>
+          <a:ext cx="1616769" cy="656795"/>
         </a:xfrm>
         <a:prstGeom prst="roundRect">
           <a:avLst>
@@ -3555,12 +4791,12 @@
         </a:fontRef>
       </dsp:style>
       <dsp:txBody>
-        <a:bodyPr spcFirstLastPara="0" vert="horz" wrap="square" lIns="41910" tIns="41910" rIns="41910" bIns="41910" numCol="1" spcCol="1270" anchor="ctr" anchorCtr="0">
+        <a:bodyPr spcFirstLastPara="0" vert="horz" wrap="square" lIns="60960" tIns="60960" rIns="60960" bIns="60960" numCol="1" spcCol="1270" anchor="ctr" anchorCtr="0">
           <a:noAutofit/>
         </a:bodyPr>
         <a:lstStyle/>
         <a:p>
-          <a:pPr lvl="0" algn="ctr" defTabSz="488950">
+          <a:pPr lvl="0" algn="ctr" defTabSz="711200">
             <a:lnSpc>
               <a:spcPct val="90000"/>
             </a:lnSpc>
@@ -3572,14 +4808,14 @@
             </a:spcAft>
           </a:pPr>
           <a:r>
-            <a:rPr lang="de-DE" sz="1100" b="1" kern="1200" dirty="0" smtClean="0">
+            <a:rPr lang="de-DE" sz="1600" b="0" kern="1200" dirty="0" smtClean="0">
               <a:solidFill>
                 <a:srgbClr val="000000"/>
               </a:solidFill>
             </a:rPr>
-            <a:t>Personal verwalten</a:t>
+            <a:t>Verkaufspreis angeben</a:t>
           </a:r>
-          <a:endParaRPr lang="de-DE" sz="1100" b="1" kern="1200" dirty="0">
+          <a:endParaRPr lang="de-DE" sz="1600" b="0" kern="1200" dirty="0">
             <a:solidFill>
               <a:srgbClr val="000000"/>
             </a:solidFill>
@@ -3587,341 +4823,19 @@
         </a:p>
       </dsp:txBody>
       <dsp:txXfrm>
-        <a:off x="3779187" y="1545820"/>
-        <a:ext cx="1042660" cy="579126"/>
+        <a:off x="1899278" y="585339"/>
+        <a:ext cx="1578295" cy="618321"/>
       </dsp:txXfrm>
     </dsp:sp>
-    <dsp:sp modelId="{3A5AC82B-7463-1047-85AB-EC94B837835A}">
+    <dsp:sp modelId="{E96175F9-A158-C843-9DD7-C6D35B266C27}">
       <dsp:nvSpPr>
         <dsp:cNvPr id="0" name=""/>
         <dsp:cNvSpPr/>
       </dsp:nvSpPr>
       <dsp:spPr>
         <a:xfrm>
-          <a:off x="4856995" y="1781731"/>
-          <a:ext cx="144000" cy="107303"/>
-        </a:xfrm>
-        <a:prstGeom prst="rightArrow">
-          <a:avLst>
-            <a:gd name="adj1" fmla="val 60000"/>
-            <a:gd name="adj2" fmla="val 50000"/>
-          </a:avLst>
-        </a:prstGeom>
-        <a:solidFill>
-          <a:schemeClr val="accent3">
-            <a:shade val="90000"/>
-            <a:hueOff val="-247974"/>
-            <a:satOff val="-18406"/>
-            <a:lumOff val="24723"/>
-            <a:alphaOff val="0"/>
-          </a:schemeClr>
-        </a:solidFill>
-        <a:ln>
-          <a:noFill/>
-        </a:ln>
-        <a:effectLst/>
-      </dsp:spPr>
-      <dsp:style>
-        <a:lnRef idx="0">
-          <a:scrgbClr r="0" g="0" b="0"/>
-        </a:lnRef>
-        <a:fillRef idx="1">
-          <a:scrgbClr r="0" g="0" b="0"/>
-        </a:fillRef>
-        <a:effectRef idx="0">
-          <a:scrgbClr r="0" g="0" b="0"/>
-        </a:effectRef>
-        <a:fontRef idx="minor">
-          <a:schemeClr val="lt1"/>
-        </a:fontRef>
-      </dsp:style>
-      <dsp:txBody>
-        <a:bodyPr spcFirstLastPara="0" vert="horz" wrap="square" lIns="0" tIns="0" rIns="0" bIns="0" numCol="1" spcCol="1270" anchor="ctr" anchorCtr="0">
-          <a:noAutofit/>
-        </a:bodyPr>
-        <a:lstStyle/>
-        <a:p>
-          <a:pPr lvl="0" algn="ctr" defTabSz="488950">
-            <a:lnSpc>
-              <a:spcPct val="90000"/>
-            </a:lnSpc>
-            <a:spcBef>
-              <a:spcPct val="0"/>
-            </a:spcBef>
-            <a:spcAft>
-              <a:spcPct val="35000"/>
-            </a:spcAft>
-          </a:pPr>
-          <a:endParaRPr lang="de-DE" sz="1100" b="1" kern="1200">
-            <a:solidFill>
-              <a:srgbClr val="000000"/>
-            </a:solidFill>
-          </a:endParaRPr>
-        </a:p>
-      </dsp:txBody>
-      <dsp:txXfrm>
-        <a:off x="4856995" y="1803192"/>
-        <a:ext cx="111809" cy="64381"/>
-      </dsp:txXfrm>
-    </dsp:sp>
-    <dsp:sp modelId="{E9040923-0347-3940-94B6-75FF8AF184B0}">
-      <dsp:nvSpPr>
-        <dsp:cNvPr id="0" name=""/>
-        <dsp:cNvSpPr/>
-      </dsp:nvSpPr>
-      <dsp:spPr>
-        <a:xfrm>
-          <a:off x="5012934" y="1527803"/>
-          <a:ext cx="1078694" cy="615160"/>
-        </a:xfrm>
-        <a:prstGeom prst="roundRect">
-          <a:avLst>
-            <a:gd name="adj" fmla="val 10000"/>
-          </a:avLst>
-        </a:prstGeom>
-        <a:solidFill>
-          <a:schemeClr val="accent3">
-            <a:alpha val="90000"/>
-            <a:hueOff val="0"/>
-            <a:satOff val="0"/>
-            <a:lumOff val="0"/>
-            <a:alphaOff val="-26667"/>
-          </a:schemeClr>
-        </a:solidFill>
-        <a:ln w="25400" cap="flat" cmpd="sng" algn="ctr">
-          <a:solidFill>
-            <a:schemeClr val="lt1">
-              <a:hueOff val="0"/>
-              <a:satOff val="0"/>
-              <a:lumOff val="0"/>
-              <a:alphaOff val="0"/>
-            </a:schemeClr>
-          </a:solidFill>
-          <a:prstDash val="solid"/>
-        </a:ln>
-        <a:effectLst/>
-      </dsp:spPr>
-      <dsp:style>
-        <a:lnRef idx="2">
-          <a:scrgbClr r="0" g="0" b="0"/>
-        </a:lnRef>
-        <a:fillRef idx="1">
-          <a:scrgbClr r="0" g="0" b="0"/>
-        </a:fillRef>
-        <a:effectRef idx="0">
-          <a:scrgbClr r="0" g="0" b="0"/>
-        </a:effectRef>
-        <a:fontRef idx="minor">
-          <a:schemeClr val="lt1"/>
-        </a:fontRef>
-      </dsp:style>
-      <dsp:txBody>
-        <a:bodyPr spcFirstLastPara="0" vert="horz" wrap="square" lIns="41910" tIns="41910" rIns="41910" bIns="41910" numCol="1" spcCol="1270" anchor="ctr" anchorCtr="0">
-          <a:noAutofit/>
-        </a:bodyPr>
-        <a:lstStyle/>
-        <a:p>
-          <a:pPr lvl="0" algn="ctr" defTabSz="488950">
-            <a:lnSpc>
-              <a:spcPct val="90000"/>
-            </a:lnSpc>
-            <a:spcBef>
-              <a:spcPct val="0"/>
-            </a:spcBef>
-            <a:spcAft>
-              <a:spcPct val="35000"/>
-            </a:spcAft>
-          </a:pPr>
-          <a:r>
-            <a:rPr lang="de-DE" sz="1100" b="1" kern="1200" dirty="0" smtClean="0">
-              <a:solidFill>
-                <a:srgbClr val="000000"/>
-              </a:solidFill>
-            </a:rPr>
-            <a:t>Produktion der Raumschiffe</a:t>
-          </a:r>
-          <a:endParaRPr lang="de-DE" sz="1100" b="1" kern="1200" dirty="0">
-            <a:solidFill>
-              <a:srgbClr val="000000"/>
-            </a:solidFill>
-          </a:endParaRPr>
-        </a:p>
-      </dsp:txBody>
-      <dsp:txXfrm>
-        <a:off x="5030951" y="1545820"/>
-        <a:ext cx="1042660" cy="579126"/>
-      </dsp:txXfrm>
-    </dsp:sp>
-    <dsp:sp modelId="{B81F8AF9-FF83-714C-9CEE-E2E108C4A052}">
-      <dsp:nvSpPr>
-        <dsp:cNvPr id="0" name=""/>
-        <dsp:cNvSpPr/>
-      </dsp:nvSpPr>
-      <dsp:spPr>
-        <a:xfrm>
-          <a:off x="6108759" y="1781731"/>
-          <a:ext cx="144000" cy="107303"/>
-        </a:xfrm>
-        <a:prstGeom prst="rightArrow">
-          <a:avLst>
-            <a:gd name="adj1" fmla="val 60000"/>
-            <a:gd name="adj2" fmla="val 50000"/>
-          </a:avLst>
-        </a:prstGeom>
-        <a:solidFill>
-          <a:schemeClr val="accent3">
-            <a:shade val="90000"/>
-            <a:hueOff val="-330632"/>
-            <a:satOff val="-24541"/>
-            <a:lumOff val="32964"/>
-            <a:alphaOff val="0"/>
-          </a:schemeClr>
-        </a:solidFill>
-        <a:ln>
-          <a:noFill/>
-        </a:ln>
-        <a:effectLst/>
-      </dsp:spPr>
-      <dsp:style>
-        <a:lnRef idx="0">
-          <a:scrgbClr r="0" g="0" b="0"/>
-        </a:lnRef>
-        <a:fillRef idx="1">
-          <a:scrgbClr r="0" g="0" b="0"/>
-        </a:fillRef>
-        <a:effectRef idx="0">
-          <a:scrgbClr r="0" g="0" b="0"/>
-        </a:effectRef>
-        <a:fontRef idx="minor">
-          <a:schemeClr val="lt1"/>
-        </a:fontRef>
-      </dsp:style>
-      <dsp:txBody>
-        <a:bodyPr spcFirstLastPara="0" vert="horz" wrap="square" lIns="0" tIns="0" rIns="0" bIns="0" numCol="1" spcCol="1270" anchor="ctr" anchorCtr="0">
-          <a:noAutofit/>
-        </a:bodyPr>
-        <a:lstStyle/>
-        <a:p>
-          <a:pPr lvl="0" algn="ctr" defTabSz="488950">
-            <a:lnSpc>
-              <a:spcPct val="90000"/>
-            </a:lnSpc>
-            <a:spcBef>
-              <a:spcPct val="0"/>
-            </a:spcBef>
-            <a:spcAft>
-              <a:spcPct val="35000"/>
-            </a:spcAft>
-          </a:pPr>
-          <a:endParaRPr lang="de-DE" sz="1100" b="1" kern="1200">
-            <a:solidFill>
-              <a:srgbClr val="000000"/>
-            </a:solidFill>
-          </a:endParaRPr>
-        </a:p>
-      </dsp:txBody>
-      <dsp:txXfrm>
-        <a:off x="6108759" y="1803192"/>
-        <a:ext cx="111809" cy="64381"/>
-      </dsp:txXfrm>
-    </dsp:sp>
-    <dsp:sp modelId="{8B2FAF1A-C258-A84D-B1E1-138BBC85B83B}">
-      <dsp:nvSpPr>
-        <dsp:cNvPr id="0" name=""/>
-        <dsp:cNvSpPr/>
-      </dsp:nvSpPr>
-      <dsp:spPr>
-        <a:xfrm>
-          <a:off x="6264697" y="1527803"/>
-          <a:ext cx="1078694" cy="615160"/>
-        </a:xfrm>
-        <a:prstGeom prst="roundRect">
-          <a:avLst>
-            <a:gd name="adj" fmla="val 10000"/>
-          </a:avLst>
-        </a:prstGeom>
-        <a:solidFill>
-          <a:schemeClr val="accent3">
-            <a:alpha val="90000"/>
-            <a:hueOff val="0"/>
-            <a:satOff val="0"/>
-            <a:lumOff val="0"/>
-            <a:alphaOff val="-33333"/>
-          </a:schemeClr>
-        </a:solidFill>
-        <a:ln w="25400" cap="flat" cmpd="sng" algn="ctr">
-          <a:solidFill>
-            <a:schemeClr val="lt1">
-              <a:hueOff val="0"/>
-              <a:satOff val="0"/>
-              <a:lumOff val="0"/>
-              <a:alphaOff val="0"/>
-            </a:schemeClr>
-          </a:solidFill>
-          <a:prstDash val="solid"/>
-        </a:ln>
-        <a:effectLst/>
-      </dsp:spPr>
-      <dsp:style>
-        <a:lnRef idx="2">
-          <a:scrgbClr r="0" g="0" b="0"/>
-        </a:lnRef>
-        <a:fillRef idx="1">
-          <a:scrgbClr r="0" g="0" b="0"/>
-        </a:fillRef>
-        <a:effectRef idx="0">
-          <a:scrgbClr r="0" g="0" b="0"/>
-        </a:effectRef>
-        <a:fontRef idx="minor">
-          <a:schemeClr val="lt1"/>
-        </a:fontRef>
-      </dsp:style>
-      <dsp:txBody>
-        <a:bodyPr spcFirstLastPara="0" vert="horz" wrap="square" lIns="41910" tIns="41910" rIns="41910" bIns="41910" numCol="1" spcCol="1270" anchor="ctr" anchorCtr="0">
-          <a:noAutofit/>
-        </a:bodyPr>
-        <a:lstStyle/>
-        <a:p>
-          <a:pPr lvl="0" algn="ctr" defTabSz="488950">
-            <a:lnSpc>
-              <a:spcPct val="90000"/>
-            </a:lnSpc>
-            <a:spcBef>
-              <a:spcPct val="0"/>
-            </a:spcBef>
-            <a:spcAft>
-              <a:spcPct val="35000"/>
-            </a:spcAft>
-          </a:pPr>
-          <a:r>
-            <a:rPr lang="de-DE" sz="1100" b="1" kern="1200" dirty="0" smtClean="0">
-              <a:solidFill>
-                <a:srgbClr val="000000"/>
-              </a:solidFill>
-            </a:rPr>
-            <a:t>Verkaufspreis angeben</a:t>
-          </a:r>
-          <a:endParaRPr lang="de-DE" sz="1100" b="1" kern="1200" dirty="0">
-            <a:solidFill>
-              <a:srgbClr val="000000"/>
-            </a:solidFill>
-          </a:endParaRPr>
-        </a:p>
-      </dsp:txBody>
-      <dsp:txXfrm>
-        <a:off x="6282714" y="1545820"/>
-        <a:ext cx="1042660" cy="579126"/>
-      </dsp:txXfrm>
-    </dsp:sp>
-    <dsp:sp modelId="{337DA1A1-C713-7A4B-9877-A8F9D2567B3E}">
-      <dsp:nvSpPr>
-        <dsp:cNvPr id="0" name=""/>
-        <dsp:cNvSpPr/>
-      </dsp:nvSpPr>
-      <dsp:spPr>
-        <a:xfrm>
-          <a:off x="7360522" y="1781731"/>
-          <a:ext cx="144000" cy="107303"/>
+          <a:off x="3511272" y="814085"/>
+          <a:ext cx="238257" cy="160828"/>
         </a:xfrm>
         <a:prstGeom prst="rightArrow">
           <a:avLst>
@@ -3963,7 +4877,7 @@
         </a:bodyPr>
         <a:lstStyle/>
         <a:p>
-          <a:pPr lvl="0" algn="ctr" defTabSz="488950">
+          <a:pPr lvl="0" algn="ctr" defTabSz="711200">
             <a:lnSpc>
               <a:spcPct val="90000"/>
             </a:lnSpc>
@@ -3974,7 +4888,7 @@
               <a:spcPct val="35000"/>
             </a:spcAft>
           </a:pPr>
-          <a:endParaRPr lang="de-DE" sz="1100" b="1" kern="1200">
+          <a:endParaRPr lang="de-DE" sz="1600" b="0" kern="1200">
             <a:solidFill>
               <a:srgbClr val="000000"/>
             </a:solidFill>
@@ -3982,19 +4896,19 @@
         </a:p>
       </dsp:txBody>
       <dsp:txXfrm>
-        <a:off x="7360522" y="1803192"/>
-        <a:ext cx="111809" cy="64381"/>
+        <a:off x="3511272" y="846251"/>
+        <a:ext cx="190009" cy="96496"/>
       </dsp:txXfrm>
     </dsp:sp>
-    <dsp:sp modelId="{E9DC2F37-07D7-4447-BB56-EA2233686C2B}">
+    <dsp:sp modelId="{C0EF3B12-5BA0-4C4A-A8C7-7CC0D8910FD8}">
       <dsp:nvSpPr>
         <dsp:cNvPr id="0" name=""/>
         <dsp:cNvSpPr/>
       </dsp:nvSpPr>
       <dsp:spPr>
         <a:xfrm>
-          <a:off x="7516461" y="1527803"/>
-          <a:ext cx="1078694" cy="615160"/>
+          <a:off x="3756210" y="566102"/>
+          <a:ext cx="1616769" cy="656795"/>
         </a:xfrm>
         <a:prstGeom prst="roundRect">
           <a:avLst>
@@ -4038,12 +4952,12 @@
         </a:fontRef>
       </dsp:style>
       <dsp:txBody>
-        <a:bodyPr spcFirstLastPara="0" vert="horz" wrap="square" lIns="41910" tIns="41910" rIns="41910" bIns="41910" numCol="1" spcCol="1270" anchor="ctr" anchorCtr="0">
+        <a:bodyPr spcFirstLastPara="0" vert="horz" wrap="square" lIns="60960" tIns="60960" rIns="60960" bIns="60960" numCol="1" spcCol="1270" anchor="ctr" anchorCtr="0">
           <a:noAutofit/>
         </a:bodyPr>
         <a:lstStyle/>
         <a:p>
-          <a:pPr lvl="0" algn="ctr" defTabSz="488950">
+          <a:pPr lvl="0" algn="ctr" defTabSz="711200">
             <a:lnSpc>
               <a:spcPct val="90000"/>
             </a:lnSpc>
@@ -4055,14 +4969,14 @@
             </a:spcAft>
           </a:pPr>
           <a:r>
-            <a:rPr lang="de-DE" sz="1100" b="1" kern="1200" dirty="0" smtClean="0">
+            <a:rPr lang="de-DE" sz="1600" b="0" kern="1200" dirty="0" smtClean="0">
               <a:solidFill>
                 <a:srgbClr val="000000"/>
               </a:solidFill>
             </a:rPr>
-            <a:t>End-bewertung einsehen</a:t>
+            <a:t>Endbewertung einsehen</a:t>
           </a:r>
-          <a:endParaRPr lang="de-DE" sz="1100" b="1" kern="1200" dirty="0">
+          <a:endParaRPr lang="de-DE" sz="1600" b="0" kern="1200" dirty="0">
             <a:solidFill>
               <a:srgbClr val="000000"/>
             </a:solidFill>
@@ -4070,8 +4984,8 @@
         </a:p>
       </dsp:txBody>
       <dsp:txXfrm>
-        <a:off x="7534478" y="1545820"/>
-        <a:ext cx="1042660" cy="579126"/>
+        <a:off x="3775447" y="585339"/>
+        <a:ext cx="1578295" cy="618321"/>
       </dsp:txXfrm>
     </dsp:sp>
   </dsp:spTree>
@@ -4391,6 +5305,152 @@
 </dgm:layoutDef>
 </file>
 
+<file path=ppt/diagrams/layout3.xml><?xml version="1.0" encoding="utf-8"?>
+<dgm:layoutDef xmlns:dgm="http://schemas.openxmlformats.org/drawingml/2006/diagram" xmlns:a="http://schemas.openxmlformats.org/drawingml/2006/main" uniqueId="urn:microsoft.com/office/officeart/2005/8/layout/process1">
+  <dgm:title val=""/>
+  <dgm:desc val=""/>
+  <dgm:catLst>
+    <dgm:cat type="process" pri="1000"/>
+    <dgm:cat type="convert" pri="15000"/>
+  </dgm:catLst>
+  <dgm:sampData useDef="1">
+    <dgm:dataModel>
+      <dgm:ptLst/>
+      <dgm:bg/>
+      <dgm:whole/>
+    </dgm:dataModel>
+  </dgm:sampData>
+  <dgm:styleData>
+    <dgm:dataModel>
+      <dgm:ptLst>
+        <dgm:pt modelId="0" type="doc"/>
+        <dgm:pt modelId="1"/>
+        <dgm:pt modelId="2"/>
+      </dgm:ptLst>
+      <dgm:cxnLst>
+        <dgm:cxn modelId="3" srcId="0" destId="1" srcOrd="0" destOrd="0"/>
+        <dgm:cxn modelId="4" srcId="0" destId="2" srcOrd="1" destOrd="0"/>
+      </dgm:cxnLst>
+      <dgm:bg/>
+      <dgm:whole/>
+    </dgm:dataModel>
+  </dgm:styleData>
+  <dgm:clrData>
+    <dgm:dataModel>
+      <dgm:ptLst>
+        <dgm:pt modelId="0" type="doc"/>
+        <dgm:pt modelId="1"/>
+        <dgm:pt modelId="2"/>
+        <dgm:pt modelId="3"/>
+        <dgm:pt modelId="4"/>
+      </dgm:ptLst>
+      <dgm:cxnLst>
+        <dgm:cxn modelId="5" srcId="0" destId="1" srcOrd="0" destOrd="0"/>
+        <dgm:cxn modelId="6" srcId="0" destId="2" srcOrd="1" destOrd="0"/>
+        <dgm:cxn modelId="7" srcId="0" destId="3" srcOrd="2" destOrd="0"/>
+        <dgm:cxn modelId="8" srcId="0" destId="4" srcOrd="3" destOrd="0"/>
+      </dgm:cxnLst>
+      <dgm:bg/>
+      <dgm:whole/>
+    </dgm:dataModel>
+  </dgm:clrData>
+  <dgm:layoutNode name="Name0">
+    <dgm:varLst>
+      <dgm:dir/>
+      <dgm:resizeHandles val="exact"/>
+    </dgm:varLst>
+    <dgm:choose name="Name1">
+      <dgm:if name="Name2" func="var" arg="dir" op="equ" val="norm">
+        <dgm:alg type="lin"/>
+      </dgm:if>
+      <dgm:else name="Name3">
+        <dgm:alg type="lin">
+          <dgm:param type="linDir" val="fromR"/>
+        </dgm:alg>
+      </dgm:else>
+    </dgm:choose>
+    <dgm:shape xmlns:r="http://schemas.openxmlformats.org/officeDocument/2006/relationships" r:blip="">
+      <dgm:adjLst/>
+    </dgm:shape>
+    <dgm:presOf/>
+    <dgm:constrLst>
+      <dgm:constr type="w" for="ch" ptType="node" refType="w"/>
+      <dgm:constr type="h" for="ch" ptType="node" op="equ"/>
+      <dgm:constr type="primFontSz" for="ch" ptType="node" op="equ" val="65"/>
+      <dgm:constr type="w" for="ch" ptType="sibTrans" refType="w" refFor="ch" refPtType="node" op="equ" fact="0.4"/>
+      <dgm:constr type="h" for="ch" ptType="sibTrans" op="equ"/>
+      <dgm:constr type="primFontSz" for="des" forName="connectorText" op="equ" val="55"/>
+      <dgm:constr type="primFontSz" for="des" forName="connectorText" refType="primFontSz" refFor="ch" refPtType="node" op="lte" fact="0.8"/>
+    </dgm:constrLst>
+    <dgm:ruleLst/>
+    <dgm:forEach name="nodesForEach" axis="ch" ptType="node">
+      <dgm:layoutNode name="node">
+        <dgm:varLst>
+          <dgm:bulletEnabled val="1"/>
+        </dgm:varLst>
+        <dgm:alg type="tx"/>
+        <dgm:shape xmlns:r="http://schemas.openxmlformats.org/officeDocument/2006/relationships" type="roundRect" r:blip="">
+          <dgm:adjLst>
+            <dgm:adj idx="1" val="0.1"/>
+          </dgm:adjLst>
+        </dgm:shape>
+        <dgm:presOf axis="desOrSelf" ptType="node"/>
+        <dgm:constrLst>
+          <dgm:constr type="h" refType="w" fact="0.6"/>
+          <dgm:constr type="tMarg" refType="primFontSz" fact="0.3"/>
+          <dgm:constr type="bMarg" refType="primFontSz" fact="0.3"/>
+          <dgm:constr type="lMarg" refType="primFontSz" fact="0.3"/>
+          <dgm:constr type="rMarg" refType="primFontSz" fact="0.3"/>
+        </dgm:constrLst>
+        <dgm:ruleLst>
+          <dgm:rule type="primFontSz" val="18" fact="NaN" max="NaN"/>
+          <dgm:rule type="h" val="NaN" fact="1.5" max="NaN"/>
+          <dgm:rule type="primFontSz" val="5" fact="NaN" max="NaN"/>
+          <dgm:rule type="h" val="INF" fact="NaN" max="NaN"/>
+        </dgm:ruleLst>
+      </dgm:layoutNode>
+      <dgm:forEach name="sibTransForEach" axis="followSib" ptType="sibTrans" cnt="1">
+        <dgm:layoutNode name="sibTrans">
+          <dgm:alg type="conn">
+            <dgm:param type="begPts" val="auto"/>
+            <dgm:param type="endPts" val="auto"/>
+          </dgm:alg>
+          <dgm:shape xmlns:r="http://schemas.openxmlformats.org/officeDocument/2006/relationships" type="conn" r:blip="">
+            <dgm:adjLst/>
+          </dgm:shape>
+          <dgm:presOf axis="self"/>
+          <dgm:constrLst>
+            <dgm:constr type="h" refType="w" fact="0.62"/>
+            <dgm:constr type="connDist"/>
+            <dgm:constr type="begPad" refType="connDist" fact="0.25"/>
+            <dgm:constr type="endPad" refType="connDist" fact="0.22"/>
+          </dgm:constrLst>
+          <dgm:ruleLst/>
+          <dgm:layoutNode name="connectorText">
+            <dgm:alg type="tx">
+              <dgm:param type="autoTxRot" val="grav"/>
+            </dgm:alg>
+            <dgm:shape xmlns:r="http://schemas.openxmlformats.org/officeDocument/2006/relationships" type="conn" r:blip="" hideGeom="1">
+              <dgm:adjLst/>
+            </dgm:shape>
+            <dgm:presOf axis="self"/>
+            <dgm:constrLst>
+              <dgm:constr type="lMarg"/>
+              <dgm:constr type="rMarg"/>
+              <dgm:constr type="tMarg"/>
+              <dgm:constr type="bMarg"/>
+            </dgm:constrLst>
+            <dgm:ruleLst>
+              <dgm:rule type="primFontSz" val="5" fact="NaN" max="NaN"/>
+            </dgm:ruleLst>
+          </dgm:layoutNode>
+        </dgm:layoutNode>
+      </dgm:forEach>
+    </dgm:forEach>
+  </dgm:layoutNode>
+</dgm:layoutDef>
+</file>
+
 <file path=ppt/diagrams/quickStyle1.xml><?xml version="1.0" encoding="utf-8"?>
 <dgm:styleDef xmlns:dgm="http://schemas.openxmlformats.org/drawingml/2006/diagram" xmlns:a="http://schemas.openxmlformats.org/drawingml/2006/main" uniqueId="urn:microsoft.com/office/officeart/2005/8/quickstyle/simple1">
   <dgm:title val=""/>
@@ -5426,6 +6486,1040 @@
 </file>
 
 <file path=ppt/diagrams/quickStyle2.xml><?xml version="1.0" encoding="utf-8"?>
+<dgm:styleDef xmlns:dgm="http://schemas.openxmlformats.org/drawingml/2006/diagram" xmlns:a="http://schemas.openxmlformats.org/drawingml/2006/main" uniqueId="urn:microsoft.com/office/officeart/2005/8/quickstyle/simple1">
+  <dgm:title val=""/>
+  <dgm:desc val=""/>
+  <dgm:catLst>
+    <dgm:cat type="simple" pri="10100"/>
+  </dgm:catLst>
+  <dgm:scene3d>
+    <a:camera prst="orthographicFront"/>
+    <a:lightRig rig="threePt" dir="t"/>
+  </dgm:scene3d>
+  <dgm:styleLbl name="node0">
+    <dgm:scene3d>
+      <a:camera prst="orthographicFront"/>
+      <a:lightRig rig="threePt" dir="t"/>
+    </dgm:scene3d>
+    <dgm:sp3d/>
+    <dgm:txPr/>
+    <dgm:style>
+      <a:lnRef idx="2">
+        <a:scrgbClr r="0" g="0" b="0"/>
+      </a:lnRef>
+      <a:fillRef idx="1">
+        <a:scrgbClr r="0" g="0" b="0"/>
+      </a:fillRef>
+      <a:effectRef idx="0">
+        <a:scrgbClr r="0" g="0" b="0"/>
+      </a:effectRef>
+      <a:fontRef idx="minor">
+        <a:schemeClr val="lt1"/>
+      </a:fontRef>
+    </dgm:style>
+  </dgm:styleLbl>
+  <dgm:styleLbl name="lnNode1">
+    <dgm:scene3d>
+      <a:camera prst="orthographicFront"/>
+      <a:lightRig rig="threePt" dir="t"/>
+    </dgm:scene3d>
+    <dgm:sp3d/>
+    <dgm:txPr/>
+    <dgm:style>
+      <a:lnRef idx="2">
+        <a:scrgbClr r="0" g="0" b="0"/>
+      </a:lnRef>
+      <a:fillRef idx="1">
+        <a:scrgbClr r="0" g="0" b="0"/>
+      </a:fillRef>
+      <a:effectRef idx="0">
+        <a:scrgbClr r="0" g="0" b="0"/>
+      </a:effectRef>
+      <a:fontRef idx="minor">
+        <a:schemeClr val="lt1"/>
+      </a:fontRef>
+    </dgm:style>
+  </dgm:styleLbl>
+  <dgm:styleLbl name="vennNode1">
+    <dgm:scene3d>
+      <a:camera prst="orthographicFront"/>
+      <a:lightRig rig="threePt" dir="t"/>
+    </dgm:scene3d>
+    <dgm:sp3d/>
+    <dgm:txPr/>
+    <dgm:style>
+      <a:lnRef idx="2">
+        <a:scrgbClr r="0" g="0" b="0"/>
+      </a:lnRef>
+      <a:fillRef idx="1">
+        <a:scrgbClr r="0" g="0" b="0"/>
+      </a:fillRef>
+      <a:effectRef idx="0">
+        <a:scrgbClr r="0" g="0" b="0"/>
+      </a:effectRef>
+      <a:fontRef idx="minor">
+        <a:schemeClr val="tx1"/>
+      </a:fontRef>
+    </dgm:style>
+  </dgm:styleLbl>
+  <dgm:styleLbl name="alignNode1">
+    <dgm:scene3d>
+      <a:camera prst="orthographicFront"/>
+      <a:lightRig rig="threePt" dir="t"/>
+    </dgm:scene3d>
+    <dgm:sp3d/>
+    <dgm:txPr/>
+    <dgm:style>
+      <a:lnRef idx="2">
+        <a:scrgbClr r="0" g="0" b="0"/>
+      </a:lnRef>
+      <a:fillRef idx="1">
+        <a:scrgbClr r="0" g="0" b="0"/>
+      </a:fillRef>
+      <a:effectRef idx="0">
+        <a:scrgbClr r="0" g="0" b="0"/>
+      </a:effectRef>
+      <a:fontRef idx="minor">
+        <a:schemeClr val="lt1"/>
+      </a:fontRef>
+    </dgm:style>
+  </dgm:styleLbl>
+  <dgm:styleLbl name="node1">
+    <dgm:scene3d>
+      <a:camera prst="orthographicFront"/>
+      <a:lightRig rig="threePt" dir="t"/>
+    </dgm:scene3d>
+    <dgm:sp3d/>
+    <dgm:txPr/>
+    <dgm:style>
+      <a:lnRef idx="2">
+        <a:scrgbClr r="0" g="0" b="0"/>
+      </a:lnRef>
+      <a:fillRef idx="1">
+        <a:scrgbClr r="0" g="0" b="0"/>
+      </a:fillRef>
+      <a:effectRef idx="0">
+        <a:scrgbClr r="0" g="0" b="0"/>
+      </a:effectRef>
+      <a:fontRef idx="minor">
+        <a:schemeClr val="lt1"/>
+      </a:fontRef>
+    </dgm:style>
+  </dgm:styleLbl>
+  <dgm:styleLbl name="node2">
+    <dgm:scene3d>
+      <a:camera prst="orthographicFront"/>
+      <a:lightRig rig="threePt" dir="t"/>
+    </dgm:scene3d>
+    <dgm:sp3d/>
+    <dgm:txPr/>
+    <dgm:style>
+      <a:lnRef idx="2">
+        <a:scrgbClr r="0" g="0" b="0"/>
+      </a:lnRef>
+      <a:fillRef idx="1">
+        <a:scrgbClr r="0" g="0" b="0"/>
+      </a:fillRef>
+      <a:effectRef idx="0">
+        <a:scrgbClr r="0" g="0" b="0"/>
+      </a:effectRef>
+      <a:fontRef idx="minor">
+        <a:schemeClr val="lt1"/>
+      </a:fontRef>
+    </dgm:style>
+  </dgm:styleLbl>
+  <dgm:styleLbl name="node3">
+    <dgm:scene3d>
+      <a:camera prst="orthographicFront"/>
+      <a:lightRig rig="threePt" dir="t"/>
+    </dgm:scene3d>
+    <dgm:sp3d/>
+    <dgm:txPr/>
+    <dgm:style>
+      <a:lnRef idx="2">
+        <a:scrgbClr r="0" g="0" b="0"/>
+      </a:lnRef>
+      <a:fillRef idx="1">
+        <a:scrgbClr r="0" g="0" b="0"/>
+      </a:fillRef>
+      <a:effectRef idx="0">
+        <a:scrgbClr r="0" g="0" b="0"/>
+      </a:effectRef>
+      <a:fontRef idx="minor">
+        <a:schemeClr val="lt1"/>
+      </a:fontRef>
+    </dgm:style>
+  </dgm:styleLbl>
+  <dgm:styleLbl name="node4">
+    <dgm:scene3d>
+      <a:camera prst="orthographicFront"/>
+      <a:lightRig rig="threePt" dir="t"/>
+    </dgm:scene3d>
+    <dgm:sp3d/>
+    <dgm:txPr/>
+    <dgm:style>
+      <a:lnRef idx="2">
+        <a:scrgbClr r="0" g="0" b="0"/>
+      </a:lnRef>
+      <a:fillRef idx="1">
+        <a:scrgbClr r="0" g="0" b="0"/>
+      </a:fillRef>
+      <a:effectRef idx="0">
+        <a:scrgbClr r="0" g="0" b="0"/>
+      </a:effectRef>
+      <a:fontRef idx="minor">
+        <a:schemeClr val="lt1"/>
+      </a:fontRef>
+    </dgm:style>
+  </dgm:styleLbl>
+  <dgm:styleLbl name="fgImgPlace1">
+    <dgm:scene3d>
+      <a:camera prst="orthographicFront"/>
+      <a:lightRig rig="threePt" dir="t"/>
+    </dgm:scene3d>
+    <dgm:sp3d/>
+    <dgm:txPr/>
+    <dgm:style>
+      <a:lnRef idx="2">
+        <a:scrgbClr r="0" g="0" b="0"/>
+      </a:lnRef>
+      <a:fillRef idx="1">
+        <a:scrgbClr r="0" g="0" b="0"/>
+      </a:fillRef>
+      <a:effectRef idx="0">
+        <a:scrgbClr r="0" g="0" b="0"/>
+      </a:effectRef>
+      <a:fontRef idx="minor"/>
+    </dgm:style>
+  </dgm:styleLbl>
+  <dgm:styleLbl name="alignImgPlace1">
+    <dgm:scene3d>
+      <a:camera prst="orthographicFront"/>
+      <a:lightRig rig="threePt" dir="t"/>
+    </dgm:scene3d>
+    <dgm:sp3d/>
+    <dgm:txPr/>
+    <dgm:style>
+      <a:lnRef idx="2">
+        <a:scrgbClr r="0" g="0" b="0"/>
+      </a:lnRef>
+      <a:fillRef idx="1">
+        <a:scrgbClr r="0" g="0" b="0"/>
+      </a:fillRef>
+      <a:effectRef idx="0">
+        <a:scrgbClr r="0" g="0" b="0"/>
+      </a:effectRef>
+      <a:fontRef idx="minor"/>
+    </dgm:style>
+  </dgm:styleLbl>
+  <dgm:styleLbl name="bgImgPlace1">
+    <dgm:scene3d>
+      <a:camera prst="orthographicFront"/>
+      <a:lightRig rig="threePt" dir="t"/>
+    </dgm:scene3d>
+    <dgm:sp3d/>
+    <dgm:txPr/>
+    <dgm:style>
+      <a:lnRef idx="2">
+        <a:scrgbClr r="0" g="0" b="0"/>
+      </a:lnRef>
+      <a:fillRef idx="1">
+        <a:scrgbClr r="0" g="0" b="0"/>
+      </a:fillRef>
+      <a:effectRef idx="0">
+        <a:scrgbClr r="0" g="0" b="0"/>
+      </a:effectRef>
+      <a:fontRef idx="minor"/>
+    </dgm:style>
+  </dgm:styleLbl>
+  <dgm:styleLbl name="sibTrans2D1">
+    <dgm:scene3d>
+      <a:camera prst="orthographicFront"/>
+      <a:lightRig rig="threePt" dir="t"/>
+    </dgm:scene3d>
+    <dgm:sp3d/>
+    <dgm:txPr/>
+    <dgm:style>
+      <a:lnRef idx="0">
+        <a:scrgbClr r="0" g="0" b="0"/>
+      </a:lnRef>
+      <a:fillRef idx="1">
+        <a:scrgbClr r="0" g="0" b="0"/>
+      </a:fillRef>
+      <a:effectRef idx="0">
+        <a:scrgbClr r="0" g="0" b="0"/>
+      </a:effectRef>
+      <a:fontRef idx="minor">
+        <a:schemeClr val="lt1"/>
+      </a:fontRef>
+    </dgm:style>
+  </dgm:styleLbl>
+  <dgm:styleLbl name="fgSibTrans2D1">
+    <dgm:scene3d>
+      <a:camera prst="orthographicFront"/>
+      <a:lightRig rig="threePt" dir="t"/>
+    </dgm:scene3d>
+    <dgm:sp3d/>
+    <dgm:txPr/>
+    <dgm:style>
+      <a:lnRef idx="0">
+        <a:scrgbClr r="0" g="0" b="0"/>
+      </a:lnRef>
+      <a:fillRef idx="1">
+        <a:scrgbClr r="0" g="0" b="0"/>
+      </a:fillRef>
+      <a:effectRef idx="0">
+        <a:scrgbClr r="0" g="0" b="0"/>
+      </a:effectRef>
+      <a:fontRef idx="minor">
+        <a:schemeClr val="lt1"/>
+      </a:fontRef>
+    </dgm:style>
+  </dgm:styleLbl>
+  <dgm:styleLbl name="bgSibTrans2D1">
+    <dgm:scene3d>
+      <a:camera prst="orthographicFront"/>
+      <a:lightRig rig="threePt" dir="t"/>
+    </dgm:scene3d>
+    <dgm:sp3d/>
+    <dgm:txPr/>
+    <dgm:style>
+      <a:lnRef idx="0">
+        <a:scrgbClr r="0" g="0" b="0"/>
+      </a:lnRef>
+      <a:fillRef idx="1">
+        <a:scrgbClr r="0" g="0" b="0"/>
+      </a:fillRef>
+      <a:effectRef idx="0">
+        <a:scrgbClr r="0" g="0" b="0"/>
+      </a:effectRef>
+      <a:fontRef idx="minor">
+        <a:schemeClr val="lt1"/>
+      </a:fontRef>
+    </dgm:style>
+  </dgm:styleLbl>
+  <dgm:styleLbl name="sibTrans1D1">
+    <dgm:scene3d>
+      <a:camera prst="orthographicFront"/>
+      <a:lightRig rig="threePt" dir="t"/>
+    </dgm:scene3d>
+    <dgm:sp3d/>
+    <dgm:txPr/>
+    <dgm:style>
+      <a:lnRef idx="1">
+        <a:scrgbClr r="0" g="0" b="0"/>
+      </a:lnRef>
+      <a:fillRef idx="0">
+        <a:scrgbClr r="0" g="0" b="0"/>
+      </a:fillRef>
+      <a:effectRef idx="0">
+        <a:scrgbClr r="0" g="0" b="0"/>
+      </a:effectRef>
+      <a:fontRef idx="minor"/>
+    </dgm:style>
+  </dgm:styleLbl>
+  <dgm:styleLbl name="callout">
+    <dgm:scene3d>
+      <a:camera prst="orthographicFront"/>
+      <a:lightRig rig="threePt" dir="t"/>
+    </dgm:scene3d>
+    <dgm:sp3d/>
+    <dgm:txPr/>
+    <dgm:style>
+      <a:lnRef idx="2">
+        <a:scrgbClr r="0" g="0" b="0"/>
+      </a:lnRef>
+      <a:fillRef idx="1">
+        <a:scrgbClr r="0" g="0" b="0"/>
+      </a:fillRef>
+      <a:effectRef idx="0">
+        <a:scrgbClr r="0" g="0" b="0"/>
+      </a:effectRef>
+      <a:fontRef idx="minor"/>
+    </dgm:style>
+  </dgm:styleLbl>
+  <dgm:styleLbl name="asst0">
+    <dgm:scene3d>
+      <a:camera prst="orthographicFront"/>
+      <a:lightRig rig="threePt" dir="t"/>
+    </dgm:scene3d>
+    <dgm:sp3d/>
+    <dgm:txPr/>
+    <dgm:style>
+      <a:lnRef idx="2">
+        <a:scrgbClr r="0" g="0" b="0"/>
+      </a:lnRef>
+      <a:fillRef idx="1">
+        <a:scrgbClr r="0" g="0" b="0"/>
+      </a:fillRef>
+      <a:effectRef idx="0">
+        <a:scrgbClr r="0" g="0" b="0"/>
+      </a:effectRef>
+      <a:fontRef idx="minor">
+        <a:schemeClr val="lt1"/>
+      </a:fontRef>
+    </dgm:style>
+  </dgm:styleLbl>
+  <dgm:styleLbl name="asst1">
+    <dgm:scene3d>
+      <a:camera prst="orthographicFront"/>
+      <a:lightRig rig="threePt" dir="t"/>
+    </dgm:scene3d>
+    <dgm:sp3d/>
+    <dgm:txPr/>
+    <dgm:style>
+      <a:lnRef idx="2">
+        <a:scrgbClr r="0" g="0" b="0"/>
+      </a:lnRef>
+      <a:fillRef idx="1">
+        <a:scrgbClr r="0" g="0" b="0"/>
+      </a:fillRef>
+      <a:effectRef idx="0">
+        <a:scrgbClr r="0" g="0" b="0"/>
+      </a:effectRef>
+      <a:fontRef idx="minor">
+        <a:schemeClr val="lt1"/>
+      </a:fontRef>
+    </dgm:style>
+  </dgm:styleLbl>
+  <dgm:styleLbl name="asst2">
+    <dgm:scene3d>
+      <a:camera prst="orthographicFront"/>
+      <a:lightRig rig="threePt" dir="t"/>
+    </dgm:scene3d>
+    <dgm:sp3d/>
+    <dgm:txPr/>
+    <dgm:style>
+      <a:lnRef idx="2">
+        <a:scrgbClr r="0" g="0" b="0"/>
+      </a:lnRef>
+      <a:fillRef idx="1">
+        <a:scrgbClr r="0" g="0" b="0"/>
+      </a:fillRef>
+      <a:effectRef idx="0">
+        <a:scrgbClr r="0" g="0" b="0"/>
+      </a:effectRef>
+      <a:fontRef idx="minor">
+        <a:schemeClr val="lt1"/>
+      </a:fontRef>
+    </dgm:style>
+  </dgm:styleLbl>
+  <dgm:styleLbl name="asst3">
+    <dgm:scene3d>
+      <a:camera prst="orthographicFront"/>
+      <a:lightRig rig="threePt" dir="t"/>
+    </dgm:scene3d>
+    <dgm:sp3d/>
+    <dgm:txPr/>
+    <dgm:style>
+      <a:lnRef idx="2">
+        <a:scrgbClr r="0" g="0" b="0"/>
+      </a:lnRef>
+      <a:fillRef idx="1">
+        <a:scrgbClr r="0" g="0" b="0"/>
+      </a:fillRef>
+      <a:effectRef idx="0">
+        <a:scrgbClr r="0" g="0" b="0"/>
+      </a:effectRef>
+      <a:fontRef idx="minor">
+        <a:schemeClr val="lt1"/>
+      </a:fontRef>
+    </dgm:style>
+  </dgm:styleLbl>
+  <dgm:styleLbl name="asst4">
+    <dgm:scene3d>
+      <a:camera prst="orthographicFront"/>
+      <a:lightRig rig="threePt" dir="t"/>
+    </dgm:scene3d>
+    <dgm:sp3d/>
+    <dgm:txPr/>
+    <dgm:style>
+      <a:lnRef idx="2">
+        <a:scrgbClr r="0" g="0" b="0"/>
+      </a:lnRef>
+      <a:fillRef idx="1">
+        <a:scrgbClr r="0" g="0" b="0"/>
+      </a:fillRef>
+      <a:effectRef idx="0">
+        <a:scrgbClr r="0" g="0" b="0"/>
+      </a:effectRef>
+      <a:fontRef idx="minor">
+        <a:schemeClr val="lt1"/>
+      </a:fontRef>
+    </dgm:style>
+  </dgm:styleLbl>
+  <dgm:styleLbl name="parChTrans2D1">
+    <dgm:scene3d>
+      <a:camera prst="orthographicFront"/>
+      <a:lightRig rig="threePt" dir="t"/>
+    </dgm:scene3d>
+    <dgm:sp3d/>
+    <dgm:txPr/>
+    <dgm:style>
+      <a:lnRef idx="2">
+        <a:scrgbClr r="0" g="0" b="0"/>
+      </a:lnRef>
+      <a:fillRef idx="1">
+        <a:scrgbClr r="0" g="0" b="0"/>
+      </a:fillRef>
+      <a:effectRef idx="0">
+        <a:scrgbClr r="0" g="0" b="0"/>
+      </a:effectRef>
+      <a:fontRef idx="minor">
+        <a:schemeClr val="lt1"/>
+      </a:fontRef>
+    </dgm:style>
+  </dgm:styleLbl>
+  <dgm:styleLbl name="parChTrans2D2">
+    <dgm:scene3d>
+      <a:camera prst="orthographicFront"/>
+      <a:lightRig rig="threePt" dir="t"/>
+    </dgm:scene3d>
+    <dgm:sp3d/>
+    <dgm:txPr/>
+    <dgm:style>
+      <a:lnRef idx="2">
+        <a:scrgbClr r="0" g="0" b="0"/>
+      </a:lnRef>
+      <a:fillRef idx="1">
+        <a:scrgbClr r="0" g="0" b="0"/>
+      </a:fillRef>
+      <a:effectRef idx="0">
+        <a:scrgbClr r="0" g="0" b="0"/>
+      </a:effectRef>
+      <a:fontRef idx="minor">
+        <a:schemeClr val="lt1"/>
+      </a:fontRef>
+    </dgm:style>
+  </dgm:styleLbl>
+  <dgm:styleLbl name="parChTrans2D3">
+    <dgm:scene3d>
+      <a:camera prst="orthographicFront"/>
+      <a:lightRig rig="threePt" dir="t"/>
+    </dgm:scene3d>
+    <dgm:sp3d/>
+    <dgm:txPr/>
+    <dgm:style>
+      <a:lnRef idx="2">
+        <a:scrgbClr r="0" g="0" b="0"/>
+      </a:lnRef>
+      <a:fillRef idx="1">
+        <a:scrgbClr r="0" g="0" b="0"/>
+      </a:fillRef>
+      <a:effectRef idx="0">
+        <a:scrgbClr r="0" g="0" b="0"/>
+      </a:effectRef>
+      <a:fontRef idx="minor">
+        <a:schemeClr val="lt1"/>
+      </a:fontRef>
+    </dgm:style>
+  </dgm:styleLbl>
+  <dgm:styleLbl name="parChTrans2D4">
+    <dgm:scene3d>
+      <a:camera prst="orthographicFront"/>
+      <a:lightRig rig="threePt" dir="t"/>
+    </dgm:scene3d>
+    <dgm:sp3d/>
+    <dgm:txPr/>
+    <dgm:style>
+      <a:lnRef idx="2">
+        <a:scrgbClr r="0" g="0" b="0"/>
+      </a:lnRef>
+      <a:fillRef idx="1">
+        <a:scrgbClr r="0" g="0" b="0"/>
+      </a:fillRef>
+      <a:effectRef idx="0">
+        <a:scrgbClr r="0" g="0" b="0"/>
+      </a:effectRef>
+      <a:fontRef idx="minor">
+        <a:schemeClr val="lt1"/>
+      </a:fontRef>
+    </dgm:style>
+  </dgm:styleLbl>
+  <dgm:styleLbl name="parChTrans1D1">
+    <dgm:scene3d>
+      <a:camera prst="orthographicFront"/>
+      <a:lightRig rig="threePt" dir="t"/>
+    </dgm:scene3d>
+    <dgm:sp3d/>
+    <dgm:txPr/>
+    <dgm:style>
+      <a:lnRef idx="2">
+        <a:scrgbClr r="0" g="0" b="0"/>
+      </a:lnRef>
+      <a:fillRef idx="0">
+        <a:scrgbClr r="0" g="0" b="0"/>
+      </a:fillRef>
+      <a:effectRef idx="0">
+        <a:scrgbClr r="0" g="0" b="0"/>
+      </a:effectRef>
+      <a:fontRef idx="minor"/>
+    </dgm:style>
+  </dgm:styleLbl>
+  <dgm:styleLbl name="parChTrans1D2">
+    <dgm:scene3d>
+      <a:camera prst="orthographicFront"/>
+      <a:lightRig rig="threePt" dir="t"/>
+    </dgm:scene3d>
+    <dgm:sp3d/>
+    <dgm:txPr/>
+    <dgm:style>
+      <a:lnRef idx="2">
+        <a:scrgbClr r="0" g="0" b="0"/>
+      </a:lnRef>
+      <a:fillRef idx="0">
+        <a:scrgbClr r="0" g="0" b="0"/>
+      </a:fillRef>
+      <a:effectRef idx="0">
+        <a:scrgbClr r="0" g="0" b="0"/>
+      </a:effectRef>
+      <a:fontRef idx="minor"/>
+    </dgm:style>
+  </dgm:styleLbl>
+  <dgm:styleLbl name="parChTrans1D3">
+    <dgm:scene3d>
+      <a:camera prst="orthographicFront"/>
+      <a:lightRig rig="threePt" dir="t"/>
+    </dgm:scene3d>
+    <dgm:sp3d/>
+    <dgm:txPr/>
+    <dgm:style>
+      <a:lnRef idx="2">
+        <a:scrgbClr r="0" g="0" b="0"/>
+      </a:lnRef>
+      <a:fillRef idx="0">
+        <a:scrgbClr r="0" g="0" b="0"/>
+      </a:fillRef>
+      <a:effectRef idx="0">
+        <a:scrgbClr r="0" g="0" b="0"/>
+      </a:effectRef>
+      <a:fontRef idx="minor"/>
+    </dgm:style>
+  </dgm:styleLbl>
+  <dgm:styleLbl name="parChTrans1D4">
+    <dgm:scene3d>
+      <a:camera prst="orthographicFront"/>
+      <a:lightRig rig="threePt" dir="t"/>
+    </dgm:scene3d>
+    <dgm:sp3d/>
+    <dgm:txPr/>
+    <dgm:style>
+      <a:lnRef idx="2">
+        <a:scrgbClr r="0" g="0" b="0"/>
+      </a:lnRef>
+      <a:fillRef idx="0">
+        <a:scrgbClr r="0" g="0" b="0"/>
+      </a:fillRef>
+      <a:effectRef idx="0">
+        <a:scrgbClr r="0" g="0" b="0"/>
+      </a:effectRef>
+      <a:fontRef idx="minor"/>
+    </dgm:style>
+  </dgm:styleLbl>
+  <dgm:styleLbl name="fgAcc1">
+    <dgm:scene3d>
+      <a:camera prst="orthographicFront"/>
+      <a:lightRig rig="threePt" dir="t"/>
+    </dgm:scene3d>
+    <dgm:sp3d/>
+    <dgm:txPr/>
+    <dgm:style>
+      <a:lnRef idx="2">
+        <a:scrgbClr r="0" g="0" b="0"/>
+      </a:lnRef>
+      <a:fillRef idx="1">
+        <a:scrgbClr r="0" g="0" b="0"/>
+      </a:fillRef>
+      <a:effectRef idx="0">
+        <a:scrgbClr r="0" g="0" b="0"/>
+      </a:effectRef>
+      <a:fontRef idx="minor"/>
+    </dgm:style>
+  </dgm:styleLbl>
+  <dgm:styleLbl name="conFgAcc1">
+    <dgm:scene3d>
+      <a:camera prst="orthographicFront"/>
+      <a:lightRig rig="threePt" dir="t"/>
+    </dgm:scene3d>
+    <dgm:sp3d/>
+    <dgm:txPr/>
+    <dgm:style>
+      <a:lnRef idx="2">
+        <a:scrgbClr r="0" g="0" b="0"/>
+      </a:lnRef>
+      <a:fillRef idx="1">
+        <a:scrgbClr r="0" g="0" b="0"/>
+      </a:fillRef>
+      <a:effectRef idx="0">
+        <a:scrgbClr r="0" g="0" b="0"/>
+      </a:effectRef>
+      <a:fontRef idx="minor"/>
+    </dgm:style>
+  </dgm:styleLbl>
+  <dgm:styleLbl name="alignAcc1">
+    <dgm:scene3d>
+      <a:camera prst="orthographicFront"/>
+      <a:lightRig rig="threePt" dir="t"/>
+    </dgm:scene3d>
+    <dgm:sp3d/>
+    <dgm:txPr/>
+    <dgm:style>
+      <a:lnRef idx="2">
+        <a:scrgbClr r="0" g="0" b="0"/>
+      </a:lnRef>
+      <a:fillRef idx="1">
+        <a:scrgbClr r="0" g="0" b="0"/>
+      </a:fillRef>
+      <a:effectRef idx="0">
+        <a:scrgbClr r="0" g="0" b="0"/>
+      </a:effectRef>
+      <a:fontRef idx="minor"/>
+    </dgm:style>
+  </dgm:styleLbl>
+  <dgm:styleLbl name="trAlignAcc1">
+    <dgm:scene3d>
+      <a:camera prst="orthographicFront"/>
+      <a:lightRig rig="threePt" dir="t"/>
+    </dgm:scene3d>
+    <dgm:sp3d/>
+    <dgm:txPr/>
+    <dgm:style>
+      <a:lnRef idx="1">
+        <a:scrgbClr r="0" g="0" b="0"/>
+      </a:lnRef>
+      <a:fillRef idx="1">
+        <a:scrgbClr r="0" g="0" b="0"/>
+      </a:fillRef>
+      <a:effectRef idx="0">
+        <a:scrgbClr r="0" g="0" b="0"/>
+      </a:effectRef>
+      <a:fontRef idx="minor"/>
+    </dgm:style>
+  </dgm:styleLbl>
+  <dgm:styleLbl name="bgAcc1">
+    <dgm:scene3d>
+      <a:camera prst="orthographicFront"/>
+      <a:lightRig rig="threePt" dir="t"/>
+    </dgm:scene3d>
+    <dgm:sp3d/>
+    <dgm:txPr/>
+    <dgm:style>
+      <a:lnRef idx="2">
+        <a:scrgbClr r="0" g="0" b="0"/>
+      </a:lnRef>
+      <a:fillRef idx="1">
+        <a:scrgbClr r="0" g="0" b="0"/>
+      </a:fillRef>
+      <a:effectRef idx="0">
+        <a:scrgbClr r="0" g="0" b="0"/>
+      </a:effectRef>
+      <a:fontRef idx="minor"/>
+    </dgm:style>
+  </dgm:styleLbl>
+  <dgm:styleLbl name="solidFgAcc1">
+    <dgm:scene3d>
+      <a:camera prst="orthographicFront"/>
+      <a:lightRig rig="threePt" dir="t"/>
+    </dgm:scene3d>
+    <dgm:sp3d/>
+    <dgm:txPr/>
+    <dgm:style>
+      <a:lnRef idx="2">
+        <a:scrgbClr r="0" g="0" b="0"/>
+      </a:lnRef>
+      <a:fillRef idx="1">
+        <a:scrgbClr r="0" g="0" b="0"/>
+      </a:fillRef>
+      <a:effectRef idx="0">
+        <a:scrgbClr r="0" g="0" b="0"/>
+      </a:effectRef>
+      <a:fontRef idx="minor"/>
+    </dgm:style>
+  </dgm:styleLbl>
+  <dgm:styleLbl name="solidAlignAcc1">
+    <dgm:scene3d>
+      <a:camera prst="orthographicFront"/>
+      <a:lightRig rig="threePt" dir="t"/>
+    </dgm:scene3d>
+    <dgm:sp3d/>
+    <dgm:txPr/>
+    <dgm:style>
+      <a:lnRef idx="2">
+        <a:scrgbClr r="0" g="0" b="0"/>
+      </a:lnRef>
+      <a:fillRef idx="1">
+        <a:scrgbClr r="0" g="0" b="0"/>
+      </a:fillRef>
+      <a:effectRef idx="0">
+        <a:scrgbClr r="0" g="0" b="0"/>
+      </a:effectRef>
+      <a:fontRef idx="minor"/>
+    </dgm:style>
+  </dgm:styleLbl>
+  <dgm:styleLbl name="solidBgAcc1">
+    <dgm:scene3d>
+      <a:camera prst="orthographicFront"/>
+      <a:lightRig rig="threePt" dir="t"/>
+    </dgm:scene3d>
+    <dgm:sp3d/>
+    <dgm:txPr/>
+    <dgm:style>
+      <a:lnRef idx="2">
+        <a:scrgbClr r="0" g="0" b="0"/>
+      </a:lnRef>
+      <a:fillRef idx="1">
+        <a:scrgbClr r="0" g="0" b="0"/>
+      </a:fillRef>
+      <a:effectRef idx="0">
+        <a:scrgbClr r="0" g="0" b="0"/>
+      </a:effectRef>
+      <a:fontRef idx="minor"/>
+    </dgm:style>
+  </dgm:styleLbl>
+  <dgm:styleLbl name="fgAccFollowNode1">
+    <dgm:scene3d>
+      <a:camera prst="orthographicFront"/>
+      <a:lightRig rig="threePt" dir="t"/>
+    </dgm:scene3d>
+    <dgm:sp3d/>
+    <dgm:txPr/>
+    <dgm:style>
+      <a:lnRef idx="2">
+        <a:scrgbClr r="0" g="0" b="0"/>
+      </a:lnRef>
+      <a:fillRef idx="1">
+        <a:scrgbClr r="0" g="0" b="0"/>
+      </a:fillRef>
+      <a:effectRef idx="0">
+        <a:scrgbClr r="0" g="0" b="0"/>
+      </a:effectRef>
+      <a:fontRef idx="minor"/>
+    </dgm:style>
+  </dgm:styleLbl>
+  <dgm:styleLbl name="alignAccFollowNode1">
+    <dgm:scene3d>
+      <a:camera prst="orthographicFront"/>
+      <a:lightRig rig="threePt" dir="t"/>
+    </dgm:scene3d>
+    <dgm:sp3d/>
+    <dgm:txPr/>
+    <dgm:style>
+      <a:lnRef idx="2">
+        <a:scrgbClr r="0" g="0" b="0"/>
+      </a:lnRef>
+      <a:fillRef idx="1">
+        <a:scrgbClr r="0" g="0" b="0"/>
+      </a:fillRef>
+      <a:effectRef idx="0">
+        <a:scrgbClr r="0" g="0" b="0"/>
+      </a:effectRef>
+      <a:fontRef idx="minor"/>
+    </dgm:style>
+  </dgm:styleLbl>
+  <dgm:styleLbl name="bgAccFollowNode1">
+    <dgm:scene3d>
+      <a:camera prst="orthographicFront"/>
+      <a:lightRig rig="threePt" dir="t"/>
+    </dgm:scene3d>
+    <dgm:sp3d/>
+    <dgm:txPr/>
+    <dgm:style>
+      <a:lnRef idx="2">
+        <a:scrgbClr r="0" g="0" b="0"/>
+      </a:lnRef>
+      <a:fillRef idx="1">
+        <a:scrgbClr r="0" g="0" b="0"/>
+      </a:fillRef>
+      <a:effectRef idx="0">
+        <a:scrgbClr r="0" g="0" b="0"/>
+      </a:effectRef>
+      <a:fontRef idx="minor"/>
+    </dgm:style>
+  </dgm:styleLbl>
+  <dgm:styleLbl name="fgAcc0">
+    <dgm:scene3d>
+      <a:camera prst="orthographicFront"/>
+      <a:lightRig rig="threePt" dir="t"/>
+    </dgm:scene3d>
+    <dgm:sp3d/>
+    <dgm:txPr/>
+    <dgm:style>
+      <a:lnRef idx="2">
+        <a:scrgbClr r="0" g="0" b="0"/>
+      </a:lnRef>
+      <a:fillRef idx="1">
+        <a:scrgbClr r="0" g="0" b="0"/>
+      </a:fillRef>
+      <a:effectRef idx="0">
+        <a:scrgbClr r="0" g="0" b="0"/>
+      </a:effectRef>
+      <a:fontRef idx="minor"/>
+    </dgm:style>
+  </dgm:styleLbl>
+  <dgm:styleLbl name="fgAcc2">
+    <dgm:scene3d>
+      <a:camera prst="orthographicFront"/>
+      <a:lightRig rig="threePt" dir="t"/>
+    </dgm:scene3d>
+    <dgm:sp3d/>
+    <dgm:txPr/>
+    <dgm:style>
+      <a:lnRef idx="2">
+        <a:scrgbClr r="0" g="0" b="0"/>
+      </a:lnRef>
+      <a:fillRef idx="1">
+        <a:scrgbClr r="0" g="0" b="0"/>
+      </a:fillRef>
+      <a:effectRef idx="0">
+        <a:scrgbClr r="0" g="0" b="0"/>
+      </a:effectRef>
+      <a:fontRef idx="minor"/>
+    </dgm:style>
+  </dgm:styleLbl>
+  <dgm:styleLbl name="fgAcc3">
+    <dgm:scene3d>
+      <a:camera prst="orthographicFront"/>
+      <a:lightRig rig="threePt" dir="t"/>
+    </dgm:scene3d>
+    <dgm:sp3d/>
+    <dgm:txPr/>
+    <dgm:style>
+      <a:lnRef idx="2">
+        <a:scrgbClr r="0" g="0" b="0"/>
+      </a:lnRef>
+      <a:fillRef idx="1">
+        <a:scrgbClr r="0" g="0" b="0"/>
+      </a:fillRef>
+      <a:effectRef idx="0">
+        <a:scrgbClr r="0" g="0" b="0"/>
+      </a:effectRef>
+      <a:fontRef idx="minor"/>
+    </dgm:style>
+  </dgm:styleLbl>
+  <dgm:styleLbl name="fgAcc4">
+    <dgm:scene3d>
+      <a:camera prst="orthographicFront"/>
+      <a:lightRig rig="threePt" dir="t"/>
+    </dgm:scene3d>
+    <dgm:sp3d/>
+    <dgm:txPr/>
+    <dgm:style>
+      <a:lnRef idx="2">
+        <a:scrgbClr r="0" g="0" b="0"/>
+      </a:lnRef>
+      <a:fillRef idx="1">
+        <a:scrgbClr r="0" g="0" b="0"/>
+      </a:fillRef>
+      <a:effectRef idx="0">
+        <a:scrgbClr r="0" g="0" b="0"/>
+      </a:effectRef>
+      <a:fontRef idx="minor"/>
+    </dgm:style>
+  </dgm:styleLbl>
+  <dgm:styleLbl name="bgShp">
+    <dgm:scene3d>
+      <a:camera prst="orthographicFront"/>
+      <a:lightRig rig="threePt" dir="t"/>
+    </dgm:scene3d>
+    <dgm:sp3d/>
+    <dgm:txPr/>
+    <dgm:style>
+      <a:lnRef idx="0">
+        <a:scrgbClr r="0" g="0" b="0"/>
+      </a:lnRef>
+      <a:fillRef idx="1">
+        <a:scrgbClr r="0" g="0" b="0"/>
+      </a:fillRef>
+      <a:effectRef idx="0">
+        <a:scrgbClr r="0" g="0" b="0"/>
+      </a:effectRef>
+      <a:fontRef idx="minor"/>
+    </dgm:style>
+  </dgm:styleLbl>
+  <dgm:styleLbl name="dkBgShp">
+    <dgm:scene3d>
+      <a:camera prst="orthographicFront"/>
+      <a:lightRig rig="threePt" dir="t"/>
+    </dgm:scene3d>
+    <dgm:sp3d/>
+    <dgm:txPr/>
+    <dgm:style>
+      <a:lnRef idx="0">
+        <a:scrgbClr r="0" g="0" b="0"/>
+      </a:lnRef>
+      <a:fillRef idx="1">
+        <a:scrgbClr r="0" g="0" b="0"/>
+      </a:fillRef>
+      <a:effectRef idx="0">
+        <a:scrgbClr r="0" g="0" b="0"/>
+      </a:effectRef>
+      <a:fontRef idx="minor"/>
+    </dgm:style>
+  </dgm:styleLbl>
+  <dgm:styleLbl name="trBgShp">
+    <dgm:scene3d>
+      <a:camera prst="orthographicFront"/>
+      <a:lightRig rig="threePt" dir="t"/>
+    </dgm:scene3d>
+    <dgm:sp3d/>
+    <dgm:txPr/>
+    <dgm:style>
+      <a:lnRef idx="0">
+        <a:scrgbClr r="0" g="0" b="0"/>
+      </a:lnRef>
+      <a:fillRef idx="1">
+        <a:scrgbClr r="0" g="0" b="0"/>
+      </a:fillRef>
+      <a:effectRef idx="0">
+        <a:scrgbClr r="0" g="0" b="0"/>
+      </a:effectRef>
+      <a:fontRef idx="minor"/>
+    </dgm:style>
+  </dgm:styleLbl>
+  <dgm:styleLbl name="fgShp">
+    <dgm:scene3d>
+      <a:camera prst="orthographicFront"/>
+      <a:lightRig rig="threePt" dir="t"/>
+    </dgm:scene3d>
+    <dgm:sp3d/>
+    <dgm:txPr/>
+    <dgm:style>
+      <a:lnRef idx="2">
+        <a:scrgbClr r="0" g="0" b="0"/>
+      </a:lnRef>
+      <a:fillRef idx="1">
+        <a:scrgbClr r="0" g="0" b="0"/>
+      </a:fillRef>
+      <a:effectRef idx="0">
+        <a:scrgbClr r="0" g="0" b="0"/>
+      </a:effectRef>
+      <a:fontRef idx="minor"/>
+    </dgm:style>
+  </dgm:styleLbl>
+  <dgm:styleLbl name="revTx">
+    <dgm:scene3d>
+      <a:camera prst="orthographicFront"/>
+      <a:lightRig rig="threePt" dir="t"/>
+    </dgm:scene3d>
+    <dgm:sp3d/>
+    <dgm:txPr/>
+    <dgm:style>
+      <a:lnRef idx="0">
+        <a:scrgbClr r="0" g="0" b="0"/>
+      </a:lnRef>
+      <a:fillRef idx="0">
+        <a:scrgbClr r="0" g="0" b="0"/>
+      </a:fillRef>
+      <a:effectRef idx="0">
+        <a:scrgbClr r="0" g="0" b="0"/>
+      </a:effectRef>
+      <a:fontRef idx="minor"/>
+    </dgm:style>
+  </dgm:styleLbl>
+</dgm:styleDef>
+</file>
+
+<file path=ppt/diagrams/quickStyle3.xml><?xml version="1.0" encoding="utf-8"?>
 <dgm:styleDef xmlns:dgm="http://schemas.openxmlformats.org/drawingml/2006/diagram" xmlns:a="http://schemas.openxmlformats.org/drawingml/2006/main" uniqueId="urn:microsoft.com/office/officeart/2005/8/quickstyle/simple1">
   <dgm:title val=""/>
   <dgm:desc val=""/>
@@ -6541,7 +8635,7 @@
           <a:p>
             <a:fld id="{27667466-E0D7-FD4B-BBEF-602BF6B185FF}" type="datetimeFigureOut">
               <a:rPr lang="de-DE" smtClean="0"/>
-              <a:t>06.11.11</a:t>
+              <a:t>12.11.11</a:t>
             </a:fld>
             <a:endParaRPr lang="de-DE"/>
           </a:p>
@@ -6707,7 +8801,7 @@
           <a:p>
             <a:fld id="{358CF69D-E791-E447-927B-A50D3ED4596D}" type="datetimeFigureOut">
               <a:rPr lang="de-DE" smtClean="0"/>
-              <a:t>06.11.11</a:t>
+              <a:t>12.11.11</a:t>
             </a:fld>
             <a:endParaRPr lang="de-DE"/>
           </a:p>
@@ -13548,6 +15642,13 @@
   <p:clrMapOvr>
     <a:masterClrMapping/>
   </p:clrMapOvr>
+  <p:timing>
+    <p:tnLst>
+      <p:par>
+        <p:cTn xmlns:p14="http://schemas.microsoft.com/office/powerpoint/2010/main" id="1" dur="indefinite" restart="never" nodeType="tmRoot"/>
+      </p:par>
+    </p:tnLst>
+  </p:timing>
 </p:sld>
 </file>
 
@@ -13601,14 +15702,14 @@
             <p:ph idx="1"/>
             <p:extLst>
               <p:ext uri="{D42A27DB-BD31-4B8C-83A1-F6EECF244321}">
-                <p14:modId xmlns:p14="http://schemas.microsoft.com/office/powerpoint/2010/main" val="497415686"/>
+                <p14:modId xmlns:p14="http://schemas.microsoft.com/office/powerpoint/2010/main" val="1736113879"/>
               </p:ext>
             </p:extLst>
           </p:nvPr>
         </p:nvGraphicFramePr>
         <p:xfrm>
-          <a:off x="312777" y="2595562"/>
-          <a:ext cx="8601035" cy="3670767"/>
+          <a:off x="107891" y="2609280"/>
+          <a:ext cx="6768555" cy="1255129"/>
         </p:xfrm>
         <a:graphic>
           <a:graphicData uri="http://schemas.openxmlformats.org/drawingml/2006/diagram">
@@ -13685,161 +15786,6 @@
           </a:p>
         </p:txBody>
       </p:sp>
-      <p:grpSp>
-        <p:nvGrpSpPr>
-          <p:cNvPr id="23" name="Gruppierung 22"/>
-          <p:cNvGrpSpPr/>
-          <p:nvPr/>
-        </p:nvGrpSpPr>
-        <p:grpSpPr>
-          <a:xfrm>
-            <a:off x="2113617" y="2802332"/>
-            <a:ext cx="5004438" cy="1263423"/>
-            <a:chOff x="2113617" y="2802332"/>
-            <a:chExt cx="5004438" cy="1263423"/>
-          </a:xfrm>
-        </p:grpSpPr>
-        <p:grpSp>
-          <p:nvGrpSpPr>
-            <p:cNvPr id="21" name="Gruppierung 20"/>
-            <p:cNvGrpSpPr/>
-            <p:nvPr/>
-          </p:nvGrpSpPr>
-          <p:grpSpPr>
-            <a:xfrm>
-              <a:off x="2113617" y="3174890"/>
-              <a:ext cx="5004438" cy="890865"/>
-              <a:chOff x="2113617" y="3174890"/>
-              <a:chExt cx="5004438" cy="890865"/>
-            </a:xfrm>
-          </p:grpSpPr>
-          <p:cxnSp>
-            <p:nvCxnSpPr>
-              <p:cNvPr id="14" name="Gerade Verbindung 13"/>
-              <p:cNvCxnSpPr/>
-              <p:nvPr/>
-            </p:nvCxnSpPr>
-            <p:spPr>
-              <a:xfrm flipH="1" flipV="1">
-                <a:off x="7108577" y="3174890"/>
-                <a:ext cx="9478" cy="890865"/>
-              </a:xfrm>
-              <a:prstGeom prst="line">
-                <a:avLst/>
-              </a:prstGeom>
-              <a:ln w="38100" cmpd="sng"/>
-            </p:spPr>
-            <p:style>
-              <a:lnRef idx="2">
-                <a:schemeClr val="accent3"/>
-              </a:lnRef>
-              <a:fillRef idx="0">
-                <a:schemeClr val="accent3"/>
-              </a:fillRef>
-              <a:effectRef idx="1">
-                <a:schemeClr val="accent3"/>
-              </a:effectRef>
-              <a:fontRef idx="minor">
-                <a:schemeClr val="tx1"/>
-              </a:fontRef>
-            </p:style>
-          </p:cxnSp>
-          <p:cxnSp>
-            <p:nvCxnSpPr>
-              <p:cNvPr id="16" name="Gerade Verbindung 15"/>
-              <p:cNvCxnSpPr/>
-              <p:nvPr/>
-            </p:nvCxnSpPr>
-            <p:spPr>
-              <a:xfrm flipH="1">
-                <a:off x="2118998" y="3185652"/>
-                <a:ext cx="4994960" cy="0"/>
-              </a:xfrm>
-              <a:prstGeom prst="line">
-                <a:avLst/>
-              </a:prstGeom>
-              <a:ln w="38100" cmpd="sng"/>
-            </p:spPr>
-            <p:style>
-              <a:lnRef idx="2">
-                <a:schemeClr val="accent3"/>
-              </a:lnRef>
-              <a:fillRef idx="0">
-                <a:schemeClr val="accent3"/>
-              </a:fillRef>
-              <a:effectRef idx="1">
-                <a:schemeClr val="accent3"/>
-              </a:effectRef>
-              <a:fontRef idx="minor">
-                <a:schemeClr val="tx1"/>
-              </a:fontRef>
-            </p:style>
-          </p:cxnSp>
-          <p:cxnSp>
-            <p:nvCxnSpPr>
-              <p:cNvPr id="18" name="Gerade Verbindung mit Pfeil 17"/>
-              <p:cNvCxnSpPr/>
-              <p:nvPr/>
-            </p:nvCxnSpPr>
-            <p:spPr>
-              <a:xfrm>
-                <a:off x="2113617" y="3174890"/>
-                <a:ext cx="0" cy="890865"/>
-              </a:xfrm>
-              <a:prstGeom prst="straightConnector1">
-                <a:avLst/>
-              </a:prstGeom>
-              <a:ln w="38100" cmpd="sng">
-                <a:tailEnd type="arrow"/>
-              </a:ln>
-            </p:spPr>
-            <p:style>
-              <a:lnRef idx="2">
-                <a:schemeClr val="accent3"/>
-              </a:lnRef>
-              <a:fillRef idx="0">
-                <a:schemeClr val="accent3"/>
-              </a:fillRef>
-              <a:effectRef idx="1">
-                <a:schemeClr val="accent3"/>
-              </a:effectRef>
-              <a:fontRef idx="minor">
-                <a:schemeClr val="tx1"/>
-              </a:fontRef>
-            </p:style>
-          </p:cxnSp>
-        </p:grpSp>
-        <p:sp>
-          <p:nvSpPr>
-            <p:cNvPr id="22" name="Textfeld 21"/>
-            <p:cNvSpPr txBox="1"/>
-            <p:nvPr/>
-          </p:nvSpPr>
-          <p:spPr>
-            <a:xfrm>
-              <a:off x="3464503" y="2802332"/>
-              <a:ext cx="2298149" cy="307777"/>
-            </a:xfrm>
-            <a:prstGeom prst="rect">
-              <a:avLst/>
-            </a:prstGeom>
-            <a:noFill/>
-          </p:spPr>
-          <p:txBody>
-            <a:bodyPr wrap="square" rtlCol="0">
-              <a:spAutoFit/>
-            </a:bodyPr>
-            <a:lstStyle/>
-            <a:p>
-              <a:r>
-                <a:rPr lang="de-DE" sz="1400" dirty="0" smtClean="0"/>
-                <a:t>Für jede Spielrunde</a:t>
-              </a:r>
-              <a:endParaRPr lang="de-DE" sz="1400" dirty="0"/>
-            </a:p>
-          </p:txBody>
-        </p:sp>
-      </p:grpSp>
       <p:sp>
         <p:nvSpPr>
           <p:cNvPr id="24" name="Pfeil nach oben 23"/>
@@ -13848,8 +15794,8 @@
         </p:nvSpPr>
         <p:spPr>
           <a:xfrm>
-            <a:off x="8174979" y="4838400"/>
-            <a:ext cx="359143" cy="717120"/>
+            <a:off x="7761410" y="4847560"/>
+            <a:ext cx="359143" cy="509760"/>
           </a:xfrm>
           <a:prstGeom prst="upArrow">
             <a:avLst/>
@@ -13886,8 +15832,8 @@
         </p:nvSpPr>
         <p:spPr>
           <a:xfrm>
-            <a:off x="7732497" y="5667839"/>
-            <a:ext cx="1181316" cy="738664"/>
+            <a:off x="7241171" y="5460764"/>
+            <a:ext cx="1394766" cy="830997"/>
           </a:xfrm>
           <a:prstGeom prst="rect">
             <a:avLst/>
@@ -13902,10 +15848,231 @@
           <a:p>
             <a:pPr algn="ctr"/>
             <a:r>
-              <a:rPr lang="de-DE" sz="1400" dirty="0" smtClean="0"/>
+              <a:rPr lang="de-DE" sz="1600" dirty="0" smtClean="0"/>
               <a:t>Information von Spielleiter</a:t>
             </a:r>
-            <a:endParaRPr lang="de-DE" sz="1400" dirty="0"/>
+            <a:endParaRPr lang="de-DE" sz="1600" dirty="0"/>
+          </a:p>
+        </p:txBody>
+      </p:sp>
+      <p:graphicFrame>
+        <p:nvGraphicFramePr>
+          <p:cNvPr id="3" name="Diagramm 2"/>
+          <p:cNvGraphicFramePr/>
+          <p:nvPr>
+            <p:extLst>
+              <p:ext uri="{D42A27DB-BD31-4B8C-83A1-F6EECF244321}">
+                <p14:modId xmlns:p14="http://schemas.microsoft.com/office/powerpoint/2010/main" val="446100442"/>
+              </p:ext>
+            </p:extLst>
+          </p:nvPr>
+        </p:nvGraphicFramePr>
+        <p:xfrm>
+          <a:off x="3378482" y="3568320"/>
+          <a:ext cx="5376852" cy="1789000"/>
+        </p:xfrm>
+        <a:graphic>
+          <a:graphicData uri="http://schemas.openxmlformats.org/drawingml/2006/diagram">
+            <dgm:relIds xmlns:dgm="http://schemas.openxmlformats.org/drawingml/2006/diagram" xmlns:r="http://schemas.openxmlformats.org/officeDocument/2006/relationships" r:dm="rId7" r:lo="rId8" r:qs="rId9" r:cs="rId10"/>
+          </a:graphicData>
+        </a:graphic>
+      </p:graphicFrame>
+      <p:sp>
+        <p:nvSpPr>
+          <p:cNvPr id="8" name="Rechteck 7"/>
+          <p:cNvSpPr/>
+          <p:nvPr/>
+        </p:nvSpPr>
+        <p:spPr>
+          <a:xfrm>
+            <a:off x="1892086" y="2548800"/>
+            <a:ext cx="4984360" cy="3231360"/>
+          </a:xfrm>
+          <a:prstGeom prst="rect">
+            <a:avLst/>
+          </a:prstGeom>
+          <a:noFill/>
+          <a:ln w="38100" cmpd="sng">
+            <a:solidFill>
+              <a:schemeClr val="accent3">
+                <a:lumMod val="60000"/>
+                <a:lumOff val="40000"/>
+                <a:alpha val="80000"/>
+              </a:schemeClr>
+            </a:solidFill>
+          </a:ln>
+        </p:spPr>
+        <p:style>
+          <a:lnRef idx="3">
+            <a:schemeClr val="lt1"/>
+          </a:lnRef>
+          <a:fillRef idx="1">
+            <a:schemeClr val="accent3"/>
+          </a:fillRef>
+          <a:effectRef idx="1">
+            <a:schemeClr val="accent3"/>
+          </a:effectRef>
+          <a:fontRef idx="minor">
+            <a:schemeClr val="lt1"/>
+          </a:fontRef>
+        </p:style>
+        <p:txBody>
+          <a:bodyPr rtlCol="0" anchor="ctr"/>
+          <a:lstStyle/>
+          <a:p>
+            <a:pPr algn="ctr"/>
+            <a:endParaRPr lang="de-DE"/>
+          </a:p>
+        </p:txBody>
+      </p:sp>
+      <p:grpSp>
+        <p:nvGrpSpPr>
+          <p:cNvPr id="17" name="Gruppierung 16"/>
+          <p:cNvGrpSpPr/>
+          <p:nvPr/>
+        </p:nvGrpSpPr>
+        <p:grpSpPr>
+          <a:xfrm>
+            <a:off x="3089509" y="4380790"/>
+            <a:ext cx="291856" cy="158911"/>
+            <a:chOff x="1359261" y="548108"/>
+            <a:chExt cx="218029" cy="158911"/>
+          </a:xfrm>
+        </p:grpSpPr>
+        <p:sp>
+          <p:nvSpPr>
+            <p:cNvPr id="19" name="Pfeil nach rechts 18"/>
+            <p:cNvSpPr/>
+            <p:nvPr/>
+          </p:nvSpPr>
+          <p:spPr>
+            <a:xfrm>
+              <a:off x="1359261" y="548108"/>
+              <a:ext cx="188254" cy="158911"/>
+            </a:xfrm>
+            <a:prstGeom prst="rightArrow">
+              <a:avLst>
+                <a:gd name="adj1" fmla="val 60000"/>
+                <a:gd name="adj2" fmla="val 50000"/>
+              </a:avLst>
+            </a:prstGeom>
+          </p:spPr>
+          <p:style>
+            <a:lnRef idx="0">
+              <a:schemeClr val="accent3">
+                <a:shade val="90000"/>
+                <a:hueOff val="0"/>
+                <a:satOff val="0"/>
+                <a:lumOff val="0"/>
+                <a:alphaOff val="0"/>
+              </a:schemeClr>
+            </a:lnRef>
+            <a:fillRef idx="1">
+              <a:schemeClr val="accent3">
+                <a:shade val="90000"/>
+                <a:hueOff val="0"/>
+                <a:satOff val="0"/>
+                <a:lumOff val="0"/>
+                <a:alphaOff val="0"/>
+              </a:schemeClr>
+            </a:fillRef>
+            <a:effectRef idx="0">
+              <a:schemeClr val="accent3">
+                <a:shade val="90000"/>
+                <a:hueOff val="0"/>
+                <a:satOff val="0"/>
+                <a:lumOff val="0"/>
+                <a:alphaOff val="0"/>
+              </a:schemeClr>
+            </a:effectRef>
+            <a:fontRef idx="minor">
+              <a:schemeClr val="lt1"/>
+            </a:fontRef>
+          </p:style>
+        </p:sp>
+        <p:sp>
+          <p:nvSpPr>
+            <p:cNvPr id="20" name="Pfeil nach rechts 4"/>
+            <p:cNvSpPr/>
+            <p:nvPr/>
+          </p:nvSpPr>
+          <p:spPr>
+            <a:xfrm>
+              <a:off x="1436709" y="579890"/>
+              <a:ext cx="140581" cy="95347"/>
+            </a:xfrm>
+            <a:prstGeom prst="rect">
+              <a:avLst/>
+            </a:prstGeom>
+          </p:spPr>
+          <p:style>
+            <a:lnRef idx="0">
+              <a:scrgbClr r="0" g="0" b="0"/>
+            </a:lnRef>
+            <a:fillRef idx="0">
+              <a:scrgbClr r="0" g="0" b="0"/>
+            </a:fillRef>
+            <a:effectRef idx="0">
+              <a:scrgbClr r="0" g="0" b="0"/>
+            </a:effectRef>
+            <a:fontRef idx="minor">
+              <a:schemeClr val="lt1"/>
+            </a:fontRef>
+          </p:style>
+          <p:txBody>
+            <a:bodyPr spcFirstLastPara="0" vert="horz" wrap="square" lIns="0" tIns="0" rIns="0" bIns="0" numCol="1" spcCol="1270" anchor="ctr" anchorCtr="0">
+              <a:noAutofit/>
+            </a:bodyPr>
+            <a:lstStyle/>
+            <a:p>
+              <a:pPr lvl="0" algn="ctr" defTabSz="622300">
+                <a:lnSpc>
+                  <a:spcPct val="90000"/>
+                </a:lnSpc>
+                <a:spcBef>
+                  <a:spcPct val="0"/>
+                </a:spcBef>
+                <a:spcAft>
+                  <a:spcPct val="35000"/>
+                </a:spcAft>
+              </a:pPr>
+              <a:endParaRPr lang="de-DE" sz="1400" b="1" kern="1200">
+                <a:solidFill>
+                  <a:srgbClr val="000000"/>
+                </a:solidFill>
+              </a:endParaRPr>
+            </a:p>
+          </p:txBody>
+        </p:sp>
+      </p:grpSp>
+      <p:sp>
+        <p:nvSpPr>
+          <p:cNvPr id="26" name="Textfeld 25"/>
+          <p:cNvSpPr txBox="1"/>
+          <p:nvPr/>
+        </p:nvSpPr>
+        <p:spPr>
+          <a:xfrm>
+            <a:off x="1892086" y="5460622"/>
+            <a:ext cx="1486396" cy="338554"/>
+          </a:xfrm>
+          <a:prstGeom prst="rect">
+            <a:avLst/>
+          </a:prstGeom>
+          <a:noFill/>
+        </p:spPr>
+        <p:txBody>
+          <a:bodyPr wrap="square" rtlCol="0">
+            <a:spAutoFit/>
+          </a:bodyPr>
+          <a:lstStyle/>
+          <a:p>
+            <a:pPr algn="ctr"/>
+            <a:r>
+              <a:rPr lang="de-DE" sz="1600" dirty="0" smtClean="0"/>
+              <a:t>Spielrunde</a:t>
+            </a:r>
+            <a:endParaRPr lang="de-DE" sz="1600" dirty="0"/>
           </a:p>
         </p:txBody>
       </p:sp>
@@ -13919,6 +16086,13 @@
   <p:clrMapOvr>
     <a:masterClrMapping/>
   </p:clrMapOvr>
+  <p:timing>
+    <p:tnLst>
+      <p:par>
+        <p:cTn xmlns:p14="http://schemas.microsoft.com/office/powerpoint/2010/main" id="1" dur="indefinite" restart="never" nodeType="tmRoot"/>
+      </p:par>
+    </p:tnLst>
+  </p:timing>
 </p:sld>
 </file>
 

</xml_diff>